<commit_message>
[Presentation] Adding algorithm explanation slides, small code improvements
</commit_message>
<xml_diff>
--- a/projeto PI.pptx
+++ b/projeto PI.pptx
@@ -5,7 +5,7 @@
     <p:sldMasterId id="2147483660" r:id="rId1"/>
   </p:sldMasterIdLst>
   <p:notesMasterIdLst>
-    <p:notesMasterId r:id="rId15"/>
+    <p:notesMasterId r:id="rId26"/>
   </p:notesMasterIdLst>
   <p:sldIdLst>
     <p:sldId id="256" r:id="rId2"/>
@@ -16,11 +16,22 @@
     <p:sldId id="274" r:id="rId7"/>
     <p:sldId id="278" r:id="rId8"/>
     <p:sldId id="276" r:id="rId9"/>
-    <p:sldId id="275" r:id="rId10"/>
-    <p:sldId id="277" r:id="rId11"/>
-    <p:sldId id="267" r:id="rId12"/>
-    <p:sldId id="272" r:id="rId13"/>
-    <p:sldId id="270" r:id="rId14"/>
+    <p:sldId id="280" r:id="rId10"/>
+    <p:sldId id="275" r:id="rId11"/>
+    <p:sldId id="279" r:id="rId12"/>
+    <p:sldId id="281" r:id="rId13"/>
+    <p:sldId id="282" r:id="rId14"/>
+    <p:sldId id="283" r:id="rId15"/>
+    <p:sldId id="284" r:id="rId16"/>
+    <p:sldId id="285" r:id="rId17"/>
+    <p:sldId id="286" r:id="rId18"/>
+    <p:sldId id="287" r:id="rId19"/>
+    <p:sldId id="288" r:id="rId20"/>
+    <p:sldId id="289" r:id="rId21"/>
+    <p:sldId id="277" r:id="rId22"/>
+    <p:sldId id="267" r:id="rId23"/>
+    <p:sldId id="272" r:id="rId24"/>
+    <p:sldId id="270" r:id="rId25"/>
   </p:sldIdLst>
   <p:sldSz cx="9144000" cy="6858000" type="screen4x3"/>
   <p:notesSz cx="6858000" cy="9144000"/>
@@ -204,7 +215,7 @@
           <a:p>
             <a:fld id="{9F5B8AE1-A868-454D-9019-D713EF62A972}" type="datetimeFigureOut">
               <a:rPr lang="en-US" smtClean="0"/>
-              <a:t>6/6/12</a:t>
+              <a:t>7/12/12</a:t>
             </a:fld>
             <a:endParaRPr lang="en-US"/>
           </a:p>
@@ -691,7 +702,7 @@
           <a:p>
             <a:fld id="{70FAA508-F0CD-46EA-95FB-26B559A0B5D9}" type="datetimeFigureOut">
               <a:rPr lang="en-US" smtClean="0"/>
-              <a:t>6/6/12</a:t>
+              <a:t>7/12/12</a:t>
             </a:fld>
             <a:endParaRPr lang="en-US"/>
           </a:p>
@@ -1012,7 +1023,7 @@
           <a:p>
             <a:fld id="{70FAA508-F0CD-46EA-95FB-26B559A0B5D9}" type="datetimeFigureOut">
               <a:rPr lang="en-US" smtClean="0"/>
-              <a:t>6/6/12</a:t>
+              <a:t>7/12/12</a:t>
             </a:fld>
             <a:endParaRPr lang="en-US"/>
           </a:p>
@@ -1289,7 +1300,7 @@
           <a:p>
             <a:fld id="{70FAA508-F0CD-46EA-95FB-26B559A0B5D9}" type="datetimeFigureOut">
               <a:rPr lang="en-US" smtClean="0"/>
-              <a:t>6/6/12</a:t>
+              <a:t>7/12/12</a:t>
             </a:fld>
             <a:endParaRPr lang="en-US"/>
           </a:p>
@@ -1583,7 +1594,7 @@
           <a:p>
             <a:fld id="{70FAA508-F0CD-46EA-95FB-26B559A0B5D9}" type="datetimeFigureOut">
               <a:rPr lang="en-US" smtClean="0"/>
-              <a:t>6/6/12</a:t>
+              <a:t>7/12/12</a:t>
             </a:fld>
             <a:endParaRPr lang="en-US"/>
           </a:p>
@@ -1912,7 +1923,7 @@
           <a:p>
             <a:fld id="{70FAA508-F0CD-46EA-95FB-26B559A0B5D9}" type="datetimeFigureOut">
               <a:rPr lang="en-US" smtClean="0"/>
-              <a:t>6/6/12</a:t>
+              <a:t>7/12/12</a:t>
             </a:fld>
             <a:endParaRPr lang="en-US"/>
           </a:p>
@@ -2163,7 +2174,7 @@
           <a:p>
             <a:fld id="{70FAA508-F0CD-46EA-95FB-26B559A0B5D9}" type="datetimeFigureOut">
               <a:rPr lang="en-US" smtClean="0"/>
-              <a:t>6/6/12</a:t>
+              <a:t>7/12/12</a:t>
             </a:fld>
             <a:endParaRPr lang="en-US"/>
           </a:p>
@@ -2342,7 +2353,7 @@
           <a:p>
             <a:fld id="{70FAA508-F0CD-46EA-95FB-26B559A0B5D9}" type="datetimeFigureOut">
               <a:rPr lang="en-US" smtClean="0"/>
-              <a:t>6/6/12</a:t>
+              <a:t>7/12/12</a:t>
             </a:fld>
             <a:endParaRPr lang="en-US"/>
           </a:p>
@@ -2511,7 +2522,7 @@
           <a:p>
             <a:fld id="{70FAA508-F0CD-46EA-95FB-26B559A0B5D9}" type="datetimeFigureOut">
               <a:rPr lang="en-US" smtClean="0"/>
-              <a:t>6/6/12</a:t>
+              <a:t>7/12/12</a:t>
             </a:fld>
             <a:endParaRPr lang="en-US"/>
           </a:p>
@@ -2780,7 +2791,7 @@
           <a:p>
             <a:fld id="{70FAA508-F0CD-46EA-95FB-26B559A0B5D9}" type="datetimeFigureOut">
               <a:rPr lang="en-US" smtClean="0"/>
-              <a:t>6/6/12</a:t>
+              <a:t>7/12/12</a:t>
             </a:fld>
             <a:endParaRPr lang="en-US"/>
           </a:p>
@@ -3087,7 +3098,7 @@
           <a:p>
             <a:fld id="{70FAA508-F0CD-46EA-95FB-26B559A0B5D9}" type="datetimeFigureOut">
               <a:rPr lang="en-US" smtClean="0"/>
-              <a:t>6/6/12</a:t>
+              <a:t>7/12/12</a:t>
             </a:fld>
             <a:endParaRPr lang="en-US"/>
           </a:p>
@@ -3379,7 +3390,7 @@
           <a:p>
             <a:fld id="{70FAA508-F0CD-46EA-95FB-26B559A0B5D9}" type="datetimeFigureOut">
               <a:rPr lang="en-US" smtClean="0"/>
-              <a:t>6/6/12</a:t>
+              <a:t>7/12/12</a:t>
             </a:fld>
             <a:endParaRPr lang="en-US"/>
           </a:p>
@@ -3809,7 +3820,7 @@
           <a:p>
             <a:fld id="{70FAA508-F0CD-46EA-95FB-26B559A0B5D9}" type="datetimeFigureOut">
               <a:rPr lang="en-US" smtClean="0"/>
-              <a:t>6/6/12</a:t>
+              <a:t>7/12/12</a:t>
             </a:fld>
             <a:endParaRPr lang="en-US"/>
           </a:p>
@@ -4155,7 +4166,7 @@
           <a:p>
             <a:fld id="{70FAA508-F0CD-46EA-95FB-26B559A0B5D9}" type="datetimeFigureOut">
               <a:rPr lang="en-US" smtClean="0"/>
-              <a:t>6/6/12</a:t>
+              <a:t>7/12/12</a:t>
             </a:fld>
             <a:endParaRPr lang="en-US"/>
           </a:p>
@@ -4245,7 +4256,7 @@
           <a:p>
             <a:fld id="{70FAA508-F0CD-46EA-95FB-26B559A0B5D9}" type="datetimeFigureOut">
               <a:rPr lang="en-US" smtClean="0"/>
-              <a:t>6/6/12</a:t>
+              <a:t>7/12/12</a:t>
             </a:fld>
             <a:endParaRPr lang="en-US"/>
           </a:p>
@@ -4582,7 +4593,7 @@
           <a:p>
             <a:fld id="{70FAA508-F0CD-46EA-95FB-26B559A0B5D9}" type="datetimeFigureOut">
               <a:rPr lang="en-US" smtClean="0"/>
-              <a:t>6/6/12</a:t>
+              <a:t>7/12/12</a:t>
             </a:fld>
             <a:endParaRPr lang="en-US"/>
           </a:p>
@@ -4794,7 +4805,7 @@
           <a:p>
             <a:fld id="{70FAA508-F0CD-46EA-95FB-26B559A0B5D9}" type="datetimeFigureOut">
               <a:rPr lang="en-US" smtClean="0"/>
-              <a:t>6/6/12</a:t>
+              <a:t>7/12/12</a:t>
             </a:fld>
             <a:endParaRPr lang="en-US"/>
           </a:p>
@@ -5400,15 +5411,7 @@
             </a:r>
             <a:r>
               <a:rPr lang="en-US" dirty="0" err="1" smtClean="0"/>
-              <a:t>Processamento</a:t>
-            </a:r>
-            <a:r>
-              <a:rPr lang="en-US" dirty="0" smtClean="0"/>
-              <a:t> de </a:t>
-            </a:r>
-            <a:r>
-              <a:rPr lang="en-US" dirty="0" err="1" smtClean="0"/>
-              <a:t>Imagens</a:t>
+              <a:t>Redes</a:t>
             </a:r>
             <a:r>
               <a:rPr lang="en-US" dirty="0" smtClean="0"/>
@@ -5416,7 +5419,7 @@
             </a:r>
             <a:r>
               <a:rPr lang="en-US" dirty="0" err="1" smtClean="0"/>
-              <a:t>Digitais</a:t>
+              <a:t>Neurais</a:t>
             </a:r>
             <a:endParaRPr lang="en-US" dirty="0" smtClean="0"/>
           </a:p>
@@ -5427,6 +5430,17 @@
             <a:endParaRPr lang="en-US" dirty="0"/>
           </a:p>
           <a:p>
+            <a:endParaRPr lang="en-US" dirty="0" smtClean="0"/>
+          </a:p>
+          <a:p>
+            <a:r>
+              <a:rPr lang="en-US" dirty="0" smtClean="0"/>
+              <a:t>Andr</a:t>
+            </a:r>
+            <a:r>
+              <a:rPr lang="en-US" dirty="0" smtClean="0"/>
+              <a:t>é Costa</a:t>
+            </a:r>
             <a:endParaRPr lang="en-US" dirty="0" smtClean="0"/>
           </a:p>
           <a:p>
@@ -5436,27 +5450,13 @@
             </a:r>
             <a:r>
               <a:rPr lang="en-US" dirty="0" smtClean="0"/>
-              <a:t> Barbosa</a:t>
-            </a:r>
-          </a:p>
-          <a:p>
+              <a:t> </a:t>
+            </a:r>
             <a:r>
               <a:rPr lang="en-US" dirty="0" smtClean="0"/>
-              <a:t>Tsang </a:t>
-            </a:r>
-            <a:r>
-              <a:rPr lang="en-US" dirty="0" err="1" smtClean="0"/>
-              <a:t>Ing</a:t>
-            </a:r>
-            <a:r>
-              <a:rPr lang="en-US" dirty="0" smtClean="0"/>
-              <a:t> </a:t>
-            </a:r>
-            <a:r>
-              <a:rPr lang="en-US" dirty="0" err="1" smtClean="0"/>
-              <a:t>Ren</a:t>
-            </a:r>
-            <a:endParaRPr lang="en-US" dirty="0"/>
+              <a:t>Barbosa</a:t>
+            </a:r>
+            <a:endParaRPr lang="en-US" dirty="0" smtClean="0"/>
           </a:p>
         </p:txBody>
       </p:sp>
@@ -5536,12 +5536,16 @@
           <a:lstStyle/>
           <a:p>
             <a:r>
+              <a:rPr lang="en-US" dirty="0" err="1" smtClean="0"/>
+              <a:t>Implementação</a:t>
+            </a:r>
+            <a:r>
               <a:rPr lang="en-US" dirty="0" smtClean="0"/>
-              <a:t>Base de </a:t>
+              <a:t> </a:t>
             </a:r>
             <a:r>
               <a:rPr lang="en-US" dirty="0" err="1" smtClean="0"/>
-              <a:t>Treinamento</a:t>
+              <a:t>Matlab</a:t>
             </a:r>
             <a:endParaRPr lang="en-US" dirty="0"/>
           </a:p>
@@ -5549,11 +5553,13 @@
       </p:sp>
       <p:pic>
         <p:nvPicPr>
-          <p:cNvPr id="13" name="Picture 12" descr="7.png"/>
+          <p:cNvPr id="5" name="Content Placeholder 4" descr="Screen Shot 2012-06-01 at 9.02.19 AM.png"/>
           <p:cNvPicPr>
-            <a:picLocks noChangeAspect="1"/>
+            <a:picLocks noGrp="1" noChangeAspect="1"/>
           </p:cNvPicPr>
-          <p:nvPr/>
+          <p:nvPr>
+            <p:ph sz="half" idx="1"/>
+          </p:nvPr>
         </p:nvPicPr>
         <p:blipFill>
           <a:blip r:embed="rId2">
@@ -5563,540 +5569,119 @@
               </a:ext>
             </a:extLst>
           </a:blip>
+          <a:srcRect l="-14638" r="-14638"/>
           <a:stretch>
             <a:fillRect/>
           </a:stretch>
         </p:blipFill>
         <p:spPr>
           <a:xfrm>
-            <a:off x="2365068" y="2595562"/>
-            <a:ext cx="672194" cy="1008291"/>
-          </a:xfrm>
-          <a:prstGeom prst="rect">
-            <a:avLst/>
-          </a:prstGeom>
+            <a:off x="622771" y="2292869"/>
+            <a:ext cx="4290809" cy="4429480"/>
+          </a:xfrm>
         </p:spPr>
       </p:pic>
-      <p:pic>
-        <p:nvPicPr>
-          <p:cNvPr id="14" name="Picture 13" descr="8.png"/>
-          <p:cNvPicPr>
-            <a:picLocks noChangeAspect="1"/>
-          </p:cNvPicPr>
-          <p:nvPr/>
-        </p:nvPicPr>
-        <p:blipFill>
-          <a:blip r:embed="rId3">
-            <a:extLst>
-              <a:ext uri="{28A0092B-C50C-407E-A947-70E740481C1C}">
-                <a14:useLocalDpi xmlns:a14="http://schemas.microsoft.com/office/drawing/2010/main" val="0"/>
-              </a:ext>
-            </a:extLst>
-          </a:blip>
-          <a:stretch>
-            <a:fillRect/>
-          </a:stretch>
-        </p:blipFill>
-        <p:spPr>
-          <a:xfrm>
-            <a:off x="1611564" y="2595563"/>
-            <a:ext cx="672193" cy="1008290"/>
-          </a:xfrm>
-          <a:prstGeom prst="rect">
-            <a:avLst/>
-          </a:prstGeom>
-        </p:spPr>
-      </p:pic>
-      <p:pic>
-        <p:nvPicPr>
-          <p:cNvPr id="15" name="Picture 14" descr="14.png"/>
-          <p:cNvPicPr>
-            <a:picLocks noChangeAspect="1"/>
-          </p:cNvPicPr>
-          <p:nvPr/>
-        </p:nvPicPr>
-        <p:blipFill>
-          <a:blip r:embed="rId4">
-            <a:extLst>
-              <a:ext uri="{28A0092B-C50C-407E-A947-70E740481C1C}">
-                <a14:useLocalDpi xmlns:a14="http://schemas.microsoft.com/office/drawing/2010/main" val="0"/>
-              </a:ext>
-            </a:extLst>
-          </a:blip>
-          <a:stretch>
-            <a:fillRect/>
-          </a:stretch>
-        </p:blipFill>
-        <p:spPr>
-          <a:xfrm>
-            <a:off x="2333238" y="3673702"/>
-            <a:ext cx="704023" cy="1056035"/>
-          </a:xfrm>
-          <a:prstGeom prst="rect">
-            <a:avLst/>
-          </a:prstGeom>
-        </p:spPr>
-      </p:pic>
-      <p:pic>
-        <p:nvPicPr>
-          <p:cNvPr id="16" name="Picture 15" descr="23.png"/>
-          <p:cNvPicPr>
-            <a:picLocks noChangeAspect="1"/>
-          </p:cNvPicPr>
-          <p:nvPr/>
-        </p:nvPicPr>
-        <p:blipFill>
-          <a:blip r:embed="rId5">
-            <a:extLst>
-              <a:ext uri="{28A0092B-C50C-407E-A947-70E740481C1C}">
-                <a14:useLocalDpi xmlns:a14="http://schemas.microsoft.com/office/drawing/2010/main" val="0"/>
-              </a:ext>
-            </a:extLst>
-          </a:blip>
-          <a:stretch>
-            <a:fillRect/>
-          </a:stretch>
-        </p:blipFill>
-        <p:spPr>
-          <a:xfrm>
-            <a:off x="3118572" y="3673703"/>
-            <a:ext cx="704023" cy="1056034"/>
-          </a:xfrm>
-          <a:prstGeom prst="rect">
-            <a:avLst/>
-          </a:prstGeom>
-        </p:spPr>
-      </p:pic>
-      <p:pic>
-        <p:nvPicPr>
-          <p:cNvPr id="17" name="Picture 16" descr="27.png"/>
-          <p:cNvPicPr>
-            <a:picLocks noChangeAspect="1"/>
-          </p:cNvPicPr>
-          <p:nvPr/>
-        </p:nvPicPr>
-        <p:blipFill>
-          <a:blip r:embed="rId6">
-            <a:extLst>
-              <a:ext uri="{28A0092B-C50C-407E-A947-70E740481C1C}">
-                <a14:useLocalDpi xmlns:a14="http://schemas.microsoft.com/office/drawing/2010/main" val="0"/>
-              </a:ext>
-            </a:extLst>
-          </a:blip>
-          <a:stretch>
-            <a:fillRect/>
-          </a:stretch>
-        </p:blipFill>
-        <p:spPr>
-          <a:xfrm>
-            <a:off x="1576585" y="3673703"/>
-            <a:ext cx="704020" cy="1056034"/>
-          </a:xfrm>
-          <a:prstGeom prst="rect">
-            <a:avLst/>
-          </a:prstGeom>
-        </p:spPr>
-      </p:pic>
-      <p:pic>
-        <p:nvPicPr>
-          <p:cNvPr id="18" name="Picture 17" descr="4.png"/>
-          <p:cNvPicPr>
-            <a:picLocks noChangeAspect="1"/>
-          </p:cNvPicPr>
-          <p:nvPr/>
-        </p:nvPicPr>
-        <p:blipFill>
-          <a:blip r:embed="rId7">
-            <a:extLst>
-              <a:ext uri="{28A0092B-C50C-407E-A947-70E740481C1C}">
-                <a14:useLocalDpi xmlns:a14="http://schemas.microsoft.com/office/drawing/2010/main" val="0"/>
-              </a:ext>
-            </a:extLst>
-          </a:blip>
-          <a:stretch>
-            <a:fillRect/>
-          </a:stretch>
-        </p:blipFill>
-        <p:spPr>
-          <a:xfrm>
-            <a:off x="3118573" y="2595563"/>
-            <a:ext cx="672193" cy="1008290"/>
-          </a:xfrm>
-          <a:prstGeom prst="rect">
-            <a:avLst/>
-          </a:prstGeom>
-        </p:spPr>
-      </p:pic>
-      <p:pic>
-        <p:nvPicPr>
-          <p:cNvPr id="20" name="Picture 19" descr="47.png"/>
-          <p:cNvPicPr>
-            <a:picLocks noChangeAspect="1"/>
-          </p:cNvPicPr>
-          <p:nvPr/>
-        </p:nvPicPr>
-        <p:blipFill>
-          <a:blip r:embed="rId8">
-            <a:extLst>
-              <a:ext uri="{28A0092B-C50C-407E-A947-70E740481C1C}">
-                <a14:useLocalDpi xmlns:a14="http://schemas.microsoft.com/office/drawing/2010/main" val="0"/>
-              </a:ext>
-            </a:extLst>
-          </a:blip>
-          <a:stretch>
-            <a:fillRect/>
-          </a:stretch>
-        </p:blipFill>
-        <p:spPr>
-          <a:xfrm>
-            <a:off x="1576585" y="4836684"/>
-            <a:ext cx="704020" cy="1056030"/>
-          </a:xfrm>
-          <a:prstGeom prst="rect">
-            <a:avLst/>
-          </a:prstGeom>
-        </p:spPr>
-      </p:pic>
-      <p:pic>
-        <p:nvPicPr>
-          <p:cNvPr id="21" name="Picture 20" descr="44.png"/>
-          <p:cNvPicPr>
-            <a:picLocks noChangeAspect="1"/>
-          </p:cNvPicPr>
-          <p:nvPr/>
-        </p:nvPicPr>
-        <p:blipFill>
-          <a:blip r:embed="rId9">
-            <a:extLst>
-              <a:ext uri="{28A0092B-C50C-407E-A947-70E740481C1C}">
-                <a14:useLocalDpi xmlns:a14="http://schemas.microsoft.com/office/drawing/2010/main" val="0"/>
-              </a:ext>
-            </a:extLst>
-          </a:blip>
-          <a:stretch>
-            <a:fillRect/>
-          </a:stretch>
-        </p:blipFill>
-        <p:spPr>
-          <a:xfrm>
-            <a:off x="2333238" y="4843179"/>
-            <a:ext cx="704024" cy="1056036"/>
-          </a:xfrm>
-          <a:prstGeom prst="rect">
-            <a:avLst/>
-          </a:prstGeom>
-        </p:spPr>
-      </p:pic>
-      <p:pic>
-        <p:nvPicPr>
-          <p:cNvPr id="22" name="Picture 21" descr="42.png"/>
-          <p:cNvPicPr>
-            <a:picLocks noChangeAspect="1"/>
-          </p:cNvPicPr>
-          <p:nvPr/>
-        </p:nvPicPr>
-        <p:blipFill>
-          <a:blip r:embed="rId10">
-            <a:extLst>
-              <a:ext uri="{28A0092B-C50C-407E-A947-70E740481C1C}">
-                <a14:useLocalDpi xmlns:a14="http://schemas.microsoft.com/office/drawing/2010/main" val="0"/>
-              </a:ext>
-            </a:extLst>
-          </a:blip>
-          <a:stretch>
-            <a:fillRect/>
-          </a:stretch>
-        </p:blipFill>
-        <p:spPr>
-          <a:xfrm>
-            <a:off x="3118572" y="4836683"/>
-            <a:ext cx="672194" cy="1008291"/>
-          </a:xfrm>
-          <a:prstGeom prst="rect">
-            <a:avLst/>
-          </a:prstGeom>
-        </p:spPr>
-      </p:pic>
-      <p:pic>
-        <p:nvPicPr>
-          <p:cNvPr id="23" name="Picture 22" descr="5.png"/>
-          <p:cNvPicPr>
-            <a:picLocks noChangeAspect="1"/>
-          </p:cNvPicPr>
-          <p:nvPr/>
-        </p:nvPicPr>
-        <p:blipFill>
-          <a:blip r:embed="rId11">
-            <a:extLst>
-              <a:ext uri="{28A0092B-C50C-407E-A947-70E740481C1C}">
-                <a14:useLocalDpi xmlns:a14="http://schemas.microsoft.com/office/drawing/2010/main" val="0"/>
-              </a:ext>
-            </a:extLst>
-          </a:blip>
-          <a:stretch>
-            <a:fillRect/>
-          </a:stretch>
-        </p:blipFill>
-        <p:spPr>
-          <a:xfrm>
-            <a:off x="6068724" y="2595561"/>
-            <a:ext cx="677424" cy="1016137"/>
-          </a:xfrm>
-          <a:prstGeom prst="rect">
-            <a:avLst/>
-          </a:prstGeom>
-        </p:spPr>
-      </p:pic>
-      <p:pic>
-        <p:nvPicPr>
-          <p:cNvPr id="24" name="Picture 23" descr="10.png"/>
-          <p:cNvPicPr>
-            <a:picLocks noChangeAspect="1"/>
-          </p:cNvPicPr>
-          <p:nvPr/>
-        </p:nvPicPr>
-        <p:blipFill>
-          <a:blip r:embed="rId12">
-            <a:extLst>
-              <a:ext uri="{28A0092B-C50C-407E-A947-70E740481C1C}">
-                <a14:useLocalDpi xmlns:a14="http://schemas.microsoft.com/office/drawing/2010/main" val="0"/>
-              </a:ext>
-            </a:extLst>
-          </a:blip>
-          <a:stretch>
-            <a:fillRect/>
-          </a:stretch>
-        </p:blipFill>
-        <p:spPr>
-          <a:xfrm>
-            <a:off x="5287283" y="2595563"/>
-            <a:ext cx="672194" cy="1008291"/>
-          </a:xfrm>
-          <a:prstGeom prst="rect">
-            <a:avLst/>
-          </a:prstGeom>
-        </p:spPr>
-      </p:pic>
-      <p:pic>
-        <p:nvPicPr>
-          <p:cNvPr id="25" name="Picture 24" descr="15.png"/>
-          <p:cNvPicPr>
-            <a:picLocks noChangeAspect="1"/>
-          </p:cNvPicPr>
-          <p:nvPr/>
-        </p:nvPicPr>
-        <p:blipFill>
-          <a:blip r:embed="rId13">
-            <a:extLst>
-              <a:ext uri="{28A0092B-C50C-407E-A947-70E740481C1C}">
-                <a14:useLocalDpi xmlns:a14="http://schemas.microsoft.com/office/drawing/2010/main" val="0"/>
-              </a:ext>
-            </a:extLst>
-          </a:blip>
-          <a:stretch>
-            <a:fillRect/>
-          </a:stretch>
-        </p:blipFill>
-        <p:spPr>
-          <a:xfrm>
-            <a:off x="6847432" y="2595563"/>
-            <a:ext cx="673945" cy="1010918"/>
-          </a:xfrm>
-          <a:prstGeom prst="rect">
-            <a:avLst/>
-          </a:prstGeom>
-        </p:spPr>
-      </p:pic>
-      <p:pic>
-        <p:nvPicPr>
-          <p:cNvPr id="26" name="Picture 25" descr="14.png"/>
-          <p:cNvPicPr>
-            <a:picLocks noChangeAspect="1"/>
-          </p:cNvPicPr>
-          <p:nvPr/>
-        </p:nvPicPr>
-        <p:blipFill>
-          <a:blip r:embed="rId14">
-            <a:extLst>
-              <a:ext uri="{28A0092B-C50C-407E-A947-70E740481C1C}">
-                <a14:useLocalDpi xmlns:a14="http://schemas.microsoft.com/office/drawing/2010/main" val="0"/>
-              </a:ext>
-            </a:extLst>
-          </a:blip>
-          <a:stretch>
-            <a:fillRect/>
-          </a:stretch>
-        </p:blipFill>
-        <p:spPr>
-          <a:xfrm>
-            <a:off x="6068724" y="3673703"/>
-            <a:ext cx="677424" cy="1016136"/>
-          </a:xfrm>
-          <a:prstGeom prst="rect">
-            <a:avLst/>
-          </a:prstGeom>
-        </p:spPr>
-      </p:pic>
-      <p:pic>
-        <p:nvPicPr>
-          <p:cNvPr id="27" name="Picture 26" descr="20.png"/>
-          <p:cNvPicPr>
-            <a:picLocks noChangeAspect="1"/>
-          </p:cNvPicPr>
-          <p:nvPr/>
-        </p:nvPicPr>
-        <p:blipFill>
-          <a:blip r:embed="rId15">
-            <a:extLst>
-              <a:ext uri="{28A0092B-C50C-407E-A947-70E740481C1C}">
-                <a14:useLocalDpi xmlns:a14="http://schemas.microsoft.com/office/drawing/2010/main" val="0"/>
-              </a:ext>
-            </a:extLst>
-          </a:blip>
-          <a:stretch>
-            <a:fillRect/>
-          </a:stretch>
-        </p:blipFill>
-        <p:spPr>
-          <a:xfrm>
-            <a:off x="6847431" y="3673701"/>
-            <a:ext cx="677425" cy="1016138"/>
-          </a:xfrm>
-          <a:prstGeom prst="rect">
-            <a:avLst/>
-          </a:prstGeom>
-        </p:spPr>
-      </p:pic>
-      <p:pic>
-        <p:nvPicPr>
-          <p:cNvPr id="28" name="Picture 27" descr="25.png"/>
-          <p:cNvPicPr>
-            <a:picLocks noChangeAspect="1"/>
-          </p:cNvPicPr>
-          <p:nvPr/>
-        </p:nvPicPr>
-        <p:blipFill>
-          <a:blip r:embed="rId16">
-            <a:extLst>
-              <a:ext uri="{28A0092B-C50C-407E-A947-70E740481C1C}">
-                <a14:useLocalDpi xmlns:a14="http://schemas.microsoft.com/office/drawing/2010/main" val="0"/>
-              </a:ext>
-            </a:extLst>
-          </a:blip>
-          <a:stretch>
-            <a:fillRect/>
-          </a:stretch>
-        </p:blipFill>
-        <p:spPr>
-          <a:xfrm>
-            <a:off x="5287282" y="3673701"/>
-            <a:ext cx="704023" cy="1056035"/>
-          </a:xfrm>
-          <a:prstGeom prst="rect">
-            <a:avLst/>
-          </a:prstGeom>
-        </p:spPr>
-      </p:pic>
-      <p:pic>
-        <p:nvPicPr>
-          <p:cNvPr id="29" name="Picture 28" descr="22.png"/>
-          <p:cNvPicPr>
-            <a:picLocks noChangeAspect="1"/>
-          </p:cNvPicPr>
-          <p:nvPr/>
-        </p:nvPicPr>
-        <p:blipFill>
-          <a:blip r:embed="rId17">
-            <a:extLst>
-              <a:ext uri="{28A0092B-C50C-407E-A947-70E740481C1C}">
-                <a14:useLocalDpi xmlns:a14="http://schemas.microsoft.com/office/drawing/2010/main" val="0"/>
-              </a:ext>
-            </a:extLst>
-          </a:blip>
-          <a:stretch>
-            <a:fillRect/>
-          </a:stretch>
-        </p:blipFill>
-        <p:spPr>
-          <a:xfrm>
-            <a:off x="5279319" y="4843179"/>
-            <a:ext cx="680157" cy="1020236"/>
-          </a:xfrm>
-          <a:prstGeom prst="rect">
-            <a:avLst/>
-          </a:prstGeom>
-        </p:spPr>
-      </p:pic>
-      <p:pic>
-        <p:nvPicPr>
-          <p:cNvPr id="30" name="Picture 29" descr="23.png"/>
-          <p:cNvPicPr>
-            <a:picLocks noChangeAspect="1"/>
-          </p:cNvPicPr>
-          <p:nvPr/>
-        </p:nvPicPr>
-        <p:blipFill>
-          <a:blip r:embed="rId18">
-            <a:extLst>
-              <a:ext uri="{28A0092B-C50C-407E-A947-70E740481C1C}">
-                <a14:useLocalDpi xmlns:a14="http://schemas.microsoft.com/office/drawing/2010/main" val="0"/>
-              </a:ext>
-            </a:extLst>
-          </a:blip>
-          <a:stretch>
-            <a:fillRect/>
-          </a:stretch>
-        </p:blipFill>
-        <p:spPr>
-          <a:xfrm>
-            <a:off x="6068724" y="4869675"/>
-            <a:ext cx="686360" cy="1029540"/>
-          </a:xfrm>
-          <a:prstGeom prst="rect">
-            <a:avLst/>
-          </a:prstGeom>
-        </p:spPr>
-      </p:pic>
-      <p:pic>
-        <p:nvPicPr>
-          <p:cNvPr id="31" name="Picture 30" descr="26.png"/>
-          <p:cNvPicPr>
-            <a:picLocks noChangeAspect="1"/>
-          </p:cNvPicPr>
-          <p:nvPr/>
-        </p:nvPicPr>
-        <p:blipFill>
-          <a:blip r:embed="rId19">
-            <a:extLst>
-              <a:ext uri="{28A0092B-C50C-407E-A947-70E740481C1C}">
-                <a14:useLocalDpi xmlns:a14="http://schemas.microsoft.com/office/drawing/2010/main" val="0"/>
-              </a:ext>
-            </a:extLst>
-          </a:blip>
-          <a:stretch>
-            <a:fillRect/>
-          </a:stretch>
-        </p:blipFill>
-        <p:spPr>
-          <a:xfrm>
-            <a:off x="6847432" y="4836682"/>
-            <a:ext cx="672194" cy="1008291"/>
-          </a:xfrm>
-          <a:prstGeom prst="rect">
-            <a:avLst/>
-          </a:prstGeom>
-        </p:spPr>
-      </p:pic>
+      <p:sp>
+        <p:nvSpPr>
+          <p:cNvPr id="4" name="Content Placeholder 3"/>
+          <p:cNvSpPr>
+            <a:spLocks noGrp="1"/>
+          </p:cNvSpPr>
+          <p:nvPr>
+            <p:ph sz="half" idx="2"/>
+          </p:nvPr>
+        </p:nvSpPr>
+        <p:spPr/>
+        <p:txBody>
+          <a:bodyPr/>
+          <a:lstStyle/>
+          <a:p>
+            <a:r>
+              <a:rPr lang="en-US" dirty="0" err="1" smtClean="0"/>
+              <a:t>Entrada</a:t>
+            </a:r>
+            <a:r>
+              <a:rPr lang="en-US" dirty="0" smtClean="0"/>
+              <a:t>: 2160</a:t>
+            </a:r>
+          </a:p>
+          <a:p>
+            <a:r>
+              <a:rPr lang="en-US" dirty="0" err="1" smtClean="0"/>
+              <a:t>Épocas</a:t>
+            </a:r>
+            <a:r>
+              <a:rPr lang="en-US" dirty="0" smtClean="0"/>
+              <a:t>: </a:t>
+            </a:r>
+            <a:r>
+              <a:rPr lang="en-US" dirty="0" smtClean="0"/>
+              <a:t>300</a:t>
+            </a:r>
+            <a:endParaRPr lang="en-US" dirty="0" smtClean="0"/>
+          </a:p>
+          <a:p>
+            <a:r>
+              <a:rPr lang="en-US" dirty="0" err="1" smtClean="0"/>
+              <a:t>Camada</a:t>
+            </a:r>
+            <a:r>
+              <a:rPr lang="en-US" dirty="0" smtClean="0"/>
+              <a:t> </a:t>
+            </a:r>
+            <a:r>
+              <a:rPr lang="en-US" dirty="0" err="1" smtClean="0"/>
+              <a:t>Escondida</a:t>
+            </a:r>
+            <a:r>
+              <a:rPr lang="en-US" dirty="0" smtClean="0"/>
+              <a:t>: 40</a:t>
+            </a:r>
+          </a:p>
+          <a:p>
+            <a:r>
+              <a:rPr lang="en-US" dirty="0" smtClean="0"/>
+              <a:t>Performance</a:t>
+            </a:r>
+          </a:p>
+          <a:p>
+            <a:pPr lvl="1"/>
+            <a:r>
+              <a:rPr lang="en-US" dirty="0" err="1" smtClean="0"/>
+              <a:t>Treinamento</a:t>
+            </a:r>
+            <a:r>
+              <a:rPr lang="en-US" dirty="0" smtClean="0"/>
+              <a:t>: 96.03%</a:t>
+            </a:r>
+          </a:p>
+          <a:p>
+            <a:pPr lvl="1"/>
+            <a:r>
+              <a:rPr lang="en-US" dirty="0" smtClean="0"/>
+              <a:t>Testes: 83.6%</a:t>
+            </a:r>
+            <a:endParaRPr lang="en-US" dirty="0"/>
+          </a:p>
+        </p:txBody>
+      </p:sp>
     </p:spTree>
     <p:extLst>
       <p:ext uri="{BB962C8B-B14F-4D97-AF65-F5344CB8AC3E}">
-        <p14:creationId xmlns:p14="http://schemas.microsoft.com/office/powerpoint/2010/main" val="3290367094"/>
+        <p14:creationId xmlns:p14="http://schemas.microsoft.com/office/powerpoint/2010/main" val="1902033235"/>
       </p:ext>
     </p:extLst>
   </p:cSld>
   <p:clrMapOvr>
     <a:masterClrMapping/>
   </p:clrMapOvr>
+  <p:timing>
+    <p:tnLst>
+      <p:par>
+        <p:cTn xmlns:p14="http://schemas.microsoft.com/office/powerpoint/2010/main" id="1" dur="indefinite" restart="never" nodeType="tmRoot"/>
+      </p:par>
+    </p:tnLst>
+  </p:timing>
 </p:sld>
 </file>
 
@@ -6134,90 +5719,29 @@
           <a:p>
             <a:r>
               <a:rPr lang="en-US" dirty="0" err="1" smtClean="0"/>
-              <a:t>Avaliação</a:t>
+              <a:t>Implementa</a:t>
+            </a:r>
+            <a:r>
+              <a:rPr lang="en-US" dirty="0" err="1" smtClean="0"/>
+              <a:t>ção</a:t>
             </a:r>
             <a:r>
               <a:rPr lang="en-US" dirty="0" smtClean="0"/>
-              <a:t> do </a:t>
-            </a:r>
-            <a:r>
-              <a:rPr lang="en-US" dirty="0" err="1" smtClean="0"/>
-              <a:t>Algoritmo</a:t>
-            </a:r>
-            <a:endParaRPr lang="en-US" dirty="0"/>
-          </a:p>
-        </p:txBody>
-      </p:sp>
-      <p:sp>
-        <p:nvSpPr>
-          <p:cNvPr id="5" name="Content Placeholder 4"/>
-          <p:cNvSpPr>
-            <a:spLocks noGrp="1"/>
-          </p:cNvSpPr>
-          <p:nvPr>
-            <p:ph sz="half" idx="2"/>
-          </p:nvPr>
-        </p:nvSpPr>
-        <p:spPr/>
-        <p:txBody>
-          <a:bodyPr/>
-          <a:lstStyle/>
-          <a:p>
-            <a:r>
-              <a:rPr lang="en-US" dirty="0" err="1" smtClean="0"/>
-              <a:t>Bons</a:t>
-            </a:r>
-            <a:r>
-              <a:rPr lang="en-US" dirty="0" smtClean="0"/>
-              <a:t> </a:t>
-            </a:r>
-            <a:r>
-              <a:rPr lang="en-US" dirty="0" err="1" smtClean="0"/>
-              <a:t>resultados</a:t>
-            </a:r>
-            <a:r>
-              <a:rPr lang="en-US" dirty="0" smtClean="0"/>
-              <a:t> com </a:t>
-            </a:r>
-            <a:r>
-              <a:rPr lang="en-US" dirty="0" err="1" smtClean="0"/>
-              <a:t>imagens</a:t>
-            </a:r>
-            <a:r>
-              <a:rPr lang="en-US" dirty="0" smtClean="0"/>
-              <a:t> </a:t>
-            </a:r>
-            <a:r>
-              <a:rPr lang="en-US" dirty="0" err="1" smtClean="0"/>
-              <a:t>frontais</a:t>
-            </a:r>
-            <a:endParaRPr lang="en-US" dirty="0" smtClean="0"/>
-          </a:p>
-          <a:p>
-            <a:r>
-              <a:rPr lang="en-US" dirty="0" err="1" smtClean="0"/>
-              <a:t>Invariante</a:t>
-            </a:r>
-            <a:r>
-              <a:rPr lang="en-US" dirty="0" smtClean="0"/>
-              <a:t> a </a:t>
-            </a:r>
-            <a:r>
-              <a:rPr lang="en-US" dirty="0" err="1" smtClean="0"/>
-              <a:t>Iluminação</a:t>
-            </a:r>
-            <a:endParaRPr lang="en-US" dirty="0" smtClean="0"/>
-          </a:p>
-          <a:p>
+              <a:t> C</a:t>
+            </a:r>
             <a:endParaRPr lang="en-US" dirty="0"/>
           </a:p>
         </p:txBody>
       </p:sp>
       <p:pic>
         <p:nvPicPr>
-          <p:cNvPr id="6" name="Picture 5" descr="Macintosh HD:Users:Mario:Desktop:Screen Shot 2012-05-31 at 10.26.48 PM.png"/>
-          <p:cNvPicPr/>
-          <p:nvPr/>
+          <p:cNvPr id="7" name="Content Placeholder 6" descr="Screen Shot 2012-07-12 at 11.28.32 PM.png"/>
+          <p:cNvPicPr>
+            <a:picLocks noGrp="1" noChangeAspect="1"/>
+          </p:cNvPicPr>
+          <p:nvPr>
+            <p:ph sz="half" idx="1"/>
+          </p:nvPr>
         </p:nvPicPr>
         <p:blipFill>
           <a:blip r:embed="rId2">
@@ -6227,29 +5751,126 @@
               </a:ext>
             </a:extLst>
           </a:blip>
-          <a:srcRect/>
+          <a:srcRect t="-1873" b="-1873"/>
           <a:stretch>
             <a:fillRect/>
           </a:stretch>
         </p:blipFill>
-        <p:spPr bwMode="auto">
-          <a:xfrm>
-            <a:off x="332462" y="2351669"/>
-            <a:ext cx="4285928" cy="4238719"/>
-          </a:xfrm>
-          <a:prstGeom prst="rect">
-            <a:avLst/>
-          </a:prstGeom>
-          <a:noFill/>
-          <a:ln>
-            <a:noFill/>
-          </a:ln>
+        <p:spPr>
+          <a:xfrm>
+            <a:off x="1117600" y="2595563"/>
+            <a:ext cx="3565525" cy="3681412"/>
+          </a:xfrm>
         </p:spPr>
       </p:pic>
+      <p:sp>
+        <p:nvSpPr>
+          <p:cNvPr id="6" name="Content Placeholder 5"/>
+          <p:cNvSpPr>
+            <a:spLocks noGrp="1"/>
+          </p:cNvSpPr>
+          <p:nvPr>
+            <p:ph sz="half" idx="2"/>
+          </p:nvPr>
+        </p:nvSpPr>
+        <p:spPr/>
+        <p:txBody>
+          <a:bodyPr>
+            <a:normAutofit lnSpcReduction="10000"/>
+          </a:bodyPr>
+          <a:lstStyle/>
+          <a:p>
+            <a:r>
+              <a:rPr lang="en-US" dirty="0" err="1"/>
+              <a:t>Entrada</a:t>
+            </a:r>
+            <a:r>
+              <a:rPr lang="en-US" dirty="0"/>
+              <a:t>: 2160</a:t>
+            </a:r>
+          </a:p>
+          <a:p>
+            <a:r>
+              <a:rPr lang="en-US" dirty="0" err="1" smtClean="0"/>
+              <a:t>Épocas</a:t>
+            </a:r>
+            <a:r>
+              <a:rPr lang="en-US" dirty="0" smtClean="0"/>
+              <a:t>: 1000</a:t>
+            </a:r>
+          </a:p>
+          <a:p>
+            <a:r>
+              <a:rPr lang="en-US" dirty="0" err="1" smtClean="0"/>
+              <a:t>Camadas</a:t>
+            </a:r>
+            <a:r>
+              <a:rPr lang="en-US" dirty="0" smtClean="0"/>
+              <a:t> </a:t>
+            </a:r>
+            <a:r>
+              <a:rPr lang="en-US" dirty="0" err="1" smtClean="0"/>
+              <a:t>Escondidas</a:t>
+            </a:r>
+            <a:r>
+              <a:rPr lang="en-US" dirty="0" smtClean="0"/>
+              <a:t>: 30</a:t>
+            </a:r>
+          </a:p>
+          <a:p>
+            <a:r>
+              <a:rPr lang="en-US" dirty="0" smtClean="0"/>
+              <a:t>Taxa de </a:t>
+            </a:r>
+            <a:r>
+              <a:rPr lang="en-US" dirty="0" err="1" smtClean="0"/>
+              <a:t>Aprendizagem</a:t>
+            </a:r>
+            <a:endParaRPr lang="en-US" dirty="0" smtClean="0"/>
+          </a:p>
+          <a:p>
+            <a:pPr lvl="1"/>
+            <a:r>
+              <a:rPr lang="en-US" dirty="0" err="1" smtClean="0"/>
+              <a:t>Ínicio</a:t>
+            </a:r>
+            <a:r>
+              <a:rPr lang="en-US" dirty="0" smtClean="0"/>
+              <a:t>: 0.2</a:t>
+            </a:r>
+          </a:p>
+          <a:p>
+            <a:pPr lvl="1"/>
+            <a:r>
+              <a:rPr lang="en-US" dirty="0" smtClean="0"/>
+              <a:t>Final: 0.01</a:t>
+            </a:r>
+          </a:p>
+          <a:p>
+            <a:r>
+              <a:rPr lang="en-US" dirty="0" err="1" smtClean="0"/>
+              <a:t>Convergência</a:t>
+            </a:r>
+            <a:r>
+              <a:rPr lang="en-US" dirty="0" smtClean="0"/>
+              <a:t>: 0.3</a:t>
+            </a:r>
+          </a:p>
+          <a:p>
+            <a:r>
+              <a:rPr lang="en-US" dirty="0" smtClean="0"/>
+              <a:t>Performance: </a:t>
+            </a:r>
+          </a:p>
+          <a:p>
+            <a:endParaRPr lang="en-US" dirty="0"/>
+          </a:p>
+        </p:txBody>
+      </p:sp>
     </p:spTree>
     <p:extLst>
       <p:ext uri="{BB962C8B-B14F-4D97-AF65-F5344CB8AC3E}">
-        <p14:creationId xmlns:p14="http://schemas.microsoft.com/office/powerpoint/2010/main" val="126260751"/>
+        <p14:creationId xmlns:p14="http://schemas.microsoft.com/office/powerpoint/2010/main" val="4294895447"/>
       </p:ext>
     </p:extLst>
   </p:cSld>
@@ -6278,7 +5899,7 @@
       </p:grpSpPr>
       <p:sp>
         <p:nvSpPr>
-          <p:cNvPr id="2" name="Title 1"/>
+          <p:cNvPr id="5" name="Title 4"/>
           <p:cNvSpPr>
             <a:spLocks noGrp="1"/>
           </p:cNvSpPr>
@@ -6292,16 +5913,16 @@
           <a:lstStyle/>
           <a:p>
             <a:r>
-              <a:rPr lang="en-US" dirty="0" err="1"/>
-              <a:t>Avaliação</a:t>
-            </a:r>
-            <a:r>
-              <a:rPr lang="en-US" dirty="0"/>
+              <a:rPr lang="en-US" dirty="0" err="1" smtClean="0"/>
+              <a:t>Treinamento</a:t>
+            </a:r>
+            <a:r>
+              <a:rPr lang="en-US" dirty="0" smtClean="0"/>
               <a:t> do </a:t>
             </a:r>
             <a:r>
-              <a:rPr lang="en-US" dirty="0" err="1"/>
-              <a:t>Algoritmo</a:t>
+              <a:rPr lang="en-US" dirty="0" smtClean="0"/>
+              <a:t>LVQ</a:t>
             </a:r>
             <a:endParaRPr lang="en-US" dirty="0"/>
           </a:p>
@@ -6309,12 +5930,12 @@
       </p:sp>
       <p:pic>
         <p:nvPicPr>
-          <p:cNvPr id="6" name="Content Placeholder 5" descr="Screen Shot 2012-05-31 at 10.27.31 PM.png"/>
+          <p:cNvPr id="9" name="Content Placeholder 8" descr="Screen Shot 2012-07-12 at 11.33.20 PM.png"/>
           <p:cNvPicPr>
             <a:picLocks noGrp="1" noChangeAspect="1"/>
           </p:cNvPicPr>
           <p:nvPr>
-            <p:ph sz="half" idx="1"/>
+            <p:ph idx="1"/>
           </p:nvPr>
         </p:nvPicPr>
         <p:blipFill>
@@ -6325,87 +5946,17 @@
               </a:ext>
             </a:extLst>
           </a:blip>
-          <a:srcRect t="-14772" b="-14772"/>
+          <a:srcRect t="-20606" b="-20606"/>
           <a:stretch>
             <a:fillRect/>
           </a:stretch>
         </p:blipFill>
-        <p:spPr>
-          <a:xfrm>
-            <a:off x="148449" y="2038256"/>
-            <a:ext cx="4683125" cy="4835336"/>
-          </a:xfrm>
-        </p:spPr>
+        <p:spPr/>
       </p:pic>
-      <p:sp>
-        <p:nvSpPr>
-          <p:cNvPr id="4" name="Content Placeholder 3"/>
-          <p:cNvSpPr>
-            <a:spLocks noGrp="1"/>
-          </p:cNvSpPr>
-          <p:nvPr>
-            <p:ph sz="half" idx="2"/>
-          </p:nvPr>
-        </p:nvSpPr>
-        <p:spPr/>
-        <p:txBody>
-          <a:bodyPr/>
-          <a:lstStyle/>
-          <a:p>
-            <a:r>
-              <a:rPr lang="en-US" dirty="0" err="1" smtClean="0"/>
-              <a:t>Falha</a:t>
-            </a:r>
-            <a:r>
-              <a:rPr lang="en-US" dirty="0" smtClean="0"/>
-              <a:t> com </a:t>
-            </a:r>
-            <a:r>
-              <a:rPr lang="en-US" dirty="0" err="1" smtClean="0"/>
-              <a:t>multiplas</a:t>
-            </a:r>
-            <a:r>
-              <a:rPr lang="en-US" dirty="0" smtClean="0"/>
-              <a:t> poses</a:t>
-            </a:r>
-          </a:p>
-          <a:p>
-            <a:r>
-              <a:rPr lang="en-US" dirty="0" err="1" smtClean="0"/>
-              <a:t>Multiscale</a:t>
-            </a:r>
-            <a:r>
-              <a:rPr lang="en-US" dirty="0" smtClean="0"/>
-              <a:t> </a:t>
-            </a:r>
-            <a:r>
-              <a:rPr lang="en-US" dirty="0" err="1" smtClean="0"/>
-              <a:t>Piramidal</a:t>
-            </a:r>
-            <a:r>
-              <a:rPr lang="en-US" dirty="0" smtClean="0"/>
-              <a:t> </a:t>
-            </a:r>
-            <a:r>
-              <a:rPr lang="en-US" dirty="0" err="1" smtClean="0"/>
-              <a:t>muito</a:t>
-            </a:r>
-            <a:r>
-              <a:rPr lang="en-US" dirty="0" smtClean="0"/>
-              <a:t> </a:t>
-            </a:r>
-            <a:r>
-              <a:rPr lang="en-US" dirty="0" err="1" smtClean="0"/>
-              <a:t>custoso</a:t>
-            </a:r>
-            <a:endParaRPr lang="en-US" dirty="0"/>
-          </a:p>
-        </p:txBody>
-      </p:sp>
     </p:spTree>
     <p:extLst>
       <p:ext uri="{BB962C8B-B14F-4D97-AF65-F5344CB8AC3E}">
-        <p14:creationId xmlns:p14="http://schemas.microsoft.com/office/powerpoint/2010/main" val="1856583825"/>
+        <p14:creationId xmlns:p14="http://schemas.microsoft.com/office/powerpoint/2010/main" val="1208792377"/>
       </p:ext>
     </p:extLst>
   </p:cSld>
@@ -6448,323 +5999,581 @@
           <a:lstStyle/>
           <a:p>
             <a:r>
-              <a:rPr lang="en-US" dirty="0" err="1" smtClean="0"/>
-              <a:t>Referências</a:t>
+              <a:rPr lang="en-US" dirty="0" err="1"/>
+              <a:t>Inicialização</a:t>
+            </a:r>
+            <a:r>
+              <a:rPr lang="en-US" dirty="0"/>
+              <a:t> do </a:t>
+            </a:r>
+            <a:r>
+              <a:rPr lang="en-US" dirty="0" smtClean="0"/>
+              <a:t>LVQ</a:t>
             </a:r>
             <a:endParaRPr lang="en-US" dirty="0"/>
           </a:p>
         </p:txBody>
       </p:sp>
-      <p:sp>
-        <p:nvSpPr>
-          <p:cNvPr id="3" name="Content Placeholder 2"/>
-          <p:cNvSpPr>
-            <a:spLocks noGrp="1"/>
-          </p:cNvSpPr>
+      <p:pic>
+        <p:nvPicPr>
+          <p:cNvPr id="6" name="Content Placeholder 5" descr="Screen Shot 2012-07-12 at 11.40.09 PM.png"/>
+          <p:cNvPicPr>
+            <a:picLocks noGrp="1" noChangeAspect="1"/>
+          </p:cNvPicPr>
           <p:nvPr>
             <p:ph idx="1"/>
           </p:nvPr>
-        </p:nvSpPr>
+        </p:nvPicPr>
+        <p:blipFill>
+          <a:blip r:embed="rId2">
+            <a:extLst>
+              <a:ext uri="{28A0092B-C50C-407E-A947-70E740481C1C}">
+                <a14:useLocalDpi xmlns:a14="http://schemas.microsoft.com/office/drawing/2010/main" val="0"/>
+              </a:ext>
+            </a:extLst>
+          </a:blip>
+          <a:srcRect l="-4801" r="-4801"/>
+          <a:stretch>
+            <a:fillRect/>
+          </a:stretch>
+        </p:blipFill>
         <p:spPr/>
-        <p:txBody>
-          <a:bodyPr>
-            <a:normAutofit fontScale="70000" lnSpcReduction="20000"/>
-          </a:bodyPr>
-          <a:lstStyle/>
-          <a:p>
-            <a:pPr lvl="0"/>
-            <a:r>
-              <a:rPr lang="en-US" dirty="0" err="1"/>
-              <a:t>Matlab</a:t>
-            </a:r>
-            <a:r>
-              <a:rPr lang="en-US" dirty="0"/>
-              <a:t> Trial Software (http://</a:t>
-            </a:r>
-            <a:r>
-              <a:rPr lang="en-US" dirty="0" err="1"/>
-              <a:t>www.mathworks.com</a:t>
-            </a:r>
-            <a:r>
-              <a:rPr lang="en-US" dirty="0"/>
-              <a:t>/products/</a:t>
-            </a:r>
-            <a:r>
-              <a:rPr lang="en-US" dirty="0" err="1"/>
-              <a:t>matlab</a:t>
-            </a:r>
-            <a:r>
-              <a:rPr lang="en-US" dirty="0"/>
-              <a:t>/). </a:t>
-            </a:r>
-            <a:endParaRPr lang="en-US" dirty="0" smtClean="0"/>
-          </a:p>
-          <a:p>
-            <a:r>
-              <a:rPr lang="en-US" dirty="0"/>
-              <a:t>Learning Vector Quantization (http://</a:t>
-            </a:r>
-            <a:r>
-              <a:rPr lang="en-US" dirty="0" err="1"/>
-              <a:t>en.wikipedia.org</a:t>
-            </a:r>
-            <a:r>
-              <a:rPr lang="en-US" dirty="0"/>
-              <a:t>/wiki/</a:t>
-            </a:r>
-            <a:r>
-              <a:rPr lang="en-US" dirty="0" err="1"/>
-              <a:t>Learning_Vector_Quantization</a:t>
-            </a:r>
-            <a:r>
-              <a:rPr lang="en-US" dirty="0"/>
-              <a:t>)</a:t>
-            </a:r>
-          </a:p>
-          <a:p>
-            <a:r>
-              <a:rPr lang="en-US" dirty="0" err="1"/>
-              <a:t>Neide</a:t>
-            </a:r>
-            <a:r>
-              <a:rPr lang="en-US" dirty="0"/>
-              <a:t> </a:t>
-            </a:r>
-            <a:r>
-              <a:rPr lang="en-US" dirty="0" err="1"/>
-              <a:t>Pizzolato</a:t>
-            </a:r>
-            <a:r>
-              <a:rPr lang="en-US" dirty="0"/>
-              <a:t> Angelo, </a:t>
-            </a:r>
-            <a:r>
-              <a:rPr lang="en-US" i="1" dirty="0" err="1"/>
-              <a:t>Aplicação</a:t>
-            </a:r>
-            <a:r>
-              <a:rPr lang="en-US" i="1" dirty="0"/>
-              <a:t> de </a:t>
-            </a:r>
-            <a:r>
-              <a:rPr lang="en-US" i="1" dirty="0" err="1"/>
-              <a:t>Filtros</a:t>
-            </a:r>
-            <a:r>
-              <a:rPr lang="en-US" i="1" dirty="0"/>
-              <a:t> de Gabor no </a:t>
-            </a:r>
-            <a:r>
-              <a:rPr lang="en-US" i="1" dirty="0" err="1"/>
-              <a:t>Processo</a:t>
-            </a:r>
-            <a:r>
-              <a:rPr lang="en-US" i="1" dirty="0"/>
-              <a:t> de </a:t>
-            </a:r>
-            <a:r>
-              <a:rPr lang="en-US" i="1" dirty="0" err="1"/>
-              <a:t>Classificação</a:t>
-            </a:r>
-            <a:r>
-              <a:rPr lang="en-US" i="1" dirty="0"/>
-              <a:t> de </a:t>
-            </a:r>
-            <a:r>
-              <a:rPr lang="en-US" i="1" dirty="0" err="1"/>
-              <a:t>Imagens</a:t>
-            </a:r>
-            <a:r>
-              <a:rPr lang="en-US" i="1" dirty="0"/>
-              <a:t> </a:t>
-            </a:r>
-            <a:r>
-              <a:rPr lang="en-US" i="1" dirty="0" err="1"/>
-              <a:t>Digitais</a:t>
-            </a:r>
-            <a:r>
-              <a:rPr lang="en-US" i="1" dirty="0"/>
-              <a:t> com Base </a:t>
-            </a:r>
-            <a:r>
-              <a:rPr lang="en-US" i="1" dirty="0" err="1"/>
-              <a:t>em</a:t>
-            </a:r>
-            <a:r>
-              <a:rPr lang="en-US" i="1" dirty="0"/>
-              <a:t> </a:t>
-            </a:r>
-            <a:r>
-              <a:rPr lang="en-US" i="1" dirty="0" err="1"/>
-              <a:t>Atributos</a:t>
-            </a:r>
-            <a:r>
-              <a:rPr lang="en-US" i="1" dirty="0"/>
-              <a:t> de </a:t>
-            </a:r>
-            <a:r>
-              <a:rPr lang="en-US" i="1" dirty="0" err="1"/>
-              <a:t>Textura</a:t>
-            </a:r>
-            <a:r>
-              <a:rPr lang="en-US" dirty="0"/>
-              <a:t>, Porto </a:t>
-            </a:r>
-            <a:r>
-              <a:rPr lang="en-US" dirty="0" err="1"/>
-              <a:t>Alegre</a:t>
-            </a:r>
-            <a:r>
-              <a:rPr lang="en-US" dirty="0"/>
-              <a:t>, </a:t>
-            </a:r>
-            <a:r>
-              <a:rPr lang="en-US" dirty="0" err="1"/>
-              <a:t>Brasil</a:t>
-            </a:r>
-            <a:endParaRPr lang="en-US" dirty="0"/>
-          </a:p>
-          <a:p>
-            <a:r>
-              <a:rPr lang="en-US" dirty="0" err="1"/>
-              <a:t>Yasuo</a:t>
-            </a:r>
-            <a:r>
-              <a:rPr lang="en-US" dirty="0"/>
-              <a:t> </a:t>
-            </a:r>
-            <a:r>
-              <a:rPr lang="en-US" dirty="0" err="1"/>
-              <a:t>Kono</a:t>
-            </a:r>
-            <a:r>
-              <a:rPr lang="en-US" dirty="0"/>
-              <a:t>, José </a:t>
-            </a:r>
-            <a:r>
-              <a:rPr lang="en-US" dirty="0" err="1"/>
-              <a:t>Demiso</a:t>
-            </a:r>
-            <a:r>
-              <a:rPr lang="en-US" dirty="0"/>
-              <a:t> </a:t>
-            </a:r>
-            <a:r>
-              <a:rPr lang="en-US" dirty="0" err="1"/>
-              <a:t>Simões</a:t>
-            </a:r>
-            <a:r>
-              <a:rPr lang="en-US" dirty="0"/>
-              <a:t>, Rafael Duarte.  </a:t>
-            </a:r>
-            <a:r>
-              <a:rPr lang="en-US" i="1" dirty="0" err="1"/>
-              <a:t>Utilização</a:t>
-            </a:r>
-            <a:r>
-              <a:rPr lang="en-US" i="1" dirty="0"/>
-              <a:t> de </a:t>
-            </a:r>
-            <a:r>
-              <a:rPr lang="en-US" i="1" dirty="0" err="1"/>
-              <a:t>Rede</a:t>
-            </a:r>
-            <a:r>
-              <a:rPr lang="en-US" i="1" dirty="0"/>
-              <a:t> </a:t>
-            </a:r>
-            <a:r>
-              <a:rPr lang="en-US" i="1" dirty="0" err="1"/>
-              <a:t>Neual</a:t>
-            </a:r>
-            <a:r>
-              <a:rPr lang="en-US" i="1" dirty="0"/>
-              <a:t> Para </a:t>
-            </a:r>
-            <a:r>
-              <a:rPr lang="en-US" i="1" dirty="0" err="1"/>
-              <a:t>Previsão</a:t>
-            </a:r>
-            <a:r>
-              <a:rPr lang="en-US" i="1" dirty="0"/>
-              <a:t> do </a:t>
-            </a:r>
-            <a:r>
-              <a:rPr lang="en-US" i="1" dirty="0" err="1"/>
-              <a:t>Nível</a:t>
-            </a:r>
-            <a:r>
-              <a:rPr lang="en-US" i="1" dirty="0"/>
-              <a:t> do Rio </a:t>
-            </a:r>
-            <a:r>
-              <a:rPr lang="en-US" i="1" dirty="0" err="1"/>
-              <a:t>Paraguai</a:t>
-            </a:r>
-            <a:r>
-              <a:rPr lang="en-US" dirty="0"/>
-              <a:t>. São José dos Campos, </a:t>
-            </a:r>
-            <a:r>
-              <a:rPr lang="en-US" dirty="0" err="1"/>
-              <a:t>Brasil</a:t>
-            </a:r>
-            <a:endParaRPr lang="en-US" dirty="0"/>
-          </a:p>
-          <a:p>
-            <a:r>
-              <a:rPr lang="en-US" dirty="0"/>
-              <a:t>Department of Informatics and Mathematical Modeling. The IMM Face Database (</a:t>
-            </a:r>
-            <a:r>
-              <a:rPr lang="en-US" u="sng" dirty="0">
-                <a:hlinkClick r:id="rId2"/>
-              </a:rPr>
-              <a:t>http://www2.imm.dtu.dk/~aam/</a:t>
-            </a:r>
-            <a:r>
-              <a:rPr lang="en-US" dirty="0" smtClean="0"/>
-              <a:t>)</a:t>
-            </a:r>
-          </a:p>
-          <a:p>
-            <a:pPr lvl="0"/>
-            <a:r>
-              <a:rPr lang="en-US" dirty="0"/>
-              <a:t>Image </a:t>
-            </a:r>
-            <a:r>
-              <a:rPr lang="en-US" dirty="0" err="1"/>
-              <a:t>Magick</a:t>
-            </a:r>
-            <a:r>
-              <a:rPr lang="en-US" dirty="0"/>
-              <a:t> (</a:t>
-            </a:r>
-            <a:r>
-              <a:rPr lang="en-US" u="sng" dirty="0">
-                <a:hlinkClick r:id="rId3"/>
-              </a:rPr>
-              <a:t>http://www.imagemagick.org/script/index.php</a:t>
-            </a:r>
-            <a:r>
-              <a:rPr lang="en-US" dirty="0"/>
-              <a:t>)</a:t>
-            </a:r>
-          </a:p>
-          <a:p>
-            <a:endParaRPr lang="en-US" dirty="0"/>
-          </a:p>
-          <a:p>
-            <a:pPr lvl="0"/>
-            <a:endParaRPr lang="en-US" dirty="0"/>
-          </a:p>
-        </p:txBody>
-      </p:sp>
+      </p:pic>
     </p:spTree>
     <p:extLst>
       <p:ext uri="{BB962C8B-B14F-4D97-AF65-F5344CB8AC3E}">
-        <p14:creationId xmlns:p14="http://schemas.microsoft.com/office/powerpoint/2010/main" val="1474489034"/>
+        <p14:creationId xmlns:p14="http://schemas.microsoft.com/office/powerpoint/2010/main" val="2682626563"/>
+      </p:ext>
+    </p:extLst>
+  </p:cSld>
+  <p:clrMapOvr>
+    <a:masterClrMapping/>
+  </p:clrMapOvr>
+</p:sld>
+</file>
+
+<file path=ppt/slides/slide14.xml><?xml version="1.0" encoding="utf-8"?>
+<p:sld xmlns:a="http://schemas.openxmlformats.org/drawingml/2006/main" xmlns:r="http://schemas.openxmlformats.org/officeDocument/2006/relationships" xmlns:p="http://schemas.openxmlformats.org/presentationml/2006/main">
+  <p:cSld>
+    <p:spTree>
+      <p:nvGrpSpPr>
+        <p:cNvPr id="1" name=""/>
+        <p:cNvGrpSpPr/>
+        <p:nvPr/>
+      </p:nvGrpSpPr>
+      <p:grpSpPr>
+        <a:xfrm>
+          <a:off x="0" y="0"/>
+          <a:ext cx="0" cy="0"/>
+          <a:chOff x="0" y="0"/>
+          <a:chExt cx="0" cy="0"/>
+        </a:xfrm>
+      </p:grpSpPr>
+      <p:sp>
+        <p:nvSpPr>
+          <p:cNvPr id="2" name="Title 1"/>
+          <p:cNvSpPr>
+            <a:spLocks noGrp="1"/>
+          </p:cNvSpPr>
+          <p:nvPr>
+            <p:ph type="title"/>
+          </p:nvPr>
+        </p:nvSpPr>
+        <p:spPr/>
+        <p:txBody>
+          <a:bodyPr/>
+          <a:lstStyle/>
+          <a:p>
+            <a:r>
+              <a:rPr lang="en-US" dirty="0" err="1"/>
+              <a:t>Inicialização</a:t>
+            </a:r>
+            <a:r>
+              <a:rPr lang="en-US" dirty="0"/>
+              <a:t> do </a:t>
+            </a:r>
+            <a:r>
+              <a:rPr lang="en-US" dirty="0" smtClean="0"/>
+              <a:t>LVQ</a:t>
+            </a:r>
+            <a:endParaRPr lang="en-US" dirty="0"/>
+          </a:p>
+        </p:txBody>
+      </p:sp>
+      <p:pic>
+        <p:nvPicPr>
+          <p:cNvPr id="4" name="Content Placeholder 3" descr="Screen Shot 2012-07-12 at 11.44.39 PM.png"/>
+          <p:cNvPicPr>
+            <a:picLocks noGrp="1" noChangeAspect="1"/>
+          </p:cNvPicPr>
+          <p:nvPr>
+            <p:ph idx="1"/>
+          </p:nvPr>
+        </p:nvPicPr>
+        <p:blipFill>
+          <a:blip r:embed="rId2">
+            <a:extLst>
+              <a:ext uri="{28A0092B-C50C-407E-A947-70E740481C1C}">
+                <a14:useLocalDpi xmlns:a14="http://schemas.microsoft.com/office/drawing/2010/main" val="0"/>
+              </a:ext>
+            </a:extLst>
+          </a:blip>
+          <a:srcRect l="-27881" r="-27881"/>
+          <a:stretch>
+            <a:fillRect/>
+          </a:stretch>
+        </p:blipFill>
+        <p:spPr>
+          <a:xfrm>
+            <a:off x="1114424" y="2142223"/>
+            <a:ext cx="7610476" cy="4476861"/>
+          </a:xfrm>
+        </p:spPr>
+      </p:pic>
+    </p:spTree>
+    <p:extLst>
+      <p:ext uri="{BB962C8B-B14F-4D97-AF65-F5344CB8AC3E}">
+        <p14:creationId xmlns:p14="http://schemas.microsoft.com/office/powerpoint/2010/main" val="1578632949"/>
+      </p:ext>
+    </p:extLst>
+  </p:cSld>
+  <p:clrMapOvr>
+    <a:masterClrMapping/>
+  </p:clrMapOvr>
+</p:sld>
+</file>
+
+<file path=ppt/slides/slide15.xml><?xml version="1.0" encoding="utf-8"?>
+<p:sld xmlns:a="http://schemas.openxmlformats.org/drawingml/2006/main" xmlns:r="http://schemas.openxmlformats.org/officeDocument/2006/relationships" xmlns:p="http://schemas.openxmlformats.org/presentationml/2006/main">
+  <p:cSld>
+    <p:spTree>
+      <p:nvGrpSpPr>
+        <p:cNvPr id="1" name=""/>
+        <p:cNvGrpSpPr/>
+        <p:nvPr/>
+      </p:nvGrpSpPr>
+      <p:grpSpPr>
+        <a:xfrm>
+          <a:off x="0" y="0"/>
+          <a:ext cx="0" cy="0"/>
+          <a:chOff x="0" y="0"/>
+          <a:chExt cx="0" cy="0"/>
+        </a:xfrm>
+      </p:grpSpPr>
+      <p:sp>
+        <p:nvSpPr>
+          <p:cNvPr id="2" name="Title 1"/>
+          <p:cNvSpPr>
+            <a:spLocks noGrp="1"/>
+          </p:cNvSpPr>
+          <p:nvPr>
+            <p:ph type="title"/>
+          </p:nvPr>
+        </p:nvSpPr>
+        <p:spPr/>
+        <p:txBody>
+          <a:bodyPr/>
+          <a:lstStyle/>
+          <a:p>
+            <a:r>
+              <a:rPr lang="en-US" dirty="0" err="1" smtClean="0"/>
+              <a:t>Inicializa</a:t>
+            </a:r>
+            <a:r>
+              <a:rPr lang="en-US" dirty="0" err="1" smtClean="0"/>
+              <a:t>ção</a:t>
+            </a:r>
+            <a:r>
+              <a:rPr lang="en-US" dirty="0" smtClean="0"/>
+              <a:t> do </a:t>
+            </a:r>
+            <a:r>
+              <a:rPr lang="en-US" dirty="0" smtClean="0"/>
+              <a:t>LVQ</a:t>
+            </a:r>
+            <a:endParaRPr lang="en-US" dirty="0"/>
+          </a:p>
+        </p:txBody>
+      </p:sp>
+      <p:pic>
+        <p:nvPicPr>
+          <p:cNvPr id="5" name="Content Placeholder 4" descr="Screen Shot 2012-07-12 at 11.46.15 PM.png"/>
+          <p:cNvPicPr>
+            <a:picLocks noGrp="1" noChangeAspect="1"/>
+          </p:cNvPicPr>
+          <p:nvPr>
+            <p:ph idx="1"/>
+          </p:nvPr>
+        </p:nvPicPr>
+        <p:blipFill>
+          <a:blip r:embed="rId2">
+            <a:extLst>
+              <a:ext uri="{28A0092B-C50C-407E-A947-70E740481C1C}">
+                <a14:useLocalDpi xmlns:a14="http://schemas.microsoft.com/office/drawing/2010/main" val="0"/>
+              </a:ext>
+            </a:extLst>
+          </a:blip>
+          <a:srcRect l="-2864" r="-2864"/>
+          <a:stretch>
+            <a:fillRect/>
+          </a:stretch>
+        </p:blipFill>
+        <p:spPr>
+          <a:xfrm>
+            <a:off x="1114424" y="2193534"/>
+            <a:ext cx="7610476" cy="4374240"/>
+          </a:xfrm>
+        </p:spPr>
+      </p:pic>
+    </p:spTree>
+    <p:extLst>
+      <p:ext uri="{BB962C8B-B14F-4D97-AF65-F5344CB8AC3E}">
+        <p14:creationId xmlns:p14="http://schemas.microsoft.com/office/powerpoint/2010/main" val="311323214"/>
+      </p:ext>
+    </p:extLst>
+  </p:cSld>
+  <p:clrMapOvr>
+    <a:masterClrMapping/>
+  </p:clrMapOvr>
+</p:sld>
+</file>
+
+<file path=ppt/slides/slide16.xml><?xml version="1.0" encoding="utf-8"?>
+<p:sld xmlns:a="http://schemas.openxmlformats.org/drawingml/2006/main" xmlns:r="http://schemas.openxmlformats.org/officeDocument/2006/relationships" xmlns:p="http://schemas.openxmlformats.org/presentationml/2006/main">
+  <p:cSld>
+    <p:spTree>
+      <p:nvGrpSpPr>
+        <p:cNvPr id="1" name=""/>
+        <p:cNvGrpSpPr/>
+        <p:nvPr/>
+      </p:nvGrpSpPr>
+      <p:grpSpPr>
+        <a:xfrm>
+          <a:off x="0" y="0"/>
+          <a:ext cx="0" cy="0"/>
+          <a:chOff x="0" y="0"/>
+          <a:chExt cx="0" cy="0"/>
+        </a:xfrm>
+      </p:grpSpPr>
+      <p:sp>
+        <p:nvSpPr>
+          <p:cNvPr id="2" name="Title 1"/>
+          <p:cNvSpPr>
+            <a:spLocks noGrp="1"/>
+          </p:cNvSpPr>
+          <p:nvPr>
+            <p:ph type="title"/>
+          </p:nvPr>
+        </p:nvSpPr>
+        <p:spPr/>
+        <p:txBody>
+          <a:bodyPr/>
+          <a:lstStyle/>
+          <a:p>
+            <a:r>
+              <a:rPr lang="en-US" dirty="0" err="1" smtClean="0"/>
+              <a:t>Treinameto</a:t>
+            </a:r>
+            <a:r>
+              <a:rPr lang="en-US" dirty="0" smtClean="0"/>
+              <a:t> do LVQ</a:t>
+            </a:r>
+            <a:endParaRPr lang="en-US" dirty="0"/>
+          </a:p>
+        </p:txBody>
+      </p:sp>
+      <p:pic>
+        <p:nvPicPr>
+          <p:cNvPr id="4" name="Content Placeholder 3" descr="Screen Shot 2012-07-12 at 11.48.38 PM.png"/>
+          <p:cNvPicPr>
+            <a:picLocks noGrp="1" noChangeAspect="1"/>
+          </p:cNvPicPr>
+          <p:nvPr>
+            <p:ph idx="1"/>
+          </p:nvPr>
+        </p:nvPicPr>
+        <p:blipFill>
+          <a:blip r:embed="rId2">
+            <a:extLst>
+              <a:ext uri="{28A0092B-C50C-407E-A947-70E740481C1C}">
+                <a14:useLocalDpi xmlns:a14="http://schemas.microsoft.com/office/drawing/2010/main" val="0"/>
+              </a:ext>
+            </a:extLst>
+          </a:blip>
+          <a:srcRect l="-4391" r="-4391"/>
+          <a:stretch>
+            <a:fillRect/>
+          </a:stretch>
+        </p:blipFill>
+        <p:spPr>
+          <a:xfrm>
+            <a:off x="1114424" y="2038256"/>
+            <a:ext cx="7610476" cy="4619311"/>
+          </a:xfrm>
+        </p:spPr>
+      </p:pic>
+    </p:spTree>
+    <p:extLst>
+      <p:ext uri="{BB962C8B-B14F-4D97-AF65-F5344CB8AC3E}">
+        <p14:creationId xmlns:p14="http://schemas.microsoft.com/office/powerpoint/2010/main" val="2696381677"/>
+      </p:ext>
+    </p:extLst>
+  </p:cSld>
+  <p:clrMapOvr>
+    <a:masterClrMapping/>
+  </p:clrMapOvr>
+</p:sld>
+</file>
+
+<file path=ppt/slides/slide17.xml><?xml version="1.0" encoding="utf-8"?>
+<p:sld xmlns:a="http://schemas.openxmlformats.org/drawingml/2006/main" xmlns:r="http://schemas.openxmlformats.org/officeDocument/2006/relationships" xmlns:p="http://schemas.openxmlformats.org/presentationml/2006/main">
+  <p:cSld>
+    <p:spTree>
+      <p:nvGrpSpPr>
+        <p:cNvPr id="1" name=""/>
+        <p:cNvGrpSpPr/>
+        <p:nvPr/>
+      </p:nvGrpSpPr>
+      <p:grpSpPr>
+        <a:xfrm>
+          <a:off x="0" y="0"/>
+          <a:ext cx="0" cy="0"/>
+          <a:chOff x="0" y="0"/>
+          <a:chExt cx="0" cy="0"/>
+        </a:xfrm>
+      </p:grpSpPr>
+      <p:sp>
+        <p:nvSpPr>
+          <p:cNvPr id="2" name="Title 1"/>
+          <p:cNvSpPr>
+            <a:spLocks noGrp="1"/>
+          </p:cNvSpPr>
+          <p:nvPr>
+            <p:ph type="title"/>
+          </p:nvPr>
+        </p:nvSpPr>
+        <p:spPr/>
+        <p:txBody>
+          <a:bodyPr/>
+          <a:lstStyle/>
+          <a:p>
+            <a:r>
+              <a:rPr lang="en-US" dirty="0" err="1"/>
+              <a:t>Treinameto</a:t>
+            </a:r>
+            <a:r>
+              <a:rPr lang="en-US" dirty="0"/>
+              <a:t> do LVQ</a:t>
+            </a:r>
+          </a:p>
+        </p:txBody>
+      </p:sp>
+      <p:pic>
+        <p:nvPicPr>
+          <p:cNvPr id="4" name="Content Placeholder 3" descr="Screen Shot 2012-07-12 at 11.49.25 PM.png"/>
+          <p:cNvPicPr>
+            <a:picLocks noGrp="1" noChangeAspect="1"/>
+          </p:cNvPicPr>
+          <p:nvPr>
+            <p:ph idx="1"/>
+          </p:nvPr>
+        </p:nvPicPr>
+        <p:blipFill>
+          <a:blip r:embed="rId2">
+            <a:extLst>
+              <a:ext uri="{28A0092B-C50C-407E-A947-70E740481C1C}">
+                <a14:useLocalDpi xmlns:a14="http://schemas.microsoft.com/office/drawing/2010/main" val="0"/>
+              </a:ext>
+            </a:extLst>
+          </a:blip>
+          <a:srcRect l="-13850" r="-13850"/>
+          <a:stretch>
+            <a:fillRect/>
+          </a:stretch>
+        </p:blipFill>
+        <p:spPr>
+          <a:xfrm>
+            <a:off x="1114424" y="2038256"/>
+            <a:ext cx="7610476" cy="4632139"/>
+          </a:xfrm>
+        </p:spPr>
+      </p:pic>
+    </p:spTree>
+    <p:extLst>
+      <p:ext uri="{BB962C8B-B14F-4D97-AF65-F5344CB8AC3E}">
+        <p14:creationId xmlns:p14="http://schemas.microsoft.com/office/powerpoint/2010/main" val="3395460155"/>
+      </p:ext>
+    </p:extLst>
+  </p:cSld>
+  <p:clrMapOvr>
+    <a:masterClrMapping/>
+  </p:clrMapOvr>
+</p:sld>
+</file>
+
+<file path=ppt/slides/slide18.xml><?xml version="1.0" encoding="utf-8"?>
+<p:sld xmlns:a="http://schemas.openxmlformats.org/drawingml/2006/main" xmlns:r="http://schemas.openxmlformats.org/officeDocument/2006/relationships" xmlns:p="http://schemas.openxmlformats.org/presentationml/2006/main">
+  <p:cSld>
+    <p:spTree>
+      <p:nvGrpSpPr>
+        <p:cNvPr id="1" name=""/>
+        <p:cNvGrpSpPr/>
+        <p:nvPr/>
+      </p:nvGrpSpPr>
+      <p:grpSpPr>
+        <a:xfrm>
+          <a:off x="0" y="0"/>
+          <a:ext cx="0" cy="0"/>
+          <a:chOff x="0" y="0"/>
+          <a:chExt cx="0" cy="0"/>
+        </a:xfrm>
+      </p:grpSpPr>
+      <p:sp>
+        <p:nvSpPr>
+          <p:cNvPr id="2" name="Title 1"/>
+          <p:cNvSpPr>
+            <a:spLocks noGrp="1"/>
+          </p:cNvSpPr>
+          <p:nvPr>
+            <p:ph type="title"/>
+          </p:nvPr>
+        </p:nvSpPr>
+        <p:spPr/>
+        <p:txBody>
+          <a:bodyPr/>
+          <a:lstStyle/>
+          <a:p>
+            <a:r>
+              <a:rPr lang="en-US" dirty="0" err="1"/>
+              <a:t>Treinameto</a:t>
+            </a:r>
+            <a:r>
+              <a:rPr lang="en-US" dirty="0"/>
+              <a:t> do LVQ</a:t>
+            </a:r>
+          </a:p>
+        </p:txBody>
+      </p:sp>
+      <p:pic>
+        <p:nvPicPr>
+          <p:cNvPr id="4" name="Content Placeholder 3" descr="Screen Shot 2012-07-12 at 11.50.12 PM.png"/>
+          <p:cNvPicPr>
+            <a:picLocks noGrp="1" noChangeAspect="1"/>
+          </p:cNvPicPr>
+          <p:nvPr>
+            <p:ph idx="1"/>
+          </p:nvPr>
+        </p:nvPicPr>
+        <p:blipFill>
+          <a:blip r:embed="rId2">
+            <a:extLst>
+              <a:ext uri="{28A0092B-C50C-407E-A947-70E740481C1C}">
+                <a14:useLocalDpi xmlns:a14="http://schemas.microsoft.com/office/drawing/2010/main" val="0"/>
+              </a:ext>
+            </a:extLst>
+          </a:blip>
+          <a:srcRect t="-29241" b="-29241"/>
+          <a:stretch>
+            <a:fillRect/>
+          </a:stretch>
+        </p:blipFill>
+        <p:spPr>
+          <a:xfrm>
+            <a:off x="1114424" y="2038256"/>
+            <a:ext cx="7610476" cy="4580828"/>
+          </a:xfrm>
+        </p:spPr>
+      </p:pic>
+    </p:spTree>
+    <p:extLst>
+      <p:ext uri="{BB962C8B-B14F-4D97-AF65-F5344CB8AC3E}">
+        <p14:creationId xmlns:p14="http://schemas.microsoft.com/office/powerpoint/2010/main" val="3503064792"/>
+      </p:ext>
+    </p:extLst>
+  </p:cSld>
+  <p:clrMapOvr>
+    <a:masterClrMapping/>
+  </p:clrMapOvr>
+</p:sld>
+</file>
+
+<file path=ppt/slides/slide19.xml><?xml version="1.0" encoding="utf-8"?>
+<p:sld xmlns:a="http://schemas.openxmlformats.org/drawingml/2006/main" xmlns:r="http://schemas.openxmlformats.org/officeDocument/2006/relationships" xmlns:p="http://schemas.openxmlformats.org/presentationml/2006/main">
+  <p:cSld>
+    <p:spTree>
+      <p:nvGrpSpPr>
+        <p:cNvPr id="1" name=""/>
+        <p:cNvGrpSpPr/>
+        <p:nvPr/>
+      </p:nvGrpSpPr>
+      <p:grpSpPr>
+        <a:xfrm>
+          <a:off x="0" y="0"/>
+          <a:ext cx="0" cy="0"/>
+          <a:chOff x="0" y="0"/>
+          <a:chExt cx="0" cy="0"/>
+        </a:xfrm>
+      </p:grpSpPr>
+      <p:sp>
+        <p:nvSpPr>
+          <p:cNvPr id="2" name="Title 1"/>
+          <p:cNvSpPr>
+            <a:spLocks noGrp="1"/>
+          </p:cNvSpPr>
+          <p:nvPr>
+            <p:ph type="title"/>
+          </p:nvPr>
+        </p:nvSpPr>
+        <p:spPr/>
+        <p:txBody>
+          <a:bodyPr/>
+          <a:lstStyle/>
+          <a:p>
+            <a:r>
+              <a:rPr lang="en-US" dirty="0" err="1"/>
+              <a:t>Treinameto</a:t>
+            </a:r>
+            <a:r>
+              <a:rPr lang="en-US" dirty="0"/>
+              <a:t> do LVQ</a:t>
+            </a:r>
+          </a:p>
+        </p:txBody>
+      </p:sp>
+      <p:pic>
+        <p:nvPicPr>
+          <p:cNvPr id="4" name="Content Placeholder 3" descr="Screen Shot 2012-07-12 at 11.51.18 PM.png"/>
+          <p:cNvPicPr>
+            <a:picLocks noGrp="1" noChangeAspect="1"/>
+          </p:cNvPicPr>
+          <p:nvPr>
+            <p:ph idx="1"/>
+          </p:nvPr>
+        </p:nvPicPr>
+        <p:blipFill>
+          <a:blip r:embed="rId2">
+            <a:extLst>
+              <a:ext uri="{28A0092B-C50C-407E-A947-70E740481C1C}">
+                <a14:useLocalDpi xmlns:a14="http://schemas.microsoft.com/office/drawing/2010/main" val="0"/>
+              </a:ext>
+            </a:extLst>
+          </a:blip>
+          <a:srcRect t="-440" b="-440"/>
+          <a:stretch>
+            <a:fillRect/>
+          </a:stretch>
+        </p:blipFill>
+        <p:spPr>
+          <a:xfrm>
+            <a:off x="1114424" y="2038256"/>
+            <a:ext cx="7610476" cy="4619311"/>
+          </a:xfrm>
+        </p:spPr>
+      </p:pic>
+    </p:spTree>
+    <p:extLst>
+      <p:ext uri="{BB962C8B-B14F-4D97-AF65-F5344CB8AC3E}">
+        <p14:creationId xmlns:p14="http://schemas.microsoft.com/office/powerpoint/2010/main" val="3170423507"/>
       </p:ext>
     </p:extLst>
   </p:cSld>
@@ -7037,6 +6846,1367 @@
 </p:sld>
 </file>
 
+<file path=ppt/slides/slide20.xml><?xml version="1.0" encoding="utf-8"?>
+<p:sld xmlns:a="http://schemas.openxmlformats.org/drawingml/2006/main" xmlns:r="http://schemas.openxmlformats.org/officeDocument/2006/relationships" xmlns:p="http://schemas.openxmlformats.org/presentationml/2006/main">
+  <p:cSld>
+    <p:spTree>
+      <p:nvGrpSpPr>
+        <p:cNvPr id="1" name=""/>
+        <p:cNvGrpSpPr/>
+        <p:nvPr/>
+      </p:nvGrpSpPr>
+      <p:grpSpPr>
+        <a:xfrm>
+          <a:off x="0" y="0"/>
+          <a:ext cx="0" cy="0"/>
+          <a:chOff x="0" y="0"/>
+          <a:chExt cx="0" cy="0"/>
+        </a:xfrm>
+      </p:grpSpPr>
+      <p:sp>
+        <p:nvSpPr>
+          <p:cNvPr id="2" name="Title 1"/>
+          <p:cNvSpPr>
+            <a:spLocks noGrp="1"/>
+          </p:cNvSpPr>
+          <p:nvPr>
+            <p:ph type="title"/>
+          </p:nvPr>
+        </p:nvSpPr>
+        <p:spPr/>
+        <p:txBody>
+          <a:bodyPr/>
+          <a:lstStyle/>
+          <a:p>
+            <a:r>
+              <a:rPr lang="en-US" dirty="0" smtClean="0"/>
+              <a:t>Testes do LVQ</a:t>
+            </a:r>
+            <a:endParaRPr lang="en-US" dirty="0"/>
+          </a:p>
+        </p:txBody>
+      </p:sp>
+      <p:pic>
+        <p:nvPicPr>
+          <p:cNvPr id="4" name="Content Placeholder 3" descr="Screen Shot 2012-07-12 at 11.51.52 PM.png"/>
+          <p:cNvPicPr>
+            <a:picLocks noGrp="1" noChangeAspect="1"/>
+          </p:cNvPicPr>
+          <p:nvPr>
+            <p:ph idx="1"/>
+          </p:nvPr>
+        </p:nvPicPr>
+        <p:blipFill>
+          <a:blip r:embed="rId2">
+            <a:extLst>
+              <a:ext uri="{28A0092B-C50C-407E-A947-70E740481C1C}">
+                <a14:useLocalDpi xmlns:a14="http://schemas.microsoft.com/office/drawing/2010/main" val="0"/>
+              </a:ext>
+            </a:extLst>
+          </a:blip>
+          <a:srcRect l="-9576" r="-9576"/>
+          <a:stretch>
+            <a:fillRect/>
+          </a:stretch>
+        </p:blipFill>
+        <p:spPr>
+          <a:xfrm>
+            <a:off x="1114424" y="2038256"/>
+            <a:ext cx="7610476" cy="4401241"/>
+          </a:xfrm>
+        </p:spPr>
+      </p:pic>
+    </p:spTree>
+    <p:extLst>
+      <p:ext uri="{BB962C8B-B14F-4D97-AF65-F5344CB8AC3E}">
+        <p14:creationId xmlns:p14="http://schemas.microsoft.com/office/powerpoint/2010/main" val="2163541549"/>
+      </p:ext>
+    </p:extLst>
+  </p:cSld>
+  <p:clrMapOvr>
+    <a:masterClrMapping/>
+  </p:clrMapOvr>
+</p:sld>
+</file>
+
+<file path=ppt/slides/slide21.xml><?xml version="1.0" encoding="utf-8"?>
+<p:sld xmlns:a="http://schemas.openxmlformats.org/drawingml/2006/main" xmlns:r="http://schemas.openxmlformats.org/officeDocument/2006/relationships" xmlns:p="http://schemas.openxmlformats.org/presentationml/2006/main">
+  <p:cSld>
+    <p:spTree>
+      <p:nvGrpSpPr>
+        <p:cNvPr id="1" name=""/>
+        <p:cNvGrpSpPr/>
+        <p:nvPr/>
+      </p:nvGrpSpPr>
+      <p:grpSpPr>
+        <a:xfrm>
+          <a:off x="0" y="0"/>
+          <a:ext cx="0" cy="0"/>
+          <a:chOff x="0" y="0"/>
+          <a:chExt cx="0" cy="0"/>
+        </a:xfrm>
+      </p:grpSpPr>
+      <p:sp>
+        <p:nvSpPr>
+          <p:cNvPr id="2" name="Title 1"/>
+          <p:cNvSpPr>
+            <a:spLocks noGrp="1"/>
+          </p:cNvSpPr>
+          <p:nvPr>
+            <p:ph type="title"/>
+          </p:nvPr>
+        </p:nvSpPr>
+        <p:spPr/>
+        <p:txBody>
+          <a:bodyPr/>
+          <a:lstStyle/>
+          <a:p>
+            <a:r>
+              <a:rPr lang="en-US" dirty="0" smtClean="0"/>
+              <a:t>Base de </a:t>
+            </a:r>
+            <a:r>
+              <a:rPr lang="en-US" dirty="0" err="1" smtClean="0"/>
+              <a:t>Treinamento</a:t>
+            </a:r>
+            <a:endParaRPr lang="en-US" dirty="0"/>
+          </a:p>
+        </p:txBody>
+      </p:sp>
+      <p:pic>
+        <p:nvPicPr>
+          <p:cNvPr id="13" name="Picture 12" descr="7.png"/>
+          <p:cNvPicPr>
+            <a:picLocks noChangeAspect="1"/>
+          </p:cNvPicPr>
+          <p:nvPr/>
+        </p:nvPicPr>
+        <p:blipFill>
+          <a:blip r:embed="rId2">
+            <a:extLst>
+              <a:ext uri="{28A0092B-C50C-407E-A947-70E740481C1C}">
+                <a14:useLocalDpi xmlns:a14="http://schemas.microsoft.com/office/drawing/2010/main" val="0"/>
+              </a:ext>
+            </a:extLst>
+          </a:blip>
+          <a:stretch>
+            <a:fillRect/>
+          </a:stretch>
+        </p:blipFill>
+        <p:spPr>
+          <a:xfrm>
+            <a:off x="2365068" y="2595562"/>
+            <a:ext cx="672194" cy="1008291"/>
+          </a:xfrm>
+          <a:prstGeom prst="rect">
+            <a:avLst/>
+          </a:prstGeom>
+        </p:spPr>
+      </p:pic>
+      <p:pic>
+        <p:nvPicPr>
+          <p:cNvPr id="14" name="Picture 13" descr="8.png"/>
+          <p:cNvPicPr>
+            <a:picLocks noChangeAspect="1"/>
+          </p:cNvPicPr>
+          <p:nvPr/>
+        </p:nvPicPr>
+        <p:blipFill>
+          <a:blip r:embed="rId3">
+            <a:extLst>
+              <a:ext uri="{28A0092B-C50C-407E-A947-70E740481C1C}">
+                <a14:useLocalDpi xmlns:a14="http://schemas.microsoft.com/office/drawing/2010/main" val="0"/>
+              </a:ext>
+            </a:extLst>
+          </a:blip>
+          <a:stretch>
+            <a:fillRect/>
+          </a:stretch>
+        </p:blipFill>
+        <p:spPr>
+          <a:xfrm>
+            <a:off x="1611564" y="2595563"/>
+            <a:ext cx="672193" cy="1008290"/>
+          </a:xfrm>
+          <a:prstGeom prst="rect">
+            <a:avLst/>
+          </a:prstGeom>
+        </p:spPr>
+      </p:pic>
+      <p:pic>
+        <p:nvPicPr>
+          <p:cNvPr id="15" name="Picture 14" descr="14.png"/>
+          <p:cNvPicPr>
+            <a:picLocks noChangeAspect="1"/>
+          </p:cNvPicPr>
+          <p:nvPr/>
+        </p:nvPicPr>
+        <p:blipFill>
+          <a:blip r:embed="rId4">
+            <a:extLst>
+              <a:ext uri="{28A0092B-C50C-407E-A947-70E740481C1C}">
+                <a14:useLocalDpi xmlns:a14="http://schemas.microsoft.com/office/drawing/2010/main" val="0"/>
+              </a:ext>
+            </a:extLst>
+          </a:blip>
+          <a:stretch>
+            <a:fillRect/>
+          </a:stretch>
+        </p:blipFill>
+        <p:spPr>
+          <a:xfrm>
+            <a:off x="2333238" y="3673702"/>
+            <a:ext cx="704023" cy="1056035"/>
+          </a:xfrm>
+          <a:prstGeom prst="rect">
+            <a:avLst/>
+          </a:prstGeom>
+        </p:spPr>
+      </p:pic>
+      <p:pic>
+        <p:nvPicPr>
+          <p:cNvPr id="16" name="Picture 15" descr="23.png"/>
+          <p:cNvPicPr>
+            <a:picLocks noChangeAspect="1"/>
+          </p:cNvPicPr>
+          <p:nvPr/>
+        </p:nvPicPr>
+        <p:blipFill>
+          <a:blip r:embed="rId5">
+            <a:extLst>
+              <a:ext uri="{28A0092B-C50C-407E-A947-70E740481C1C}">
+                <a14:useLocalDpi xmlns:a14="http://schemas.microsoft.com/office/drawing/2010/main" val="0"/>
+              </a:ext>
+            </a:extLst>
+          </a:blip>
+          <a:stretch>
+            <a:fillRect/>
+          </a:stretch>
+        </p:blipFill>
+        <p:spPr>
+          <a:xfrm>
+            <a:off x="3118572" y="3673703"/>
+            <a:ext cx="704023" cy="1056034"/>
+          </a:xfrm>
+          <a:prstGeom prst="rect">
+            <a:avLst/>
+          </a:prstGeom>
+        </p:spPr>
+      </p:pic>
+      <p:pic>
+        <p:nvPicPr>
+          <p:cNvPr id="17" name="Picture 16" descr="27.png"/>
+          <p:cNvPicPr>
+            <a:picLocks noChangeAspect="1"/>
+          </p:cNvPicPr>
+          <p:nvPr/>
+        </p:nvPicPr>
+        <p:blipFill>
+          <a:blip r:embed="rId6">
+            <a:extLst>
+              <a:ext uri="{28A0092B-C50C-407E-A947-70E740481C1C}">
+                <a14:useLocalDpi xmlns:a14="http://schemas.microsoft.com/office/drawing/2010/main" val="0"/>
+              </a:ext>
+            </a:extLst>
+          </a:blip>
+          <a:stretch>
+            <a:fillRect/>
+          </a:stretch>
+        </p:blipFill>
+        <p:spPr>
+          <a:xfrm>
+            <a:off x="1576585" y="3673703"/>
+            <a:ext cx="704020" cy="1056034"/>
+          </a:xfrm>
+          <a:prstGeom prst="rect">
+            <a:avLst/>
+          </a:prstGeom>
+        </p:spPr>
+      </p:pic>
+      <p:pic>
+        <p:nvPicPr>
+          <p:cNvPr id="18" name="Picture 17" descr="4.png"/>
+          <p:cNvPicPr>
+            <a:picLocks noChangeAspect="1"/>
+          </p:cNvPicPr>
+          <p:nvPr/>
+        </p:nvPicPr>
+        <p:blipFill>
+          <a:blip r:embed="rId7">
+            <a:extLst>
+              <a:ext uri="{28A0092B-C50C-407E-A947-70E740481C1C}">
+                <a14:useLocalDpi xmlns:a14="http://schemas.microsoft.com/office/drawing/2010/main" val="0"/>
+              </a:ext>
+            </a:extLst>
+          </a:blip>
+          <a:stretch>
+            <a:fillRect/>
+          </a:stretch>
+        </p:blipFill>
+        <p:spPr>
+          <a:xfrm>
+            <a:off x="3118573" y="2595563"/>
+            <a:ext cx="672193" cy="1008290"/>
+          </a:xfrm>
+          <a:prstGeom prst="rect">
+            <a:avLst/>
+          </a:prstGeom>
+        </p:spPr>
+      </p:pic>
+      <p:pic>
+        <p:nvPicPr>
+          <p:cNvPr id="20" name="Picture 19" descr="47.png"/>
+          <p:cNvPicPr>
+            <a:picLocks noChangeAspect="1"/>
+          </p:cNvPicPr>
+          <p:nvPr/>
+        </p:nvPicPr>
+        <p:blipFill>
+          <a:blip r:embed="rId8">
+            <a:extLst>
+              <a:ext uri="{28A0092B-C50C-407E-A947-70E740481C1C}">
+                <a14:useLocalDpi xmlns:a14="http://schemas.microsoft.com/office/drawing/2010/main" val="0"/>
+              </a:ext>
+            </a:extLst>
+          </a:blip>
+          <a:stretch>
+            <a:fillRect/>
+          </a:stretch>
+        </p:blipFill>
+        <p:spPr>
+          <a:xfrm>
+            <a:off x="1576585" y="4836684"/>
+            <a:ext cx="704020" cy="1056030"/>
+          </a:xfrm>
+          <a:prstGeom prst="rect">
+            <a:avLst/>
+          </a:prstGeom>
+        </p:spPr>
+      </p:pic>
+      <p:pic>
+        <p:nvPicPr>
+          <p:cNvPr id="21" name="Picture 20" descr="44.png"/>
+          <p:cNvPicPr>
+            <a:picLocks noChangeAspect="1"/>
+          </p:cNvPicPr>
+          <p:nvPr/>
+        </p:nvPicPr>
+        <p:blipFill>
+          <a:blip r:embed="rId9">
+            <a:extLst>
+              <a:ext uri="{28A0092B-C50C-407E-A947-70E740481C1C}">
+                <a14:useLocalDpi xmlns:a14="http://schemas.microsoft.com/office/drawing/2010/main" val="0"/>
+              </a:ext>
+            </a:extLst>
+          </a:blip>
+          <a:stretch>
+            <a:fillRect/>
+          </a:stretch>
+        </p:blipFill>
+        <p:spPr>
+          <a:xfrm>
+            <a:off x="2333238" y="4843179"/>
+            <a:ext cx="704024" cy="1056036"/>
+          </a:xfrm>
+          <a:prstGeom prst="rect">
+            <a:avLst/>
+          </a:prstGeom>
+        </p:spPr>
+      </p:pic>
+      <p:pic>
+        <p:nvPicPr>
+          <p:cNvPr id="22" name="Picture 21" descr="42.png"/>
+          <p:cNvPicPr>
+            <a:picLocks noChangeAspect="1"/>
+          </p:cNvPicPr>
+          <p:nvPr/>
+        </p:nvPicPr>
+        <p:blipFill>
+          <a:blip r:embed="rId10">
+            <a:extLst>
+              <a:ext uri="{28A0092B-C50C-407E-A947-70E740481C1C}">
+                <a14:useLocalDpi xmlns:a14="http://schemas.microsoft.com/office/drawing/2010/main" val="0"/>
+              </a:ext>
+            </a:extLst>
+          </a:blip>
+          <a:stretch>
+            <a:fillRect/>
+          </a:stretch>
+        </p:blipFill>
+        <p:spPr>
+          <a:xfrm>
+            <a:off x="3118572" y="4836683"/>
+            <a:ext cx="672194" cy="1008291"/>
+          </a:xfrm>
+          <a:prstGeom prst="rect">
+            <a:avLst/>
+          </a:prstGeom>
+        </p:spPr>
+      </p:pic>
+      <p:pic>
+        <p:nvPicPr>
+          <p:cNvPr id="23" name="Picture 22" descr="5.png"/>
+          <p:cNvPicPr>
+            <a:picLocks noChangeAspect="1"/>
+          </p:cNvPicPr>
+          <p:nvPr/>
+        </p:nvPicPr>
+        <p:blipFill>
+          <a:blip r:embed="rId11">
+            <a:extLst>
+              <a:ext uri="{28A0092B-C50C-407E-A947-70E740481C1C}">
+                <a14:useLocalDpi xmlns:a14="http://schemas.microsoft.com/office/drawing/2010/main" val="0"/>
+              </a:ext>
+            </a:extLst>
+          </a:blip>
+          <a:stretch>
+            <a:fillRect/>
+          </a:stretch>
+        </p:blipFill>
+        <p:spPr>
+          <a:xfrm>
+            <a:off x="6068724" y="2595561"/>
+            <a:ext cx="677424" cy="1016137"/>
+          </a:xfrm>
+          <a:prstGeom prst="rect">
+            <a:avLst/>
+          </a:prstGeom>
+        </p:spPr>
+      </p:pic>
+      <p:pic>
+        <p:nvPicPr>
+          <p:cNvPr id="24" name="Picture 23" descr="10.png"/>
+          <p:cNvPicPr>
+            <a:picLocks noChangeAspect="1"/>
+          </p:cNvPicPr>
+          <p:nvPr/>
+        </p:nvPicPr>
+        <p:blipFill>
+          <a:blip r:embed="rId12">
+            <a:extLst>
+              <a:ext uri="{28A0092B-C50C-407E-A947-70E740481C1C}">
+                <a14:useLocalDpi xmlns:a14="http://schemas.microsoft.com/office/drawing/2010/main" val="0"/>
+              </a:ext>
+            </a:extLst>
+          </a:blip>
+          <a:stretch>
+            <a:fillRect/>
+          </a:stretch>
+        </p:blipFill>
+        <p:spPr>
+          <a:xfrm>
+            <a:off x="5287283" y="2595563"/>
+            <a:ext cx="672194" cy="1008291"/>
+          </a:xfrm>
+          <a:prstGeom prst="rect">
+            <a:avLst/>
+          </a:prstGeom>
+        </p:spPr>
+      </p:pic>
+      <p:pic>
+        <p:nvPicPr>
+          <p:cNvPr id="25" name="Picture 24" descr="15.png"/>
+          <p:cNvPicPr>
+            <a:picLocks noChangeAspect="1"/>
+          </p:cNvPicPr>
+          <p:nvPr/>
+        </p:nvPicPr>
+        <p:blipFill>
+          <a:blip r:embed="rId13">
+            <a:extLst>
+              <a:ext uri="{28A0092B-C50C-407E-A947-70E740481C1C}">
+                <a14:useLocalDpi xmlns:a14="http://schemas.microsoft.com/office/drawing/2010/main" val="0"/>
+              </a:ext>
+            </a:extLst>
+          </a:blip>
+          <a:stretch>
+            <a:fillRect/>
+          </a:stretch>
+        </p:blipFill>
+        <p:spPr>
+          <a:xfrm>
+            <a:off x="6847432" y="2595563"/>
+            <a:ext cx="673945" cy="1010918"/>
+          </a:xfrm>
+          <a:prstGeom prst="rect">
+            <a:avLst/>
+          </a:prstGeom>
+        </p:spPr>
+      </p:pic>
+      <p:pic>
+        <p:nvPicPr>
+          <p:cNvPr id="26" name="Picture 25" descr="14.png"/>
+          <p:cNvPicPr>
+            <a:picLocks noChangeAspect="1"/>
+          </p:cNvPicPr>
+          <p:nvPr/>
+        </p:nvPicPr>
+        <p:blipFill>
+          <a:blip r:embed="rId14">
+            <a:extLst>
+              <a:ext uri="{28A0092B-C50C-407E-A947-70E740481C1C}">
+                <a14:useLocalDpi xmlns:a14="http://schemas.microsoft.com/office/drawing/2010/main" val="0"/>
+              </a:ext>
+            </a:extLst>
+          </a:blip>
+          <a:stretch>
+            <a:fillRect/>
+          </a:stretch>
+        </p:blipFill>
+        <p:spPr>
+          <a:xfrm>
+            <a:off x="6068724" y="3673703"/>
+            <a:ext cx="677424" cy="1016136"/>
+          </a:xfrm>
+          <a:prstGeom prst="rect">
+            <a:avLst/>
+          </a:prstGeom>
+        </p:spPr>
+      </p:pic>
+      <p:pic>
+        <p:nvPicPr>
+          <p:cNvPr id="27" name="Picture 26" descr="20.png"/>
+          <p:cNvPicPr>
+            <a:picLocks noChangeAspect="1"/>
+          </p:cNvPicPr>
+          <p:nvPr/>
+        </p:nvPicPr>
+        <p:blipFill>
+          <a:blip r:embed="rId15">
+            <a:extLst>
+              <a:ext uri="{28A0092B-C50C-407E-A947-70E740481C1C}">
+                <a14:useLocalDpi xmlns:a14="http://schemas.microsoft.com/office/drawing/2010/main" val="0"/>
+              </a:ext>
+            </a:extLst>
+          </a:blip>
+          <a:stretch>
+            <a:fillRect/>
+          </a:stretch>
+        </p:blipFill>
+        <p:spPr>
+          <a:xfrm>
+            <a:off x="6847431" y="3673701"/>
+            <a:ext cx="677425" cy="1016138"/>
+          </a:xfrm>
+          <a:prstGeom prst="rect">
+            <a:avLst/>
+          </a:prstGeom>
+        </p:spPr>
+      </p:pic>
+      <p:pic>
+        <p:nvPicPr>
+          <p:cNvPr id="28" name="Picture 27" descr="25.png"/>
+          <p:cNvPicPr>
+            <a:picLocks noChangeAspect="1"/>
+          </p:cNvPicPr>
+          <p:nvPr/>
+        </p:nvPicPr>
+        <p:blipFill>
+          <a:blip r:embed="rId16">
+            <a:extLst>
+              <a:ext uri="{28A0092B-C50C-407E-A947-70E740481C1C}">
+                <a14:useLocalDpi xmlns:a14="http://schemas.microsoft.com/office/drawing/2010/main" val="0"/>
+              </a:ext>
+            </a:extLst>
+          </a:blip>
+          <a:stretch>
+            <a:fillRect/>
+          </a:stretch>
+        </p:blipFill>
+        <p:spPr>
+          <a:xfrm>
+            <a:off x="5287282" y="3673701"/>
+            <a:ext cx="704023" cy="1056035"/>
+          </a:xfrm>
+          <a:prstGeom prst="rect">
+            <a:avLst/>
+          </a:prstGeom>
+        </p:spPr>
+      </p:pic>
+      <p:pic>
+        <p:nvPicPr>
+          <p:cNvPr id="29" name="Picture 28" descr="22.png"/>
+          <p:cNvPicPr>
+            <a:picLocks noChangeAspect="1"/>
+          </p:cNvPicPr>
+          <p:nvPr/>
+        </p:nvPicPr>
+        <p:blipFill>
+          <a:blip r:embed="rId17">
+            <a:extLst>
+              <a:ext uri="{28A0092B-C50C-407E-A947-70E740481C1C}">
+                <a14:useLocalDpi xmlns:a14="http://schemas.microsoft.com/office/drawing/2010/main" val="0"/>
+              </a:ext>
+            </a:extLst>
+          </a:blip>
+          <a:stretch>
+            <a:fillRect/>
+          </a:stretch>
+        </p:blipFill>
+        <p:spPr>
+          <a:xfrm>
+            <a:off x="5279319" y="4843179"/>
+            <a:ext cx="680157" cy="1020236"/>
+          </a:xfrm>
+          <a:prstGeom prst="rect">
+            <a:avLst/>
+          </a:prstGeom>
+        </p:spPr>
+      </p:pic>
+      <p:pic>
+        <p:nvPicPr>
+          <p:cNvPr id="30" name="Picture 29" descr="23.png"/>
+          <p:cNvPicPr>
+            <a:picLocks noChangeAspect="1"/>
+          </p:cNvPicPr>
+          <p:nvPr/>
+        </p:nvPicPr>
+        <p:blipFill>
+          <a:blip r:embed="rId18">
+            <a:extLst>
+              <a:ext uri="{28A0092B-C50C-407E-A947-70E740481C1C}">
+                <a14:useLocalDpi xmlns:a14="http://schemas.microsoft.com/office/drawing/2010/main" val="0"/>
+              </a:ext>
+            </a:extLst>
+          </a:blip>
+          <a:stretch>
+            <a:fillRect/>
+          </a:stretch>
+        </p:blipFill>
+        <p:spPr>
+          <a:xfrm>
+            <a:off x="6068724" y="4869675"/>
+            <a:ext cx="686360" cy="1029540"/>
+          </a:xfrm>
+          <a:prstGeom prst="rect">
+            <a:avLst/>
+          </a:prstGeom>
+        </p:spPr>
+      </p:pic>
+      <p:pic>
+        <p:nvPicPr>
+          <p:cNvPr id="31" name="Picture 30" descr="26.png"/>
+          <p:cNvPicPr>
+            <a:picLocks noChangeAspect="1"/>
+          </p:cNvPicPr>
+          <p:nvPr/>
+        </p:nvPicPr>
+        <p:blipFill>
+          <a:blip r:embed="rId19">
+            <a:extLst>
+              <a:ext uri="{28A0092B-C50C-407E-A947-70E740481C1C}">
+                <a14:useLocalDpi xmlns:a14="http://schemas.microsoft.com/office/drawing/2010/main" val="0"/>
+              </a:ext>
+            </a:extLst>
+          </a:blip>
+          <a:stretch>
+            <a:fillRect/>
+          </a:stretch>
+        </p:blipFill>
+        <p:spPr>
+          <a:xfrm>
+            <a:off x="6847432" y="4836682"/>
+            <a:ext cx="672194" cy="1008291"/>
+          </a:xfrm>
+          <a:prstGeom prst="rect">
+            <a:avLst/>
+          </a:prstGeom>
+        </p:spPr>
+      </p:pic>
+    </p:spTree>
+    <p:extLst>
+      <p:ext uri="{BB962C8B-B14F-4D97-AF65-F5344CB8AC3E}">
+        <p14:creationId xmlns:p14="http://schemas.microsoft.com/office/powerpoint/2010/main" val="3290367094"/>
+      </p:ext>
+    </p:extLst>
+  </p:cSld>
+  <p:clrMapOvr>
+    <a:masterClrMapping/>
+  </p:clrMapOvr>
+  <p:timing>
+    <p:tnLst>
+      <p:par>
+        <p:cTn xmlns:p14="http://schemas.microsoft.com/office/powerpoint/2010/main" id="1" dur="indefinite" restart="never" nodeType="tmRoot"/>
+      </p:par>
+    </p:tnLst>
+  </p:timing>
+</p:sld>
+</file>
+
+<file path=ppt/slides/slide22.xml><?xml version="1.0" encoding="utf-8"?>
+<p:sld xmlns:a="http://schemas.openxmlformats.org/drawingml/2006/main" xmlns:r="http://schemas.openxmlformats.org/officeDocument/2006/relationships" xmlns:p="http://schemas.openxmlformats.org/presentationml/2006/main">
+  <p:cSld>
+    <p:spTree>
+      <p:nvGrpSpPr>
+        <p:cNvPr id="1" name=""/>
+        <p:cNvGrpSpPr/>
+        <p:nvPr/>
+      </p:nvGrpSpPr>
+      <p:grpSpPr>
+        <a:xfrm>
+          <a:off x="0" y="0"/>
+          <a:ext cx="0" cy="0"/>
+          <a:chOff x="0" y="0"/>
+          <a:chExt cx="0" cy="0"/>
+        </a:xfrm>
+      </p:grpSpPr>
+      <p:sp>
+        <p:nvSpPr>
+          <p:cNvPr id="2" name="Title 1"/>
+          <p:cNvSpPr>
+            <a:spLocks noGrp="1"/>
+          </p:cNvSpPr>
+          <p:nvPr>
+            <p:ph type="title"/>
+          </p:nvPr>
+        </p:nvSpPr>
+        <p:spPr/>
+        <p:txBody>
+          <a:bodyPr/>
+          <a:lstStyle/>
+          <a:p>
+            <a:r>
+              <a:rPr lang="en-US" dirty="0" err="1" smtClean="0"/>
+              <a:t>Avaliação</a:t>
+            </a:r>
+            <a:r>
+              <a:rPr lang="en-US" dirty="0" smtClean="0"/>
+              <a:t> do </a:t>
+            </a:r>
+            <a:r>
+              <a:rPr lang="en-US" dirty="0" err="1" smtClean="0"/>
+              <a:t>Algoritmo</a:t>
+            </a:r>
+            <a:endParaRPr lang="en-US" dirty="0"/>
+          </a:p>
+        </p:txBody>
+      </p:sp>
+      <p:sp>
+        <p:nvSpPr>
+          <p:cNvPr id="5" name="Content Placeholder 4"/>
+          <p:cNvSpPr>
+            <a:spLocks noGrp="1"/>
+          </p:cNvSpPr>
+          <p:nvPr>
+            <p:ph sz="half" idx="2"/>
+          </p:nvPr>
+        </p:nvSpPr>
+        <p:spPr/>
+        <p:txBody>
+          <a:bodyPr/>
+          <a:lstStyle/>
+          <a:p>
+            <a:r>
+              <a:rPr lang="en-US" dirty="0" err="1" smtClean="0"/>
+              <a:t>Bons</a:t>
+            </a:r>
+            <a:r>
+              <a:rPr lang="en-US" dirty="0" smtClean="0"/>
+              <a:t> </a:t>
+            </a:r>
+            <a:r>
+              <a:rPr lang="en-US" dirty="0" err="1" smtClean="0"/>
+              <a:t>resultados</a:t>
+            </a:r>
+            <a:r>
+              <a:rPr lang="en-US" dirty="0" smtClean="0"/>
+              <a:t> com </a:t>
+            </a:r>
+            <a:r>
+              <a:rPr lang="en-US" dirty="0" err="1" smtClean="0"/>
+              <a:t>imagens</a:t>
+            </a:r>
+            <a:r>
+              <a:rPr lang="en-US" dirty="0" smtClean="0"/>
+              <a:t> </a:t>
+            </a:r>
+            <a:r>
+              <a:rPr lang="en-US" dirty="0" err="1" smtClean="0"/>
+              <a:t>frontais</a:t>
+            </a:r>
+            <a:endParaRPr lang="en-US" dirty="0" smtClean="0"/>
+          </a:p>
+          <a:p>
+            <a:r>
+              <a:rPr lang="en-US" dirty="0" err="1" smtClean="0"/>
+              <a:t>Invariante</a:t>
+            </a:r>
+            <a:r>
+              <a:rPr lang="en-US" dirty="0" smtClean="0"/>
+              <a:t> a </a:t>
+            </a:r>
+            <a:r>
+              <a:rPr lang="en-US" dirty="0" err="1" smtClean="0"/>
+              <a:t>Iluminação</a:t>
+            </a:r>
+            <a:endParaRPr lang="en-US" dirty="0" smtClean="0"/>
+          </a:p>
+          <a:p>
+            <a:endParaRPr lang="en-US" dirty="0"/>
+          </a:p>
+        </p:txBody>
+      </p:sp>
+      <p:pic>
+        <p:nvPicPr>
+          <p:cNvPr id="6" name="Picture 5" descr="Macintosh HD:Users:Mario:Desktop:Screen Shot 2012-05-31 at 10.26.48 PM.png"/>
+          <p:cNvPicPr/>
+          <p:nvPr/>
+        </p:nvPicPr>
+        <p:blipFill>
+          <a:blip r:embed="rId2">
+            <a:extLst>
+              <a:ext uri="{28A0092B-C50C-407E-A947-70E740481C1C}">
+                <a14:useLocalDpi xmlns:a14="http://schemas.microsoft.com/office/drawing/2010/main" val="0"/>
+              </a:ext>
+            </a:extLst>
+          </a:blip>
+          <a:srcRect/>
+          <a:stretch>
+            <a:fillRect/>
+          </a:stretch>
+        </p:blipFill>
+        <p:spPr bwMode="auto">
+          <a:xfrm>
+            <a:off x="332462" y="2351669"/>
+            <a:ext cx="4285928" cy="4238719"/>
+          </a:xfrm>
+          <a:prstGeom prst="rect">
+            <a:avLst/>
+          </a:prstGeom>
+          <a:noFill/>
+          <a:ln>
+            <a:noFill/>
+          </a:ln>
+        </p:spPr>
+      </p:pic>
+    </p:spTree>
+    <p:extLst>
+      <p:ext uri="{BB962C8B-B14F-4D97-AF65-F5344CB8AC3E}">
+        <p14:creationId xmlns:p14="http://schemas.microsoft.com/office/powerpoint/2010/main" val="126260751"/>
+      </p:ext>
+    </p:extLst>
+  </p:cSld>
+  <p:clrMapOvr>
+    <a:masterClrMapping/>
+  </p:clrMapOvr>
+</p:sld>
+</file>
+
+<file path=ppt/slides/slide23.xml><?xml version="1.0" encoding="utf-8"?>
+<p:sld xmlns:a="http://schemas.openxmlformats.org/drawingml/2006/main" xmlns:r="http://schemas.openxmlformats.org/officeDocument/2006/relationships" xmlns:p="http://schemas.openxmlformats.org/presentationml/2006/main">
+  <p:cSld>
+    <p:spTree>
+      <p:nvGrpSpPr>
+        <p:cNvPr id="1" name=""/>
+        <p:cNvGrpSpPr/>
+        <p:nvPr/>
+      </p:nvGrpSpPr>
+      <p:grpSpPr>
+        <a:xfrm>
+          <a:off x="0" y="0"/>
+          <a:ext cx="0" cy="0"/>
+          <a:chOff x="0" y="0"/>
+          <a:chExt cx="0" cy="0"/>
+        </a:xfrm>
+      </p:grpSpPr>
+      <p:sp>
+        <p:nvSpPr>
+          <p:cNvPr id="2" name="Title 1"/>
+          <p:cNvSpPr>
+            <a:spLocks noGrp="1"/>
+          </p:cNvSpPr>
+          <p:nvPr>
+            <p:ph type="title"/>
+          </p:nvPr>
+        </p:nvSpPr>
+        <p:spPr/>
+        <p:txBody>
+          <a:bodyPr/>
+          <a:lstStyle/>
+          <a:p>
+            <a:r>
+              <a:rPr lang="en-US" dirty="0" err="1"/>
+              <a:t>Avaliação</a:t>
+            </a:r>
+            <a:r>
+              <a:rPr lang="en-US" dirty="0"/>
+              <a:t> do </a:t>
+            </a:r>
+            <a:r>
+              <a:rPr lang="en-US" dirty="0" err="1"/>
+              <a:t>Algoritmo</a:t>
+            </a:r>
+            <a:endParaRPr lang="en-US" dirty="0"/>
+          </a:p>
+        </p:txBody>
+      </p:sp>
+      <p:pic>
+        <p:nvPicPr>
+          <p:cNvPr id="6" name="Content Placeholder 5" descr="Screen Shot 2012-05-31 at 10.27.31 PM.png"/>
+          <p:cNvPicPr>
+            <a:picLocks noGrp="1" noChangeAspect="1"/>
+          </p:cNvPicPr>
+          <p:nvPr>
+            <p:ph sz="half" idx="1"/>
+          </p:nvPr>
+        </p:nvPicPr>
+        <p:blipFill>
+          <a:blip r:embed="rId2">
+            <a:extLst>
+              <a:ext uri="{28A0092B-C50C-407E-A947-70E740481C1C}">
+                <a14:useLocalDpi xmlns:a14="http://schemas.microsoft.com/office/drawing/2010/main" val="0"/>
+              </a:ext>
+            </a:extLst>
+          </a:blip>
+          <a:srcRect t="-14772" b="-14772"/>
+          <a:stretch>
+            <a:fillRect/>
+          </a:stretch>
+        </p:blipFill>
+        <p:spPr>
+          <a:xfrm>
+            <a:off x="148449" y="2038256"/>
+            <a:ext cx="4683125" cy="4835336"/>
+          </a:xfrm>
+        </p:spPr>
+      </p:pic>
+      <p:sp>
+        <p:nvSpPr>
+          <p:cNvPr id="4" name="Content Placeholder 3"/>
+          <p:cNvSpPr>
+            <a:spLocks noGrp="1"/>
+          </p:cNvSpPr>
+          <p:nvPr>
+            <p:ph sz="half" idx="2"/>
+          </p:nvPr>
+        </p:nvSpPr>
+        <p:spPr/>
+        <p:txBody>
+          <a:bodyPr/>
+          <a:lstStyle/>
+          <a:p>
+            <a:r>
+              <a:rPr lang="en-US" dirty="0" err="1" smtClean="0"/>
+              <a:t>Falha</a:t>
+            </a:r>
+            <a:r>
+              <a:rPr lang="en-US" dirty="0" smtClean="0"/>
+              <a:t> com </a:t>
+            </a:r>
+            <a:r>
+              <a:rPr lang="en-US" dirty="0" err="1" smtClean="0"/>
+              <a:t>multiplas</a:t>
+            </a:r>
+            <a:r>
+              <a:rPr lang="en-US" dirty="0" smtClean="0"/>
+              <a:t> poses</a:t>
+            </a:r>
+          </a:p>
+          <a:p>
+            <a:r>
+              <a:rPr lang="en-US" dirty="0" err="1" smtClean="0"/>
+              <a:t>Multiscale</a:t>
+            </a:r>
+            <a:r>
+              <a:rPr lang="en-US" dirty="0" smtClean="0"/>
+              <a:t> </a:t>
+            </a:r>
+            <a:r>
+              <a:rPr lang="en-US" dirty="0" err="1" smtClean="0"/>
+              <a:t>Piramidal</a:t>
+            </a:r>
+            <a:r>
+              <a:rPr lang="en-US" dirty="0" smtClean="0"/>
+              <a:t> </a:t>
+            </a:r>
+            <a:r>
+              <a:rPr lang="en-US" dirty="0" err="1" smtClean="0"/>
+              <a:t>muito</a:t>
+            </a:r>
+            <a:r>
+              <a:rPr lang="en-US" dirty="0" smtClean="0"/>
+              <a:t> </a:t>
+            </a:r>
+            <a:r>
+              <a:rPr lang="en-US" dirty="0" err="1" smtClean="0"/>
+              <a:t>custoso</a:t>
+            </a:r>
+            <a:endParaRPr lang="en-US" dirty="0"/>
+          </a:p>
+        </p:txBody>
+      </p:sp>
+    </p:spTree>
+    <p:extLst>
+      <p:ext uri="{BB962C8B-B14F-4D97-AF65-F5344CB8AC3E}">
+        <p14:creationId xmlns:p14="http://schemas.microsoft.com/office/powerpoint/2010/main" val="1856583825"/>
+      </p:ext>
+    </p:extLst>
+  </p:cSld>
+  <p:clrMapOvr>
+    <a:masterClrMapping/>
+  </p:clrMapOvr>
+</p:sld>
+</file>
+
+<file path=ppt/slides/slide24.xml><?xml version="1.0" encoding="utf-8"?>
+<p:sld xmlns:a="http://schemas.openxmlformats.org/drawingml/2006/main" xmlns:r="http://schemas.openxmlformats.org/officeDocument/2006/relationships" xmlns:p="http://schemas.openxmlformats.org/presentationml/2006/main">
+  <p:cSld>
+    <p:spTree>
+      <p:nvGrpSpPr>
+        <p:cNvPr id="1" name=""/>
+        <p:cNvGrpSpPr/>
+        <p:nvPr/>
+      </p:nvGrpSpPr>
+      <p:grpSpPr>
+        <a:xfrm>
+          <a:off x="0" y="0"/>
+          <a:ext cx="0" cy="0"/>
+          <a:chOff x="0" y="0"/>
+          <a:chExt cx="0" cy="0"/>
+        </a:xfrm>
+      </p:grpSpPr>
+      <p:sp>
+        <p:nvSpPr>
+          <p:cNvPr id="2" name="Title 1"/>
+          <p:cNvSpPr>
+            <a:spLocks noGrp="1"/>
+          </p:cNvSpPr>
+          <p:nvPr>
+            <p:ph type="title"/>
+          </p:nvPr>
+        </p:nvSpPr>
+        <p:spPr/>
+        <p:txBody>
+          <a:bodyPr/>
+          <a:lstStyle/>
+          <a:p>
+            <a:r>
+              <a:rPr lang="en-US" dirty="0" err="1" smtClean="0"/>
+              <a:t>Referências</a:t>
+            </a:r>
+            <a:endParaRPr lang="en-US" dirty="0"/>
+          </a:p>
+        </p:txBody>
+      </p:sp>
+      <p:sp>
+        <p:nvSpPr>
+          <p:cNvPr id="3" name="Content Placeholder 2"/>
+          <p:cNvSpPr>
+            <a:spLocks noGrp="1"/>
+          </p:cNvSpPr>
+          <p:nvPr>
+            <p:ph idx="1"/>
+          </p:nvPr>
+        </p:nvSpPr>
+        <p:spPr/>
+        <p:txBody>
+          <a:bodyPr>
+            <a:normAutofit fontScale="70000" lnSpcReduction="20000"/>
+          </a:bodyPr>
+          <a:lstStyle/>
+          <a:p>
+            <a:pPr lvl="0"/>
+            <a:r>
+              <a:rPr lang="en-US" dirty="0" err="1"/>
+              <a:t>Matlab</a:t>
+            </a:r>
+            <a:r>
+              <a:rPr lang="en-US" dirty="0"/>
+              <a:t> Trial Software (http://</a:t>
+            </a:r>
+            <a:r>
+              <a:rPr lang="en-US" dirty="0" err="1"/>
+              <a:t>www.mathworks.com</a:t>
+            </a:r>
+            <a:r>
+              <a:rPr lang="en-US" dirty="0"/>
+              <a:t>/products/</a:t>
+            </a:r>
+            <a:r>
+              <a:rPr lang="en-US" dirty="0" err="1"/>
+              <a:t>matlab</a:t>
+            </a:r>
+            <a:r>
+              <a:rPr lang="en-US" dirty="0"/>
+              <a:t>/). </a:t>
+            </a:r>
+            <a:endParaRPr lang="en-US" dirty="0" smtClean="0"/>
+          </a:p>
+          <a:p>
+            <a:r>
+              <a:rPr lang="en-US" dirty="0"/>
+              <a:t>Learning Vector Quantization (http://</a:t>
+            </a:r>
+            <a:r>
+              <a:rPr lang="en-US" dirty="0" err="1"/>
+              <a:t>en.wikipedia.org</a:t>
+            </a:r>
+            <a:r>
+              <a:rPr lang="en-US" dirty="0"/>
+              <a:t>/wiki/</a:t>
+            </a:r>
+            <a:r>
+              <a:rPr lang="en-US" dirty="0" err="1"/>
+              <a:t>Learning_Vector_Quantization</a:t>
+            </a:r>
+            <a:r>
+              <a:rPr lang="en-US" dirty="0"/>
+              <a:t>)</a:t>
+            </a:r>
+          </a:p>
+          <a:p>
+            <a:r>
+              <a:rPr lang="en-US" dirty="0" err="1"/>
+              <a:t>Neide</a:t>
+            </a:r>
+            <a:r>
+              <a:rPr lang="en-US" dirty="0"/>
+              <a:t> </a:t>
+            </a:r>
+            <a:r>
+              <a:rPr lang="en-US" dirty="0" err="1"/>
+              <a:t>Pizzolato</a:t>
+            </a:r>
+            <a:r>
+              <a:rPr lang="en-US" dirty="0"/>
+              <a:t> Angelo, </a:t>
+            </a:r>
+            <a:r>
+              <a:rPr lang="en-US" i="1" dirty="0" err="1"/>
+              <a:t>Aplicação</a:t>
+            </a:r>
+            <a:r>
+              <a:rPr lang="en-US" i="1" dirty="0"/>
+              <a:t> de </a:t>
+            </a:r>
+            <a:r>
+              <a:rPr lang="en-US" i="1" dirty="0" err="1"/>
+              <a:t>Filtros</a:t>
+            </a:r>
+            <a:r>
+              <a:rPr lang="en-US" i="1" dirty="0"/>
+              <a:t> de Gabor no </a:t>
+            </a:r>
+            <a:r>
+              <a:rPr lang="en-US" i="1" dirty="0" err="1"/>
+              <a:t>Processo</a:t>
+            </a:r>
+            <a:r>
+              <a:rPr lang="en-US" i="1" dirty="0"/>
+              <a:t> de </a:t>
+            </a:r>
+            <a:r>
+              <a:rPr lang="en-US" i="1" dirty="0" err="1"/>
+              <a:t>Classificação</a:t>
+            </a:r>
+            <a:r>
+              <a:rPr lang="en-US" i="1" dirty="0"/>
+              <a:t> de </a:t>
+            </a:r>
+            <a:r>
+              <a:rPr lang="en-US" i="1" dirty="0" err="1"/>
+              <a:t>Imagens</a:t>
+            </a:r>
+            <a:r>
+              <a:rPr lang="en-US" i="1" dirty="0"/>
+              <a:t> </a:t>
+            </a:r>
+            <a:r>
+              <a:rPr lang="en-US" i="1" dirty="0" err="1"/>
+              <a:t>Digitais</a:t>
+            </a:r>
+            <a:r>
+              <a:rPr lang="en-US" i="1" dirty="0"/>
+              <a:t> com Base </a:t>
+            </a:r>
+            <a:r>
+              <a:rPr lang="en-US" i="1" dirty="0" err="1"/>
+              <a:t>em</a:t>
+            </a:r>
+            <a:r>
+              <a:rPr lang="en-US" i="1" dirty="0"/>
+              <a:t> </a:t>
+            </a:r>
+            <a:r>
+              <a:rPr lang="en-US" i="1" dirty="0" err="1"/>
+              <a:t>Atributos</a:t>
+            </a:r>
+            <a:r>
+              <a:rPr lang="en-US" i="1" dirty="0"/>
+              <a:t> de </a:t>
+            </a:r>
+            <a:r>
+              <a:rPr lang="en-US" i="1" dirty="0" err="1"/>
+              <a:t>Textura</a:t>
+            </a:r>
+            <a:r>
+              <a:rPr lang="en-US" dirty="0"/>
+              <a:t>, Porto </a:t>
+            </a:r>
+            <a:r>
+              <a:rPr lang="en-US" dirty="0" err="1"/>
+              <a:t>Alegre</a:t>
+            </a:r>
+            <a:r>
+              <a:rPr lang="en-US" dirty="0"/>
+              <a:t>, </a:t>
+            </a:r>
+            <a:r>
+              <a:rPr lang="en-US" dirty="0" err="1"/>
+              <a:t>Brasil</a:t>
+            </a:r>
+            <a:endParaRPr lang="en-US" dirty="0"/>
+          </a:p>
+          <a:p>
+            <a:r>
+              <a:rPr lang="en-US" dirty="0" err="1"/>
+              <a:t>Yasuo</a:t>
+            </a:r>
+            <a:r>
+              <a:rPr lang="en-US" dirty="0"/>
+              <a:t> </a:t>
+            </a:r>
+            <a:r>
+              <a:rPr lang="en-US" dirty="0" err="1"/>
+              <a:t>Kono</a:t>
+            </a:r>
+            <a:r>
+              <a:rPr lang="en-US" dirty="0"/>
+              <a:t>, José </a:t>
+            </a:r>
+            <a:r>
+              <a:rPr lang="en-US" dirty="0" err="1"/>
+              <a:t>Demiso</a:t>
+            </a:r>
+            <a:r>
+              <a:rPr lang="en-US" dirty="0"/>
+              <a:t> </a:t>
+            </a:r>
+            <a:r>
+              <a:rPr lang="en-US" dirty="0" err="1"/>
+              <a:t>Simões</a:t>
+            </a:r>
+            <a:r>
+              <a:rPr lang="en-US" dirty="0"/>
+              <a:t>, Rafael Duarte.  </a:t>
+            </a:r>
+            <a:r>
+              <a:rPr lang="en-US" i="1" dirty="0" err="1"/>
+              <a:t>Utilização</a:t>
+            </a:r>
+            <a:r>
+              <a:rPr lang="en-US" i="1" dirty="0"/>
+              <a:t> de </a:t>
+            </a:r>
+            <a:r>
+              <a:rPr lang="en-US" i="1" dirty="0" err="1"/>
+              <a:t>Rede</a:t>
+            </a:r>
+            <a:r>
+              <a:rPr lang="en-US" i="1" dirty="0"/>
+              <a:t> </a:t>
+            </a:r>
+            <a:r>
+              <a:rPr lang="en-US" i="1" dirty="0" err="1"/>
+              <a:t>Neual</a:t>
+            </a:r>
+            <a:r>
+              <a:rPr lang="en-US" i="1" dirty="0"/>
+              <a:t> Para </a:t>
+            </a:r>
+            <a:r>
+              <a:rPr lang="en-US" i="1" dirty="0" err="1"/>
+              <a:t>Previsão</a:t>
+            </a:r>
+            <a:r>
+              <a:rPr lang="en-US" i="1" dirty="0"/>
+              <a:t> do </a:t>
+            </a:r>
+            <a:r>
+              <a:rPr lang="en-US" i="1" dirty="0" err="1"/>
+              <a:t>Nível</a:t>
+            </a:r>
+            <a:r>
+              <a:rPr lang="en-US" i="1" dirty="0"/>
+              <a:t> do Rio </a:t>
+            </a:r>
+            <a:r>
+              <a:rPr lang="en-US" i="1" dirty="0" err="1"/>
+              <a:t>Paraguai</a:t>
+            </a:r>
+            <a:r>
+              <a:rPr lang="en-US" dirty="0"/>
+              <a:t>. São José dos Campos, </a:t>
+            </a:r>
+            <a:r>
+              <a:rPr lang="en-US" dirty="0" err="1"/>
+              <a:t>Brasil</a:t>
+            </a:r>
+            <a:endParaRPr lang="en-US" dirty="0"/>
+          </a:p>
+          <a:p>
+            <a:r>
+              <a:rPr lang="en-US" dirty="0"/>
+              <a:t>Department of Informatics and Mathematical Modeling. The IMM Face Database (</a:t>
+            </a:r>
+            <a:r>
+              <a:rPr lang="en-US" u="sng" dirty="0">
+                <a:hlinkClick r:id="rId2"/>
+              </a:rPr>
+              <a:t>http://www2.imm.dtu.dk/~aam/</a:t>
+            </a:r>
+            <a:r>
+              <a:rPr lang="en-US" dirty="0" smtClean="0"/>
+              <a:t>)</a:t>
+            </a:r>
+          </a:p>
+          <a:p>
+            <a:pPr lvl="0"/>
+            <a:r>
+              <a:rPr lang="en-US" dirty="0"/>
+              <a:t>Image </a:t>
+            </a:r>
+            <a:r>
+              <a:rPr lang="en-US" dirty="0" err="1"/>
+              <a:t>Magick</a:t>
+            </a:r>
+            <a:r>
+              <a:rPr lang="en-US" dirty="0"/>
+              <a:t> (</a:t>
+            </a:r>
+            <a:r>
+              <a:rPr lang="en-US" u="sng" dirty="0">
+                <a:hlinkClick r:id="rId3"/>
+              </a:rPr>
+              <a:t>http://www.imagemagick.org/script/index.php</a:t>
+            </a:r>
+            <a:r>
+              <a:rPr lang="en-US" dirty="0"/>
+              <a:t>)</a:t>
+            </a:r>
+          </a:p>
+          <a:p>
+            <a:endParaRPr lang="en-US" dirty="0"/>
+          </a:p>
+          <a:p>
+            <a:pPr lvl="0"/>
+            <a:endParaRPr lang="en-US" dirty="0"/>
+          </a:p>
+        </p:txBody>
+      </p:sp>
+    </p:spTree>
+    <p:extLst>
+      <p:ext uri="{BB962C8B-B14F-4D97-AF65-F5344CB8AC3E}">
+        <p14:creationId xmlns:p14="http://schemas.microsoft.com/office/powerpoint/2010/main" val="1474489034"/>
+      </p:ext>
+    </p:extLst>
+  </p:cSld>
+  <p:clrMapOvr>
+    <a:masterClrMapping/>
+  </p:clrMapOvr>
+</p:sld>
+</file>
+
 <file path=ppt/slides/slide3.xml><?xml version="1.0" encoding="utf-8"?>
 <p:sld xmlns:a="http://schemas.openxmlformats.org/drawingml/2006/main" xmlns:r="http://schemas.openxmlformats.org/officeDocument/2006/relationships" xmlns:p="http://schemas.openxmlformats.org/presentationml/2006/main">
   <p:cSld>
@@ -7095,6 +8265,10 @@
             <a:r>
               <a:rPr lang="en-US" dirty="0" err="1" smtClean="0"/>
               <a:t>Matlab</a:t>
+            </a:r>
+            <a:r>
+              <a:rPr lang="en-US" dirty="0" smtClean="0"/>
+              <a:t> e C</a:t>
             </a:r>
             <a:endParaRPr lang="en-US" dirty="0"/>
           </a:p>
@@ -7365,6 +8539,13 @@
   <p:clrMapOvr>
     <a:masterClrMapping/>
   </p:clrMapOvr>
+  <p:timing>
+    <p:tnLst>
+      <p:par>
+        <p:cTn xmlns:p14="http://schemas.microsoft.com/office/powerpoint/2010/main" id="1" dur="indefinite" restart="never" nodeType="tmRoot"/>
+      </p:par>
+    </p:tnLst>
+  </p:timing>
 </p:sld>
 </file>
 
@@ -7498,6 +8679,13 @@
   <p:clrMapOvr>
     <a:masterClrMapping/>
   </p:clrMapOvr>
+  <p:timing>
+    <p:tnLst>
+      <p:par>
+        <p:cTn xmlns:p14="http://schemas.microsoft.com/office/powerpoint/2010/main" id="1" dur="indefinite" restart="never" nodeType="tmRoot"/>
+      </p:par>
+    </p:tnLst>
+  </p:timing>
 </p:sld>
 </file>
 
@@ -7612,6 +8800,13 @@
   <p:clrMapOvr>
     <a:masterClrMapping/>
   </p:clrMapOvr>
+  <p:timing>
+    <p:tnLst>
+      <p:par>
+        <p:cTn xmlns:p14="http://schemas.microsoft.com/office/powerpoint/2010/main" id="1" dur="indefinite" restart="never" nodeType="tmRoot"/>
+      </p:par>
+    </p:tnLst>
+  </p:timing>
 </p:sld>
 </file>
 
@@ -7706,6 +8901,13 @@
   <p:clrMapOvr>
     <a:masterClrMapping/>
   </p:clrMapOvr>
+  <p:timing>
+    <p:tnLst>
+      <p:par>
+        <p:cTn xmlns:p14="http://schemas.microsoft.com/office/powerpoint/2010/main" id="1" dur="indefinite" restart="never" nodeType="tmRoot"/>
+      </p:par>
+    </p:tnLst>
+  </p:timing>
 </p:sld>
 </file>
 
@@ -7891,6 +9093,13 @@
   <p:clrMapOvr>
     <a:masterClrMapping/>
   </p:clrMapOvr>
+  <p:timing>
+    <p:tnLst>
+      <p:par>
+        <p:cTn xmlns:p14="http://schemas.microsoft.com/office/powerpoint/2010/main" id="1" dur="indefinite" restart="never" nodeType="tmRoot"/>
+      </p:par>
+    </p:tnLst>
+  </p:timing>
 </p:sld>
 </file>
 
@@ -7928,50 +9137,24 @@
           <a:p>
             <a:r>
               <a:rPr lang="en-US" dirty="0" err="1" smtClean="0"/>
-              <a:t>Implementação</a:t>
+              <a:t>Implementa</a:t>
+            </a:r>
+            <a:r>
+              <a:rPr lang="en-US" dirty="0" err="1" smtClean="0"/>
+              <a:t>ção</a:t>
             </a:r>
             <a:endParaRPr lang="en-US" dirty="0"/>
           </a:p>
         </p:txBody>
       </p:sp>
-      <p:pic>
-        <p:nvPicPr>
-          <p:cNvPr id="5" name="Content Placeholder 4" descr="Screen Shot 2012-06-01 at 9.02.19 AM.png"/>
-          <p:cNvPicPr>
-            <a:picLocks noGrp="1" noChangeAspect="1"/>
-          </p:cNvPicPr>
+      <p:sp>
+        <p:nvSpPr>
+          <p:cNvPr id="3" name="Content Placeholder 2"/>
+          <p:cNvSpPr>
+            <a:spLocks noGrp="1"/>
+          </p:cNvSpPr>
           <p:nvPr>
             <p:ph sz="half" idx="1"/>
-          </p:nvPr>
-        </p:nvPicPr>
-        <p:blipFill>
-          <a:blip r:embed="rId2">
-            <a:extLst>
-              <a:ext uri="{28A0092B-C50C-407E-A947-70E740481C1C}">
-                <a14:useLocalDpi xmlns:a14="http://schemas.microsoft.com/office/drawing/2010/main" val="0"/>
-              </a:ext>
-            </a:extLst>
-          </a:blip>
-          <a:srcRect l="-14638" r="-14638"/>
-          <a:stretch>
-            <a:fillRect/>
-          </a:stretch>
-        </p:blipFill>
-        <p:spPr>
-          <a:xfrm>
-            <a:off x="622771" y="2292869"/>
-            <a:ext cx="4290809" cy="4429480"/>
-          </a:xfrm>
-        </p:spPr>
-      </p:pic>
-      <p:sp>
-        <p:nvSpPr>
-          <p:cNvPr id="4" name="Content Placeholder 3"/>
-          <p:cNvSpPr>
-            <a:spLocks noGrp="1"/>
-          </p:cNvSpPr>
-          <p:nvPr>
-            <p:ph sz="half" idx="2"/>
           </p:nvPr>
         </p:nvSpPr>
         <p:spPr/>
@@ -7981,27 +9164,33 @@
           <a:p>
             <a:r>
               <a:rPr lang="en-US" dirty="0" err="1" smtClean="0"/>
-              <a:t>Entrada</a:t>
+              <a:t>Matlab</a:t>
+            </a:r>
+            <a:endParaRPr lang="en-US" dirty="0" smtClean="0"/>
+          </a:p>
+          <a:p>
+            <a:pPr lvl="1"/>
+            <a:r>
+              <a:rPr lang="en-US" dirty="0" err="1" smtClean="0"/>
+              <a:t>Filtro</a:t>
             </a:r>
             <a:r>
               <a:rPr lang="en-US" dirty="0" smtClean="0"/>
-              <a:t>: 2160</a:t>
-            </a:r>
-          </a:p>
-          <a:p>
+              <a:t> de Gabor</a:t>
+            </a:r>
+          </a:p>
+          <a:p>
+            <a:pPr lvl="1"/>
+            <a:r>
+              <a:rPr lang="en-US" dirty="0" smtClean="0"/>
+              <a:t>LVQ</a:t>
+            </a:r>
+          </a:p>
+          <a:p>
+            <a:pPr lvl="1"/>
             <a:r>
               <a:rPr lang="en-US" dirty="0" err="1" smtClean="0"/>
-              <a:t>Épocas</a:t>
-            </a:r>
-            <a:r>
-              <a:rPr lang="en-US" dirty="0" smtClean="0"/>
-              <a:t>: 300</a:t>
-            </a:r>
-          </a:p>
-          <a:p>
-            <a:r>
-              <a:rPr lang="en-US" dirty="0" err="1" smtClean="0"/>
-              <a:t>Camada</a:t>
+              <a:t>Multiscale</a:t>
             </a:r>
             <a:r>
               <a:rPr lang="en-US" dirty="0" smtClean="0"/>
@@ -8009,39 +9198,101 @@
             </a:r>
             <a:r>
               <a:rPr lang="en-US" dirty="0" err="1" smtClean="0"/>
-              <a:t>Escondida</a:t>
-            </a:r>
+              <a:t>Piramidal</a:t>
+            </a:r>
+            <a:endParaRPr lang="en-US" dirty="0" smtClean="0"/>
+          </a:p>
+          <a:p>
+            <a:pPr lvl="1"/>
             <a:r>
               <a:rPr lang="en-US" dirty="0" smtClean="0"/>
-              <a:t>: 40</a:t>
-            </a:r>
-          </a:p>
-          <a:p>
-            <a:r>
-              <a:rPr lang="en-US" dirty="0" smtClean="0"/>
-              <a:t>Performance</a:t>
-            </a:r>
-          </a:p>
-          <a:p>
-            <a:pPr lvl="1"/>
+              <a:t>Base de </a:t>
+            </a:r>
+            <a:r>
+              <a:rPr lang="en-US" dirty="0" err="1"/>
+              <a:t>E</a:t>
+            </a:r>
+            <a:r>
+              <a:rPr lang="en-US" dirty="0" err="1" smtClean="0"/>
+              <a:t>ntrada</a:t>
+            </a:r>
+            <a:endParaRPr lang="en-US" dirty="0"/>
+          </a:p>
+          <a:p>
+            <a:pPr lvl="2"/>
             <a:r>
               <a:rPr lang="en-US" dirty="0" err="1" smtClean="0"/>
               <a:t>Treinamento</a:t>
             </a:r>
+            <a:endParaRPr lang="en-US" dirty="0" smtClean="0"/>
+          </a:p>
+          <a:p>
+            <a:pPr lvl="2"/>
             <a:r>
               <a:rPr lang="en-US" dirty="0" smtClean="0"/>
-              <a:t>: 96.03%</a:t>
+              <a:t>Testes</a:t>
+            </a:r>
+            <a:endParaRPr lang="en-US" dirty="0"/>
+          </a:p>
+        </p:txBody>
+      </p:sp>
+      <p:sp>
+        <p:nvSpPr>
+          <p:cNvPr id="4" name="Content Placeholder 3"/>
+          <p:cNvSpPr>
+            <a:spLocks noGrp="1"/>
+          </p:cNvSpPr>
+          <p:nvPr>
+            <p:ph sz="half" idx="2"/>
+          </p:nvPr>
+        </p:nvSpPr>
+        <p:spPr/>
+        <p:txBody>
+          <a:bodyPr/>
+          <a:lstStyle/>
+          <a:p>
+            <a:r>
+              <a:rPr lang="en-US" dirty="0" smtClean="0"/>
+              <a:t>C</a:t>
             </a:r>
           </a:p>
           <a:p>
             <a:pPr lvl="1"/>
             <a:r>
               <a:rPr lang="en-US" dirty="0" smtClean="0"/>
-              <a:t>Testes: </a:t>
-            </a:r>
+              <a:t>LVQ</a:t>
+            </a:r>
+          </a:p>
+          <a:p>
+            <a:pPr lvl="1"/>
+            <a:endParaRPr lang="en-US" dirty="0"/>
+          </a:p>
+          <a:p>
+            <a:r>
+              <a:rPr lang="en-US" dirty="0" err="1" smtClean="0"/>
+              <a:t>Automator</a:t>
+            </a:r>
+            <a:endParaRPr lang="en-US" dirty="0" smtClean="0"/>
+          </a:p>
+          <a:p>
+            <a:pPr lvl="1"/>
             <a:r>
               <a:rPr lang="en-US" dirty="0" smtClean="0"/>
-              <a:t>83.6%</a:t>
+              <a:t>Scale</a:t>
+            </a:r>
+          </a:p>
+          <a:p>
+            <a:pPr lvl="1"/>
+            <a:r>
+              <a:rPr lang="en-US" dirty="0" smtClean="0"/>
+              <a:t>Crop</a:t>
+            </a:r>
+          </a:p>
+          <a:p>
+            <a:pPr lvl="1"/>
+            <a:r>
+              <a:rPr lang="en-US" dirty="0" smtClean="0"/>
+              <a:t>Rename</a:t>
             </a:r>
             <a:endParaRPr lang="en-US" dirty="0"/>
           </a:p>
@@ -8050,7 +9301,7 @@
     </p:spTree>
     <p:extLst>
       <p:ext uri="{BB962C8B-B14F-4D97-AF65-F5344CB8AC3E}">
-        <p14:creationId xmlns:p14="http://schemas.microsoft.com/office/powerpoint/2010/main" val="1902033235"/>
+        <p14:creationId xmlns:p14="http://schemas.microsoft.com/office/powerpoint/2010/main" val="2581951903"/>
       </p:ext>
     </p:extLst>
   </p:cSld>

</xml_diff>

<commit_message>
[Presentation] adding lvq C performance, change some images
</commit_message>
<xml_diff>
--- a/projeto PI.pptx
+++ b/projeto PI.pptx
@@ -5859,7 +5859,7 @@
           <a:p>
             <a:r>
               <a:rPr lang="en-US" dirty="0" smtClean="0"/>
-              <a:t>Performance: </a:t>
+              <a:t>Performance: 86.11%</a:t>
             </a:r>
           </a:p>
           <a:p>
@@ -5914,7 +5914,7 @@
           <a:p>
             <a:r>
               <a:rPr lang="en-US" dirty="0" err="1" smtClean="0"/>
-              <a:t>Treinamento</a:t>
+              <a:t>Etapas</a:t>
             </a:r>
             <a:r>
               <a:rPr lang="en-US" dirty="0" smtClean="0"/>
@@ -5930,7 +5930,7 @@
       </p:sp>
       <p:pic>
         <p:nvPicPr>
-          <p:cNvPr id="9" name="Content Placeholder 8" descr="Screen Shot 2012-07-12 at 11.33.20 PM.png"/>
+          <p:cNvPr id="9" name="Content Placeholder 8"/>
           <p:cNvPicPr>
             <a:picLocks noGrp="1" noChangeAspect="1"/>
           </p:cNvPicPr>
@@ -5946,12 +5946,16 @@
               </a:ext>
             </a:extLst>
           </a:blip>
-          <a:srcRect t="-20606" b="-20606"/>
           <a:stretch>
             <a:fillRect/>
           </a:stretch>
         </p:blipFill>
-        <p:spPr/>
+        <p:spPr>
+          <a:xfrm>
+            <a:off x="2138437" y="2595562"/>
+            <a:ext cx="5562450" cy="3670767"/>
+          </a:xfrm>
+        </p:spPr>
       </p:pic>
     </p:spTree>
     <p:extLst>

</xml_diff>

<commit_message>
[Presentation] adding database informations
</commit_message>
<xml_diff>
--- a/projeto PI.pptx
+++ b/projeto PI.pptx
@@ -5,7 +5,7 @@
     <p:sldMasterId id="2147483660" r:id="rId1"/>
   </p:sldMasterIdLst>
   <p:notesMasterIdLst>
-    <p:notesMasterId r:id="rId42"/>
+    <p:notesMasterId r:id="rId43"/>
   </p:notesMasterIdLst>
   <p:sldIdLst>
     <p:sldId id="290" r:id="rId2"/>
@@ -31,23 +31,24 @@
     <p:sldId id="310" r:id="rId22"/>
     <p:sldId id="311" r:id="rId23"/>
     <p:sldId id="276" r:id="rId24"/>
-    <p:sldId id="280" r:id="rId25"/>
-    <p:sldId id="275" r:id="rId26"/>
-    <p:sldId id="279" r:id="rId27"/>
-    <p:sldId id="281" r:id="rId28"/>
-    <p:sldId id="282" r:id="rId29"/>
-    <p:sldId id="283" r:id="rId30"/>
-    <p:sldId id="284" r:id="rId31"/>
-    <p:sldId id="285" r:id="rId32"/>
-    <p:sldId id="286" r:id="rId33"/>
-    <p:sldId id="287" r:id="rId34"/>
-    <p:sldId id="288" r:id="rId35"/>
-    <p:sldId id="289" r:id="rId36"/>
-    <p:sldId id="277" r:id="rId37"/>
-    <p:sldId id="267" r:id="rId38"/>
-    <p:sldId id="272" r:id="rId39"/>
-    <p:sldId id="312" r:id="rId40"/>
-    <p:sldId id="313" r:id="rId41"/>
+    <p:sldId id="277" r:id="rId25"/>
+    <p:sldId id="314" r:id="rId26"/>
+    <p:sldId id="280" r:id="rId27"/>
+    <p:sldId id="275" r:id="rId28"/>
+    <p:sldId id="279" r:id="rId29"/>
+    <p:sldId id="281" r:id="rId30"/>
+    <p:sldId id="282" r:id="rId31"/>
+    <p:sldId id="283" r:id="rId32"/>
+    <p:sldId id="284" r:id="rId33"/>
+    <p:sldId id="285" r:id="rId34"/>
+    <p:sldId id="286" r:id="rId35"/>
+    <p:sldId id="287" r:id="rId36"/>
+    <p:sldId id="288" r:id="rId37"/>
+    <p:sldId id="289" r:id="rId38"/>
+    <p:sldId id="267" r:id="rId39"/>
+    <p:sldId id="272" r:id="rId40"/>
+    <p:sldId id="312" r:id="rId41"/>
+    <p:sldId id="313" r:id="rId42"/>
   </p:sldIdLst>
   <p:sldSz cx="9144000" cy="6858000" type="screen4x3"/>
   <p:notesSz cx="6858000" cy="9144000"/>
@@ -231,7 +232,7 @@
           <a:p>
             <a:fld id="{9F5B8AE1-A868-454D-9019-D713EF62A972}" type="datetimeFigureOut">
               <a:rPr lang="en-US" smtClean="0"/>
-              <a:t>13/07/12</a:t>
+              <a:t>7/13/12</a:t>
             </a:fld>
             <a:endParaRPr lang="en-US"/>
           </a:p>
@@ -718,7 +719,7 @@
           <a:p>
             <a:fld id="{70FAA508-F0CD-46EA-95FB-26B559A0B5D9}" type="datetimeFigureOut">
               <a:rPr lang="en-US" smtClean="0"/>
-              <a:t>13/07/12</a:t>
+              <a:t>7/13/12</a:t>
             </a:fld>
             <a:endParaRPr lang="en-US"/>
           </a:p>
@@ -1039,7 +1040,7 @@
           <a:p>
             <a:fld id="{70FAA508-F0CD-46EA-95FB-26B559A0B5D9}" type="datetimeFigureOut">
               <a:rPr lang="en-US" smtClean="0"/>
-              <a:t>13/07/12</a:t>
+              <a:t>7/13/12</a:t>
             </a:fld>
             <a:endParaRPr lang="en-US"/>
           </a:p>
@@ -1316,7 +1317,7 @@
           <a:p>
             <a:fld id="{70FAA508-F0CD-46EA-95FB-26B559A0B5D9}" type="datetimeFigureOut">
               <a:rPr lang="en-US" smtClean="0"/>
-              <a:t>13/07/12</a:t>
+              <a:t>7/13/12</a:t>
             </a:fld>
             <a:endParaRPr lang="en-US"/>
           </a:p>
@@ -1610,7 +1611,7 @@
           <a:p>
             <a:fld id="{70FAA508-F0CD-46EA-95FB-26B559A0B5D9}" type="datetimeFigureOut">
               <a:rPr lang="en-US" smtClean="0"/>
-              <a:t>13/07/12</a:t>
+              <a:t>7/13/12</a:t>
             </a:fld>
             <a:endParaRPr lang="en-US"/>
           </a:p>
@@ -1939,7 +1940,7 @@
           <a:p>
             <a:fld id="{70FAA508-F0CD-46EA-95FB-26B559A0B5D9}" type="datetimeFigureOut">
               <a:rPr lang="en-US" smtClean="0"/>
-              <a:t>13/07/12</a:t>
+              <a:t>7/13/12</a:t>
             </a:fld>
             <a:endParaRPr lang="en-US"/>
           </a:p>
@@ -2190,7 +2191,7 @@
           <a:p>
             <a:fld id="{70FAA508-F0CD-46EA-95FB-26B559A0B5D9}" type="datetimeFigureOut">
               <a:rPr lang="en-US" smtClean="0"/>
-              <a:t>13/07/12</a:t>
+              <a:t>7/13/12</a:t>
             </a:fld>
             <a:endParaRPr lang="en-US"/>
           </a:p>
@@ -2369,7 +2370,7 @@
           <a:p>
             <a:fld id="{70FAA508-F0CD-46EA-95FB-26B559A0B5D9}" type="datetimeFigureOut">
               <a:rPr lang="en-US" smtClean="0"/>
-              <a:t>13/07/12</a:t>
+              <a:t>7/13/12</a:t>
             </a:fld>
             <a:endParaRPr lang="en-US"/>
           </a:p>
@@ -2538,7 +2539,7 @@
           <a:p>
             <a:fld id="{70FAA508-F0CD-46EA-95FB-26B559A0B5D9}" type="datetimeFigureOut">
               <a:rPr lang="en-US" smtClean="0"/>
-              <a:t>13/07/12</a:t>
+              <a:t>7/13/12</a:t>
             </a:fld>
             <a:endParaRPr lang="en-US"/>
           </a:p>
@@ -2807,7 +2808,7 @@
           <a:p>
             <a:fld id="{70FAA508-F0CD-46EA-95FB-26B559A0B5D9}" type="datetimeFigureOut">
               <a:rPr lang="en-US" smtClean="0"/>
-              <a:t>13/07/12</a:t>
+              <a:t>7/13/12</a:t>
             </a:fld>
             <a:endParaRPr lang="en-US"/>
           </a:p>
@@ -3114,7 +3115,7 @@
           <a:p>
             <a:fld id="{70FAA508-F0CD-46EA-95FB-26B559A0B5D9}" type="datetimeFigureOut">
               <a:rPr lang="en-US" smtClean="0"/>
-              <a:t>13/07/12</a:t>
+              <a:t>7/13/12</a:t>
             </a:fld>
             <a:endParaRPr lang="en-US"/>
           </a:p>
@@ -3406,7 +3407,7 @@
           <a:p>
             <a:fld id="{70FAA508-F0CD-46EA-95FB-26B559A0B5D9}" type="datetimeFigureOut">
               <a:rPr lang="en-US" smtClean="0"/>
-              <a:t>13/07/12</a:t>
+              <a:t>7/13/12</a:t>
             </a:fld>
             <a:endParaRPr lang="en-US"/>
           </a:p>
@@ -3836,7 +3837,7 @@
           <a:p>
             <a:fld id="{70FAA508-F0CD-46EA-95FB-26B559A0B5D9}" type="datetimeFigureOut">
               <a:rPr lang="en-US" smtClean="0"/>
-              <a:t>13/07/12</a:t>
+              <a:t>7/13/12</a:t>
             </a:fld>
             <a:endParaRPr lang="en-US"/>
           </a:p>
@@ -4182,7 +4183,7 @@
           <a:p>
             <a:fld id="{70FAA508-F0CD-46EA-95FB-26B559A0B5D9}" type="datetimeFigureOut">
               <a:rPr lang="en-US" smtClean="0"/>
-              <a:t>13/07/12</a:t>
+              <a:t>7/13/12</a:t>
             </a:fld>
             <a:endParaRPr lang="en-US"/>
           </a:p>
@@ -4272,7 +4273,7 @@
           <a:p>
             <a:fld id="{70FAA508-F0CD-46EA-95FB-26B559A0B5D9}" type="datetimeFigureOut">
               <a:rPr lang="en-US" smtClean="0"/>
-              <a:t>13/07/12</a:t>
+              <a:t>7/13/12</a:t>
             </a:fld>
             <a:endParaRPr lang="en-US"/>
           </a:p>
@@ -4609,7 +4610,7 @@
           <a:p>
             <a:fld id="{70FAA508-F0CD-46EA-95FB-26B559A0B5D9}" type="datetimeFigureOut">
               <a:rPr lang="en-US" smtClean="0"/>
-              <a:t>13/07/12</a:t>
+              <a:t>7/13/12</a:t>
             </a:fld>
             <a:endParaRPr lang="en-US"/>
           </a:p>
@@ -4821,7 +4822,7 @@
           <a:p>
             <a:fld id="{70FAA508-F0CD-46EA-95FB-26B559A0B5D9}" type="datetimeFigureOut">
               <a:rPr lang="en-US" smtClean="0"/>
-              <a:t>13/07/12</a:t>
+              <a:t>7/13/12</a:t>
             </a:fld>
             <a:endParaRPr lang="en-US"/>
           </a:p>
@@ -10410,11 +10411,7 @@
           <a:p>
             <a:r>
               <a:rPr lang="en-US" dirty="0" err="1" smtClean="0"/>
-              <a:t>Implementa</a:t>
-            </a:r>
-            <a:r>
-              <a:rPr lang="en-US" dirty="0" err="1" smtClean="0"/>
-              <a:t>ção</a:t>
+              <a:t>Implementação</a:t>
             </a:r>
             <a:endParaRPr lang="en-US" dirty="0" smtClean="0"/>
           </a:p>
@@ -12328,174 +12325,574 @@
           <a:lstStyle/>
           <a:p>
             <a:r>
-              <a:rPr lang="en-US" dirty="0" err="1" smtClean="0"/>
-              <a:t>Implementação</a:t>
-            </a:r>
-            <a:endParaRPr lang="en-US" dirty="0"/>
-          </a:p>
-        </p:txBody>
-      </p:sp>
-      <p:sp>
-        <p:nvSpPr>
-          <p:cNvPr id="3" name="Content Placeholder 2"/>
-          <p:cNvSpPr>
-            <a:spLocks noGrp="1"/>
-          </p:cNvSpPr>
-          <p:nvPr>
-            <p:ph sz="half" idx="1"/>
-          </p:nvPr>
-        </p:nvSpPr>
-        <p:spPr/>
-        <p:txBody>
-          <a:bodyPr/>
-          <a:lstStyle/>
-          <a:p>
-            <a:r>
-              <a:rPr lang="en-US" dirty="0" err="1" smtClean="0"/>
-              <a:t>Matlab</a:t>
-            </a:r>
-            <a:endParaRPr lang="en-US" dirty="0" smtClean="0"/>
-          </a:p>
-          <a:p>
-            <a:pPr lvl="1"/>
-            <a:r>
-              <a:rPr lang="en-US" dirty="0" err="1" smtClean="0"/>
-              <a:t>Filtro</a:t>
-            </a:r>
-            <a:r>
-              <a:rPr lang="en-US" dirty="0" smtClean="0"/>
-              <a:t> de Gabor</a:t>
-            </a:r>
-          </a:p>
-          <a:p>
-            <a:pPr lvl="1"/>
-            <a:r>
-              <a:rPr lang="en-US" dirty="0" smtClean="0"/>
-              <a:t>LVQ</a:t>
-            </a:r>
-          </a:p>
-          <a:p>
-            <a:pPr lvl="1"/>
-            <a:r>
-              <a:rPr lang="en-US" dirty="0" err="1" smtClean="0"/>
-              <a:t>Multiscale</a:t>
-            </a:r>
-            <a:r>
-              <a:rPr lang="en-US" dirty="0" smtClean="0"/>
-              <a:t> </a:t>
-            </a:r>
-            <a:r>
-              <a:rPr lang="en-US" dirty="0" err="1" smtClean="0"/>
-              <a:t>Piramidal</a:t>
-            </a:r>
-            <a:endParaRPr lang="en-US" dirty="0" smtClean="0"/>
-          </a:p>
-          <a:p>
-            <a:pPr lvl="1"/>
-            <a:r>
               <a:rPr lang="en-US" dirty="0" smtClean="0"/>
               <a:t>Base de </a:t>
             </a:r>
             <a:r>
-              <a:rPr lang="en-US" dirty="0" err="1"/>
-              <a:t>E</a:t>
-            </a:r>
-            <a:r>
-              <a:rPr lang="en-US" dirty="0" err="1" smtClean="0"/>
-              <a:t>ntrada</a:t>
-            </a:r>
-            <a:endParaRPr lang="en-US" dirty="0"/>
-          </a:p>
-          <a:p>
-            <a:pPr lvl="2"/>
-            <a:r>
               <a:rPr lang="en-US" dirty="0" err="1" smtClean="0"/>
               <a:t>Treinamento</a:t>
             </a:r>
-            <a:endParaRPr lang="en-US" dirty="0" smtClean="0"/>
-          </a:p>
-          <a:p>
-            <a:pPr lvl="2"/>
-            <a:r>
-              <a:rPr lang="en-US" dirty="0" smtClean="0"/>
-              <a:t>Testes</a:t>
-            </a:r>
             <a:endParaRPr lang="en-US" dirty="0"/>
           </a:p>
         </p:txBody>
       </p:sp>
-      <p:sp>
-        <p:nvSpPr>
-          <p:cNvPr id="4" name="Content Placeholder 3"/>
-          <p:cNvSpPr>
-            <a:spLocks noGrp="1"/>
-          </p:cNvSpPr>
-          <p:nvPr>
-            <p:ph sz="half" idx="2"/>
-          </p:nvPr>
-        </p:nvSpPr>
-        <p:spPr/>
-        <p:txBody>
-          <a:bodyPr/>
-          <a:lstStyle/>
-          <a:p>
-            <a:r>
-              <a:rPr lang="en-US" dirty="0" smtClean="0"/>
-              <a:t>C</a:t>
-            </a:r>
-          </a:p>
-          <a:p>
-            <a:pPr lvl="1"/>
-            <a:r>
-              <a:rPr lang="en-US" dirty="0" smtClean="0"/>
-              <a:t>LVQ</a:t>
-            </a:r>
-          </a:p>
-          <a:p>
-            <a:pPr lvl="1"/>
-            <a:endParaRPr lang="en-US" dirty="0"/>
-          </a:p>
-          <a:p>
-            <a:r>
-              <a:rPr lang="en-US" dirty="0" err="1" smtClean="0"/>
-              <a:t>Automator</a:t>
-            </a:r>
-            <a:endParaRPr lang="en-US" dirty="0" smtClean="0"/>
-          </a:p>
-          <a:p>
-            <a:pPr lvl="1"/>
-            <a:r>
-              <a:rPr lang="en-US" dirty="0" smtClean="0"/>
-              <a:t>Scale</a:t>
-            </a:r>
-          </a:p>
-          <a:p>
-            <a:pPr lvl="1"/>
-            <a:r>
-              <a:rPr lang="en-US" dirty="0" smtClean="0"/>
-              <a:t>Crop</a:t>
-            </a:r>
-          </a:p>
-          <a:p>
-            <a:pPr lvl="1"/>
-            <a:r>
-              <a:rPr lang="en-US" dirty="0" smtClean="0"/>
-              <a:t>Rename</a:t>
-            </a:r>
-            <a:endParaRPr lang="en-US" dirty="0"/>
-          </a:p>
-        </p:txBody>
-      </p:sp>
+      <p:pic>
+        <p:nvPicPr>
+          <p:cNvPr id="13" name="Picture 12" descr="7.png"/>
+          <p:cNvPicPr>
+            <a:picLocks noChangeAspect="1"/>
+          </p:cNvPicPr>
+          <p:nvPr/>
+        </p:nvPicPr>
+        <p:blipFill>
+          <a:blip r:embed="rId2">
+            <a:extLst>
+              <a:ext uri="{28A0092B-C50C-407E-A947-70E740481C1C}">
+                <a14:useLocalDpi xmlns:a14="http://schemas.microsoft.com/office/drawing/2010/main" val="0"/>
+              </a:ext>
+            </a:extLst>
+          </a:blip>
+          <a:stretch>
+            <a:fillRect/>
+          </a:stretch>
+        </p:blipFill>
+        <p:spPr>
+          <a:xfrm>
+            <a:off x="2365068" y="2595562"/>
+            <a:ext cx="672194" cy="1008291"/>
+          </a:xfrm>
+          <a:prstGeom prst="rect">
+            <a:avLst/>
+          </a:prstGeom>
+        </p:spPr>
+      </p:pic>
+      <p:pic>
+        <p:nvPicPr>
+          <p:cNvPr id="14" name="Picture 13" descr="8.png"/>
+          <p:cNvPicPr>
+            <a:picLocks noChangeAspect="1"/>
+          </p:cNvPicPr>
+          <p:nvPr/>
+        </p:nvPicPr>
+        <p:blipFill>
+          <a:blip r:embed="rId3">
+            <a:extLst>
+              <a:ext uri="{28A0092B-C50C-407E-A947-70E740481C1C}">
+                <a14:useLocalDpi xmlns:a14="http://schemas.microsoft.com/office/drawing/2010/main" val="0"/>
+              </a:ext>
+            </a:extLst>
+          </a:blip>
+          <a:stretch>
+            <a:fillRect/>
+          </a:stretch>
+        </p:blipFill>
+        <p:spPr>
+          <a:xfrm>
+            <a:off x="1611564" y="2595563"/>
+            <a:ext cx="672193" cy="1008290"/>
+          </a:xfrm>
+          <a:prstGeom prst="rect">
+            <a:avLst/>
+          </a:prstGeom>
+        </p:spPr>
+      </p:pic>
+      <p:pic>
+        <p:nvPicPr>
+          <p:cNvPr id="15" name="Picture 14" descr="14.png"/>
+          <p:cNvPicPr>
+            <a:picLocks noChangeAspect="1"/>
+          </p:cNvPicPr>
+          <p:nvPr/>
+        </p:nvPicPr>
+        <p:blipFill>
+          <a:blip r:embed="rId4">
+            <a:extLst>
+              <a:ext uri="{28A0092B-C50C-407E-A947-70E740481C1C}">
+                <a14:useLocalDpi xmlns:a14="http://schemas.microsoft.com/office/drawing/2010/main" val="0"/>
+              </a:ext>
+            </a:extLst>
+          </a:blip>
+          <a:stretch>
+            <a:fillRect/>
+          </a:stretch>
+        </p:blipFill>
+        <p:spPr>
+          <a:xfrm>
+            <a:off x="2333238" y="3673702"/>
+            <a:ext cx="704023" cy="1056035"/>
+          </a:xfrm>
+          <a:prstGeom prst="rect">
+            <a:avLst/>
+          </a:prstGeom>
+        </p:spPr>
+      </p:pic>
+      <p:pic>
+        <p:nvPicPr>
+          <p:cNvPr id="16" name="Picture 15" descr="23.png"/>
+          <p:cNvPicPr>
+            <a:picLocks noChangeAspect="1"/>
+          </p:cNvPicPr>
+          <p:nvPr/>
+        </p:nvPicPr>
+        <p:blipFill>
+          <a:blip r:embed="rId5">
+            <a:extLst>
+              <a:ext uri="{28A0092B-C50C-407E-A947-70E740481C1C}">
+                <a14:useLocalDpi xmlns:a14="http://schemas.microsoft.com/office/drawing/2010/main" val="0"/>
+              </a:ext>
+            </a:extLst>
+          </a:blip>
+          <a:stretch>
+            <a:fillRect/>
+          </a:stretch>
+        </p:blipFill>
+        <p:spPr>
+          <a:xfrm>
+            <a:off x="3118572" y="3673703"/>
+            <a:ext cx="704023" cy="1056034"/>
+          </a:xfrm>
+          <a:prstGeom prst="rect">
+            <a:avLst/>
+          </a:prstGeom>
+        </p:spPr>
+      </p:pic>
+      <p:pic>
+        <p:nvPicPr>
+          <p:cNvPr id="17" name="Picture 16" descr="27.png"/>
+          <p:cNvPicPr>
+            <a:picLocks noChangeAspect="1"/>
+          </p:cNvPicPr>
+          <p:nvPr/>
+        </p:nvPicPr>
+        <p:blipFill>
+          <a:blip r:embed="rId6">
+            <a:extLst>
+              <a:ext uri="{28A0092B-C50C-407E-A947-70E740481C1C}">
+                <a14:useLocalDpi xmlns:a14="http://schemas.microsoft.com/office/drawing/2010/main" val="0"/>
+              </a:ext>
+            </a:extLst>
+          </a:blip>
+          <a:stretch>
+            <a:fillRect/>
+          </a:stretch>
+        </p:blipFill>
+        <p:spPr>
+          <a:xfrm>
+            <a:off x="1576585" y="3673703"/>
+            <a:ext cx="704020" cy="1056034"/>
+          </a:xfrm>
+          <a:prstGeom prst="rect">
+            <a:avLst/>
+          </a:prstGeom>
+        </p:spPr>
+      </p:pic>
+      <p:pic>
+        <p:nvPicPr>
+          <p:cNvPr id="18" name="Picture 17" descr="4.png"/>
+          <p:cNvPicPr>
+            <a:picLocks noChangeAspect="1"/>
+          </p:cNvPicPr>
+          <p:nvPr/>
+        </p:nvPicPr>
+        <p:blipFill>
+          <a:blip r:embed="rId7">
+            <a:extLst>
+              <a:ext uri="{28A0092B-C50C-407E-A947-70E740481C1C}">
+                <a14:useLocalDpi xmlns:a14="http://schemas.microsoft.com/office/drawing/2010/main" val="0"/>
+              </a:ext>
+            </a:extLst>
+          </a:blip>
+          <a:stretch>
+            <a:fillRect/>
+          </a:stretch>
+        </p:blipFill>
+        <p:spPr>
+          <a:xfrm>
+            <a:off x="3118573" y="2595563"/>
+            <a:ext cx="672193" cy="1008290"/>
+          </a:xfrm>
+          <a:prstGeom prst="rect">
+            <a:avLst/>
+          </a:prstGeom>
+        </p:spPr>
+      </p:pic>
+      <p:pic>
+        <p:nvPicPr>
+          <p:cNvPr id="20" name="Picture 19" descr="47.png"/>
+          <p:cNvPicPr>
+            <a:picLocks noChangeAspect="1"/>
+          </p:cNvPicPr>
+          <p:nvPr/>
+        </p:nvPicPr>
+        <p:blipFill>
+          <a:blip r:embed="rId8">
+            <a:extLst>
+              <a:ext uri="{28A0092B-C50C-407E-A947-70E740481C1C}">
+                <a14:useLocalDpi xmlns:a14="http://schemas.microsoft.com/office/drawing/2010/main" val="0"/>
+              </a:ext>
+            </a:extLst>
+          </a:blip>
+          <a:stretch>
+            <a:fillRect/>
+          </a:stretch>
+        </p:blipFill>
+        <p:spPr>
+          <a:xfrm>
+            <a:off x="1576585" y="4836684"/>
+            <a:ext cx="704020" cy="1056030"/>
+          </a:xfrm>
+          <a:prstGeom prst="rect">
+            <a:avLst/>
+          </a:prstGeom>
+        </p:spPr>
+      </p:pic>
+      <p:pic>
+        <p:nvPicPr>
+          <p:cNvPr id="21" name="Picture 20" descr="44.png"/>
+          <p:cNvPicPr>
+            <a:picLocks noChangeAspect="1"/>
+          </p:cNvPicPr>
+          <p:nvPr/>
+        </p:nvPicPr>
+        <p:blipFill>
+          <a:blip r:embed="rId9">
+            <a:extLst>
+              <a:ext uri="{28A0092B-C50C-407E-A947-70E740481C1C}">
+                <a14:useLocalDpi xmlns:a14="http://schemas.microsoft.com/office/drawing/2010/main" val="0"/>
+              </a:ext>
+            </a:extLst>
+          </a:blip>
+          <a:stretch>
+            <a:fillRect/>
+          </a:stretch>
+        </p:blipFill>
+        <p:spPr>
+          <a:xfrm>
+            <a:off x="2333238" y="4843179"/>
+            <a:ext cx="704024" cy="1056036"/>
+          </a:xfrm>
+          <a:prstGeom prst="rect">
+            <a:avLst/>
+          </a:prstGeom>
+        </p:spPr>
+      </p:pic>
+      <p:pic>
+        <p:nvPicPr>
+          <p:cNvPr id="22" name="Picture 21" descr="42.png"/>
+          <p:cNvPicPr>
+            <a:picLocks noChangeAspect="1"/>
+          </p:cNvPicPr>
+          <p:nvPr/>
+        </p:nvPicPr>
+        <p:blipFill>
+          <a:blip r:embed="rId10">
+            <a:extLst>
+              <a:ext uri="{28A0092B-C50C-407E-A947-70E740481C1C}">
+                <a14:useLocalDpi xmlns:a14="http://schemas.microsoft.com/office/drawing/2010/main" val="0"/>
+              </a:ext>
+            </a:extLst>
+          </a:blip>
+          <a:stretch>
+            <a:fillRect/>
+          </a:stretch>
+        </p:blipFill>
+        <p:spPr>
+          <a:xfrm>
+            <a:off x="3118572" y="4836683"/>
+            <a:ext cx="672194" cy="1008291"/>
+          </a:xfrm>
+          <a:prstGeom prst="rect">
+            <a:avLst/>
+          </a:prstGeom>
+        </p:spPr>
+      </p:pic>
+      <p:pic>
+        <p:nvPicPr>
+          <p:cNvPr id="23" name="Picture 22" descr="5.png"/>
+          <p:cNvPicPr>
+            <a:picLocks noChangeAspect="1"/>
+          </p:cNvPicPr>
+          <p:nvPr/>
+        </p:nvPicPr>
+        <p:blipFill>
+          <a:blip r:embed="rId11">
+            <a:extLst>
+              <a:ext uri="{28A0092B-C50C-407E-A947-70E740481C1C}">
+                <a14:useLocalDpi xmlns:a14="http://schemas.microsoft.com/office/drawing/2010/main" val="0"/>
+              </a:ext>
+            </a:extLst>
+          </a:blip>
+          <a:stretch>
+            <a:fillRect/>
+          </a:stretch>
+        </p:blipFill>
+        <p:spPr>
+          <a:xfrm>
+            <a:off x="6068724" y="2595561"/>
+            <a:ext cx="677424" cy="1016137"/>
+          </a:xfrm>
+          <a:prstGeom prst="rect">
+            <a:avLst/>
+          </a:prstGeom>
+        </p:spPr>
+      </p:pic>
+      <p:pic>
+        <p:nvPicPr>
+          <p:cNvPr id="24" name="Picture 23" descr="10.png"/>
+          <p:cNvPicPr>
+            <a:picLocks noChangeAspect="1"/>
+          </p:cNvPicPr>
+          <p:nvPr/>
+        </p:nvPicPr>
+        <p:blipFill>
+          <a:blip r:embed="rId12">
+            <a:extLst>
+              <a:ext uri="{28A0092B-C50C-407E-A947-70E740481C1C}">
+                <a14:useLocalDpi xmlns:a14="http://schemas.microsoft.com/office/drawing/2010/main" val="0"/>
+              </a:ext>
+            </a:extLst>
+          </a:blip>
+          <a:stretch>
+            <a:fillRect/>
+          </a:stretch>
+        </p:blipFill>
+        <p:spPr>
+          <a:xfrm>
+            <a:off x="5287283" y="2595563"/>
+            <a:ext cx="672194" cy="1008291"/>
+          </a:xfrm>
+          <a:prstGeom prst="rect">
+            <a:avLst/>
+          </a:prstGeom>
+        </p:spPr>
+      </p:pic>
+      <p:pic>
+        <p:nvPicPr>
+          <p:cNvPr id="25" name="Picture 24" descr="15.png"/>
+          <p:cNvPicPr>
+            <a:picLocks noChangeAspect="1"/>
+          </p:cNvPicPr>
+          <p:nvPr/>
+        </p:nvPicPr>
+        <p:blipFill>
+          <a:blip r:embed="rId13">
+            <a:extLst>
+              <a:ext uri="{28A0092B-C50C-407E-A947-70E740481C1C}">
+                <a14:useLocalDpi xmlns:a14="http://schemas.microsoft.com/office/drawing/2010/main" val="0"/>
+              </a:ext>
+            </a:extLst>
+          </a:blip>
+          <a:stretch>
+            <a:fillRect/>
+          </a:stretch>
+        </p:blipFill>
+        <p:spPr>
+          <a:xfrm>
+            <a:off x="6847432" y="2595563"/>
+            <a:ext cx="673945" cy="1010918"/>
+          </a:xfrm>
+          <a:prstGeom prst="rect">
+            <a:avLst/>
+          </a:prstGeom>
+        </p:spPr>
+      </p:pic>
+      <p:pic>
+        <p:nvPicPr>
+          <p:cNvPr id="26" name="Picture 25" descr="14.png"/>
+          <p:cNvPicPr>
+            <a:picLocks noChangeAspect="1"/>
+          </p:cNvPicPr>
+          <p:nvPr/>
+        </p:nvPicPr>
+        <p:blipFill>
+          <a:blip r:embed="rId14">
+            <a:extLst>
+              <a:ext uri="{28A0092B-C50C-407E-A947-70E740481C1C}">
+                <a14:useLocalDpi xmlns:a14="http://schemas.microsoft.com/office/drawing/2010/main" val="0"/>
+              </a:ext>
+            </a:extLst>
+          </a:blip>
+          <a:stretch>
+            <a:fillRect/>
+          </a:stretch>
+        </p:blipFill>
+        <p:spPr>
+          <a:xfrm>
+            <a:off x="6068724" y="3673703"/>
+            <a:ext cx="677424" cy="1016136"/>
+          </a:xfrm>
+          <a:prstGeom prst="rect">
+            <a:avLst/>
+          </a:prstGeom>
+        </p:spPr>
+      </p:pic>
+      <p:pic>
+        <p:nvPicPr>
+          <p:cNvPr id="27" name="Picture 26" descr="20.png"/>
+          <p:cNvPicPr>
+            <a:picLocks noChangeAspect="1"/>
+          </p:cNvPicPr>
+          <p:nvPr/>
+        </p:nvPicPr>
+        <p:blipFill>
+          <a:blip r:embed="rId15">
+            <a:extLst>
+              <a:ext uri="{28A0092B-C50C-407E-A947-70E740481C1C}">
+                <a14:useLocalDpi xmlns:a14="http://schemas.microsoft.com/office/drawing/2010/main" val="0"/>
+              </a:ext>
+            </a:extLst>
+          </a:blip>
+          <a:stretch>
+            <a:fillRect/>
+          </a:stretch>
+        </p:blipFill>
+        <p:spPr>
+          <a:xfrm>
+            <a:off x="6847431" y="3673701"/>
+            <a:ext cx="677425" cy="1016138"/>
+          </a:xfrm>
+          <a:prstGeom prst="rect">
+            <a:avLst/>
+          </a:prstGeom>
+        </p:spPr>
+      </p:pic>
+      <p:pic>
+        <p:nvPicPr>
+          <p:cNvPr id="28" name="Picture 27" descr="25.png"/>
+          <p:cNvPicPr>
+            <a:picLocks noChangeAspect="1"/>
+          </p:cNvPicPr>
+          <p:nvPr/>
+        </p:nvPicPr>
+        <p:blipFill>
+          <a:blip r:embed="rId16">
+            <a:extLst>
+              <a:ext uri="{28A0092B-C50C-407E-A947-70E740481C1C}">
+                <a14:useLocalDpi xmlns:a14="http://schemas.microsoft.com/office/drawing/2010/main" val="0"/>
+              </a:ext>
+            </a:extLst>
+          </a:blip>
+          <a:stretch>
+            <a:fillRect/>
+          </a:stretch>
+        </p:blipFill>
+        <p:spPr>
+          <a:xfrm>
+            <a:off x="5287282" y="3673701"/>
+            <a:ext cx="704023" cy="1056035"/>
+          </a:xfrm>
+          <a:prstGeom prst="rect">
+            <a:avLst/>
+          </a:prstGeom>
+        </p:spPr>
+      </p:pic>
+      <p:pic>
+        <p:nvPicPr>
+          <p:cNvPr id="29" name="Picture 28" descr="22.png"/>
+          <p:cNvPicPr>
+            <a:picLocks noChangeAspect="1"/>
+          </p:cNvPicPr>
+          <p:nvPr/>
+        </p:nvPicPr>
+        <p:blipFill>
+          <a:blip r:embed="rId17">
+            <a:extLst>
+              <a:ext uri="{28A0092B-C50C-407E-A947-70E740481C1C}">
+                <a14:useLocalDpi xmlns:a14="http://schemas.microsoft.com/office/drawing/2010/main" val="0"/>
+              </a:ext>
+            </a:extLst>
+          </a:blip>
+          <a:stretch>
+            <a:fillRect/>
+          </a:stretch>
+        </p:blipFill>
+        <p:spPr>
+          <a:xfrm>
+            <a:off x="5279319" y="4843179"/>
+            <a:ext cx="680157" cy="1020236"/>
+          </a:xfrm>
+          <a:prstGeom prst="rect">
+            <a:avLst/>
+          </a:prstGeom>
+        </p:spPr>
+      </p:pic>
+      <p:pic>
+        <p:nvPicPr>
+          <p:cNvPr id="30" name="Picture 29" descr="23.png"/>
+          <p:cNvPicPr>
+            <a:picLocks noChangeAspect="1"/>
+          </p:cNvPicPr>
+          <p:nvPr/>
+        </p:nvPicPr>
+        <p:blipFill>
+          <a:blip r:embed="rId18">
+            <a:extLst>
+              <a:ext uri="{28A0092B-C50C-407E-A947-70E740481C1C}">
+                <a14:useLocalDpi xmlns:a14="http://schemas.microsoft.com/office/drawing/2010/main" val="0"/>
+              </a:ext>
+            </a:extLst>
+          </a:blip>
+          <a:stretch>
+            <a:fillRect/>
+          </a:stretch>
+        </p:blipFill>
+        <p:spPr>
+          <a:xfrm>
+            <a:off x="6068724" y="4869675"/>
+            <a:ext cx="686360" cy="1029540"/>
+          </a:xfrm>
+          <a:prstGeom prst="rect">
+            <a:avLst/>
+          </a:prstGeom>
+        </p:spPr>
+      </p:pic>
+      <p:pic>
+        <p:nvPicPr>
+          <p:cNvPr id="31" name="Picture 30" descr="26.png"/>
+          <p:cNvPicPr>
+            <a:picLocks noChangeAspect="1"/>
+          </p:cNvPicPr>
+          <p:nvPr/>
+        </p:nvPicPr>
+        <p:blipFill>
+          <a:blip r:embed="rId19">
+            <a:extLst>
+              <a:ext uri="{28A0092B-C50C-407E-A947-70E740481C1C}">
+                <a14:useLocalDpi xmlns:a14="http://schemas.microsoft.com/office/drawing/2010/main" val="0"/>
+              </a:ext>
+            </a:extLst>
+          </a:blip>
+          <a:stretch>
+            <a:fillRect/>
+          </a:stretch>
+        </p:blipFill>
+        <p:spPr>
+          <a:xfrm>
+            <a:off x="6847432" y="4836682"/>
+            <a:ext cx="672194" cy="1008291"/>
+          </a:xfrm>
+          <a:prstGeom prst="rect">
+            <a:avLst/>
+          </a:prstGeom>
+        </p:spPr>
+      </p:pic>
     </p:spTree>
     <p:extLst>
       <p:ext uri="{BB962C8B-B14F-4D97-AF65-F5344CB8AC3E}">
-        <p14:creationId xmlns:p14="http://schemas.microsoft.com/office/powerpoint/2010/main" val="2581951903"/>
+        <p14:creationId xmlns:p14="http://schemas.microsoft.com/office/powerpoint/2010/main" val="3290367094"/>
       </p:ext>
     </p:extLst>
   </p:cSld>
   <p:clrMapOvr>
     <a:masterClrMapping/>
   </p:clrMapOvr>
+  <p:timing>
+    <p:tnLst>
+      <p:par>
+        <p:cTn xmlns:p14="http://schemas.microsoft.com/office/powerpoint/2010/main" id="1" dur="indefinite" restart="never" nodeType="tmRoot"/>
+      </p:par>
+    </p:tnLst>
+  </p:timing>
 </p:sld>
 </file>
 
@@ -12532,51 +12929,78 @@
           <a:lstStyle/>
           <a:p>
             <a:r>
-              <a:rPr lang="en-US" dirty="0" err="1" smtClean="0"/>
-              <a:t>Implementação</a:t>
-            </a:r>
-            <a:r>
-              <a:rPr lang="en-US" dirty="0" smtClean="0"/>
-              <a:t> </a:t>
-            </a:r>
-            <a:r>
-              <a:rPr lang="en-US" dirty="0" err="1" smtClean="0"/>
-              <a:t>Matlab</a:t>
+              <a:rPr lang="en-US" dirty="0"/>
+              <a:t>Base de </a:t>
+            </a:r>
+            <a:r>
+              <a:rPr lang="en-US" dirty="0" err="1"/>
+              <a:t>Treinamento</a:t>
             </a:r>
             <a:endParaRPr lang="en-US" dirty="0"/>
           </a:p>
         </p:txBody>
       </p:sp>
-      <p:pic>
-        <p:nvPicPr>
-          <p:cNvPr id="5" name="Content Placeholder 4" descr="Screen Shot 2012-06-01 at 9.02.19 AM.png"/>
-          <p:cNvPicPr>
-            <a:picLocks noGrp="1" noChangeAspect="1"/>
-          </p:cNvPicPr>
+      <p:sp>
+        <p:nvSpPr>
+          <p:cNvPr id="3" name="Content Placeholder 2"/>
+          <p:cNvSpPr>
+            <a:spLocks noGrp="1"/>
+          </p:cNvSpPr>
           <p:nvPr>
             <p:ph sz="half" idx="1"/>
           </p:nvPr>
-        </p:nvPicPr>
-        <p:blipFill>
-          <a:blip r:embed="rId2">
-            <a:extLst>
-              <a:ext uri="{28A0092B-C50C-407E-A947-70E740481C1C}">
-                <a14:useLocalDpi xmlns:a14="http://schemas.microsoft.com/office/drawing/2010/main" val="0"/>
-              </a:ext>
-            </a:extLst>
-          </a:blip>
-          <a:srcRect l="-14638" r="-14638"/>
-          <a:stretch>
-            <a:fillRect/>
-          </a:stretch>
-        </p:blipFill>
-        <p:spPr>
-          <a:xfrm>
-            <a:off x="622771" y="2292869"/>
-            <a:ext cx="4290809" cy="4429480"/>
-          </a:xfrm>
-        </p:spPr>
-      </p:pic>
+        </p:nvSpPr>
+        <p:spPr/>
+        <p:txBody>
+          <a:bodyPr/>
+          <a:lstStyle/>
+          <a:p>
+            <a:r>
+              <a:rPr lang="en-US" dirty="0" err="1" smtClean="0"/>
+              <a:t>Treinamento</a:t>
+            </a:r>
+            <a:endParaRPr lang="en-US" dirty="0" smtClean="0"/>
+          </a:p>
+          <a:p>
+            <a:pPr lvl="1"/>
+            <a:r>
+              <a:rPr lang="en-US" dirty="0" err="1" smtClean="0"/>
+              <a:t>Entradas</a:t>
+            </a:r>
+            <a:r>
+              <a:rPr lang="en-US" dirty="0" smtClean="0"/>
+              <a:t>: 906</a:t>
+            </a:r>
+          </a:p>
+          <a:p>
+            <a:pPr lvl="1"/>
+            <a:r>
+              <a:rPr lang="en-US" dirty="0" err="1" smtClean="0"/>
+              <a:t>Distribui</a:t>
+            </a:r>
+            <a:r>
+              <a:rPr lang="en-US" dirty="0" err="1" smtClean="0"/>
+              <a:t>ção</a:t>
+            </a:r>
+            <a:endParaRPr lang="en-US" dirty="0" smtClean="0"/>
+          </a:p>
+          <a:p>
+            <a:pPr lvl="2"/>
+            <a:r>
+              <a:rPr lang="en-US" dirty="0" smtClean="0"/>
+              <a:t>+ 507</a:t>
+            </a:r>
+          </a:p>
+          <a:p>
+            <a:pPr lvl="2"/>
+            <a:r>
+              <a:rPr lang="en-US" dirty="0" smtClean="0"/>
+              <a:t>- 399</a:t>
+            </a:r>
+            <a:endParaRPr lang="en-US" dirty="0"/>
+          </a:p>
+        </p:txBody>
+      </p:sp>
       <p:sp>
         <p:nvSpPr>
           <p:cNvPr id="4" name="Content Placeholder 3"/>
@@ -12593,64 +13017,45 @@
           <a:lstStyle/>
           <a:p>
             <a:r>
+              <a:rPr lang="en-US" dirty="0" smtClean="0"/>
+              <a:t>Testes</a:t>
+            </a:r>
+          </a:p>
+          <a:p>
+            <a:pPr lvl="1"/>
+            <a:r>
               <a:rPr lang="en-US" dirty="0" err="1" smtClean="0"/>
-              <a:t>Entrada</a:t>
+              <a:t>Entradas</a:t>
             </a:r>
             <a:r>
               <a:rPr lang="en-US" dirty="0" smtClean="0"/>
-              <a:t>: 2160</a:t>
-            </a:r>
-          </a:p>
-          <a:p>
+              <a:t>: 324</a:t>
+            </a:r>
+          </a:p>
+          <a:p>
+            <a:pPr lvl="1"/>
             <a:r>
               <a:rPr lang="en-US" dirty="0" err="1" smtClean="0"/>
-              <a:t>Épocas</a:t>
-            </a:r>
+              <a:t>Distribui</a:t>
+            </a:r>
+            <a:r>
+              <a:rPr lang="en-US" dirty="0" err="1" smtClean="0"/>
+              <a:t>ção</a:t>
+            </a:r>
+            <a:endParaRPr lang="en-US" dirty="0" smtClean="0"/>
+          </a:p>
+          <a:p>
+            <a:pPr lvl="2"/>
             <a:r>
               <a:rPr lang="en-US" dirty="0" smtClean="0"/>
-              <a:t>: 300</a:t>
-            </a:r>
-          </a:p>
-          <a:p>
-            <a:r>
-              <a:rPr lang="en-US" dirty="0" err="1" smtClean="0"/>
-              <a:t>Camada</a:t>
-            </a:r>
+              <a:t>+ 183</a:t>
+            </a:r>
+          </a:p>
+          <a:p>
+            <a:pPr lvl="2"/>
             <a:r>
               <a:rPr lang="en-US" dirty="0" smtClean="0"/>
-              <a:t> </a:t>
-            </a:r>
-            <a:r>
-              <a:rPr lang="en-US" dirty="0" err="1" smtClean="0"/>
-              <a:t>Escondida</a:t>
-            </a:r>
-            <a:r>
-              <a:rPr lang="en-US" dirty="0" smtClean="0"/>
-              <a:t>: 40</a:t>
-            </a:r>
-          </a:p>
-          <a:p>
-            <a:r>
-              <a:rPr lang="en-US" dirty="0" smtClean="0"/>
-              <a:t>Performance</a:t>
-            </a:r>
-          </a:p>
-          <a:p>
-            <a:pPr lvl="1"/>
-            <a:r>
-              <a:rPr lang="en-US" dirty="0" err="1" smtClean="0"/>
-              <a:t>Treinamento</a:t>
-            </a:r>
-            <a:r>
-              <a:rPr lang="en-US" dirty="0" smtClean="0"/>
-              <a:t>: 96.03%</a:t>
-            </a:r>
-          </a:p>
-          <a:p>
-            <a:pPr lvl="1"/>
-            <a:r>
-              <a:rPr lang="en-US" dirty="0" smtClean="0"/>
-              <a:t>Testes: 83.6%</a:t>
+              <a:t>- 141</a:t>
             </a:r>
             <a:endParaRPr lang="en-US" dirty="0"/>
           </a:p>
@@ -12659,20 +13064,13 @@
     </p:spTree>
     <p:extLst>
       <p:ext uri="{BB962C8B-B14F-4D97-AF65-F5344CB8AC3E}">
-        <p14:creationId xmlns:p14="http://schemas.microsoft.com/office/powerpoint/2010/main" val="1902033235"/>
+        <p14:creationId xmlns:p14="http://schemas.microsoft.com/office/powerpoint/2010/main" val="4089365131"/>
       </p:ext>
     </p:extLst>
   </p:cSld>
   <p:clrMapOvr>
     <a:masterClrMapping/>
   </p:clrMapOvr>
-  <p:timing>
-    <p:tnLst>
-      <p:par>
-        <p:cTn xmlns:p14="http://schemas.microsoft.com/office/powerpoint/2010/main" id="1" dur="indefinite" restart="never" nodeType="tmRoot"/>
-      </p:par>
-    </p:tnLst>
-  </p:timing>
 </p:sld>
 </file>
 
@@ -12712,47 +13110,102 @@
               <a:rPr lang="en-US" dirty="0" err="1" smtClean="0"/>
               <a:t>Implementação</a:t>
             </a:r>
-            <a:r>
-              <a:rPr lang="en-US" dirty="0" smtClean="0"/>
-              <a:t> C</a:t>
-            </a:r>
             <a:endParaRPr lang="en-US" dirty="0"/>
           </a:p>
         </p:txBody>
       </p:sp>
-      <p:pic>
-        <p:nvPicPr>
-          <p:cNvPr id="7" name="Content Placeholder 6" descr="Screen Shot 2012-07-12 at 11.28.32 PM.png"/>
-          <p:cNvPicPr>
-            <a:picLocks noGrp="1" noChangeAspect="1"/>
-          </p:cNvPicPr>
+      <p:sp>
+        <p:nvSpPr>
+          <p:cNvPr id="3" name="Content Placeholder 2"/>
+          <p:cNvSpPr>
+            <a:spLocks noGrp="1"/>
+          </p:cNvSpPr>
           <p:nvPr>
             <p:ph sz="half" idx="1"/>
           </p:nvPr>
-        </p:nvPicPr>
-        <p:blipFill>
-          <a:blip r:embed="rId2">
-            <a:extLst>
-              <a:ext uri="{28A0092B-C50C-407E-A947-70E740481C1C}">
-                <a14:useLocalDpi xmlns:a14="http://schemas.microsoft.com/office/drawing/2010/main" val="0"/>
-              </a:ext>
-            </a:extLst>
-          </a:blip>
-          <a:srcRect t="-1873" b="-1873"/>
-          <a:stretch>
-            <a:fillRect/>
-          </a:stretch>
-        </p:blipFill>
-        <p:spPr>
-          <a:xfrm>
-            <a:off x="1117600" y="2595563"/>
-            <a:ext cx="3565525" cy="3681412"/>
-          </a:xfrm>
-        </p:spPr>
-      </p:pic>
-      <p:sp>
-        <p:nvSpPr>
-          <p:cNvPr id="6" name="Content Placeholder 5"/>
+        </p:nvSpPr>
+        <p:spPr/>
+        <p:txBody>
+          <a:bodyPr/>
+          <a:lstStyle/>
+          <a:p>
+            <a:r>
+              <a:rPr lang="en-US" dirty="0" err="1" smtClean="0"/>
+              <a:t>Matlab</a:t>
+            </a:r>
+            <a:endParaRPr lang="en-US" dirty="0" smtClean="0"/>
+          </a:p>
+          <a:p>
+            <a:pPr lvl="1"/>
+            <a:r>
+              <a:rPr lang="en-US" dirty="0" err="1" smtClean="0"/>
+              <a:t>Filtro</a:t>
+            </a:r>
+            <a:r>
+              <a:rPr lang="en-US" dirty="0" smtClean="0"/>
+              <a:t> de Gabor</a:t>
+            </a:r>
+          </a:p>
+          <a:p>
+            <a:pPr lvl="1"/>
+            <a:r>
+              <a:rPr lang="en-US" dirty="0" smtClean="0"/>
+              <a:t>LVQ</a:t>
+            </a:r>
+          </a:p>
+          <a:p>
+            <a:pPr lvl="1"/>
+            <a:r>
+              <a:rPr lang="en-US" dirty="0" err="1" smtClean="0"/>
+              <a:t>Multiscale</a:t>
+            </a:r>
+            <a:r>
+              <a:rPr lang="en-US" dirty="0" smtClean="0"/>
+              <a:t> </a:t>
+            </a:r>
+            <a:r>
+              <a:rPr lang="en-US" dirty="0" err="1" smtClean="0"/>
+              <a:t>Piramidal</a:t>
+            </a:r>
+            <a:endParaRPr lang="en-US" dirty="0" smtClean="0"/>
+          </a:p>
+          <a:p>
+            <a:pPr lvl="1"/>
+            <a:r>
+              <a:rPr lang="en-US" dirty="0" smtClean="0"/>
+              <a:t>Base de </a:t>
+            </a:r>
+            <a:r>
+              <a:rPr lang="en-US" dirty="0" err="1"/>
+              <a:t>E</a:t>
+            </a:r>
+            <a:r>
+              <a:rPr lang="en-US" dirty="0" err="1" smtClean="0"/>
+              <a:t>ntrada</a:t>
+            </a:r>
+            <a:endParaRPr lang="en-US" dirty="0"/>
+          </a:p>
+          <a:p>
+            <a:pPr lvl="2"/>
+            <a:r>
+              <a:rPr lang="en-US" dirty="0" err="1" smtClean="0"/>
+              <a:t>Treinamento</a:t>
+            </a:r>
+            <a:endParaRPr lang="en-US" dirty="0" smtClean="0"/>
+          </a:p>
+          <a:p>
+            <a:pPr lvl="2"/>
+            <a:r>
+              <a:rPr lang="en-US" dirty="0" smtClean="0"/>
+              <a:t>Testes</a:t>
+            </a:r>
+            <a:endParaRPr lang="en-US" dirty="0"/>
+          </a:p>
+        </p:txBody>
+      </p:sp>
+      <p:sp>
+        <p:nvSpPr>
+          <p:cNvPr id="4" name="Content Placeholder 3"/>
           <p:cNvSpPr>
             <a:spLocks noGrp="1"/>
           </p:cNvSpPr>
@@ -12762,94 +13215,52 @@
         </p:nvSpPr>
         <p:spPr/>
         <p:txBody>
-          <a:bodyPr>
-            <a:normAutofit lnSpcReduction="10000"/>
-          </a:bodyPr>
-          <a:lstStyle/>
-          <a:p>
-            <a:r>
-              <a:rPr lang="en-US" dirty="0" err="1"/>
-              <a:t>Entrada</a:t>
-            </a:r>
-            <a:r>
-              <a:rPr lang="en-US" dirty="0"/>
-              <a:t>: 2160</a:t>
-            </a:r>
+          <a:bodyPr/>
+          <a:lstStyle/>
+          <a:p>
+            <a:r>
+              <a:rPr lang="en-US" dirty="0" smtClean="0"/>
+              <a:t>C</a:t>
+            </a:r>
+          </a:p>
+          <a:p>
+            <a:pPr lvl="1"/>
+            <a:r>
+              <a:rPr lang="en-US" dirty="0" smtClean="0"/>
+              <a:t>LVQ</a:t>
+            </a:r>
+          </a:p>
+          <a:p>
+            <a:pPr lvl="1"/>
+            <a:endParaRPr lang="en-US" dirty="0"/>
           </a:p>
           <a:p>
             <a:r>
               <a:rPr lang="en-US" dirty="0" err="1" smtClean="0"/>
-              <a:t>Épocas</a:t>
-            </a:r>
+              <a:t>Automator</a:t>
+            </a:r>
+            <a:endParaRPr lang="en-US" dirty="0" smtClean="0"/>
+          </a:p>
+          <a:p>
+            <a:pPr lvl="1"/>
             <a:r>
               <a:rPr lang="en-US" dirty="0" smtClean="0"/>
-              <a:t>: 1000</a:t>
-            </a:r>
-          </a:p>
-          <a:p>
-            <a:r>
-              <a:rPr lang="en-US" dirty="0" err="1" smtClean="0"/>
-              <a:t>Camadas</a:t>
-            </a:r>
+              <a:t>Scale</a:t>
+            </a:r>
+          </a:p>
+          <a:p>
+            <a:pPr lvl="1"/>
             <a:r>
               <a:rPr lang="en-US" dirty="0" smtClean="0"/>
-              <a:t> </a:t>
-            </a:r>
-            <a:r>
-              <a:rPr lang="en-US" dirty="0" err="1" smtClean="0"/>
-              <a:t>Escondidas</a:t>
-            </a:r>
+              <a:t>Crop</a:t>
+            </a:r>
+          </a:p>
+          <a:p>
+            <a:pPr lvl="1"/>
             <a:r>
               <a:rPr lang="en-US" dirty="0" smtClean="0"/>
-              <a:t>: 30</a:t>
-            </a:r>
-          </a:p>
-          <a:p>
-            <a:r>
-              <a:rPr lang="en-US" dirty="0" smtClean="0"/>
-              <a:t>Taxa de </a:t>
-            </a:r>
-            <a:r>
-              <a:rPr lang="en-US" dirty="0" err="1" smtClean="0"/>
-              <a:t>Aprendizagem</a:t>
-            </a:r>
-            <a:endParaRPr lang="en-US" dirty="0" smtClean="0"/>
-          </a:p>
-          <a:p>
-            <a:pPr lvl="1"/>
-            <a:r>
-              <a:rPr lang="en-US" dirty="0" err="1" smtClean="0"/>
-              <a:t>Ínicio</a:t>
-            </a:r>
-            <a:r>
-              <a:rPr lang="en-US" dirty="0" smtClean="0"/>
-              <a:t>: 0.2</a:t>
-            </a:r>
-          </a:p>
-          <a:p>
-            <a:pPr lvl="1"/>
-            <a:r>
-              <a:rPr lang="en-US" dirty="0" smtClean="0"/>
-              <a:t>Final: 0.01</a:t>
-            </a:r>
-          </a:p>
-          <a:p>
-            <a:r>
-              <a:rPr lang="en-US" dirty="0" err="1" smtClean="0"/>
-              <a:t>Convergência</a:t>
-            </a:r>
-            <a:r>
-              <a:rPr lang="en-US" dirty="0" smtClean="0"/>
-              <a:t>: 0.3</a:t>
-            </a:r>
-          </a:p>
-          <a:p>
-            <a:r>
-              <a:rPr lang="en-US" dirty="0" smtClean="0"/>
-              <a:t>Performance: 86.11%</a:t>
-            </a:r>
-          </a:p>
-          <a:p>
+              <a:t>Rename</a:t>
+            </a:r>
             <a:endParaRPr lang="en-US" dirty="0"/>
           </a:p>
         </p:txBody>
@@ -12857,7 +13268,7 @@
     </p:spTree>
     <p:extLst>
       <p:ext uri="{BB962C8B-B14F-4D97-AF65-F5344CB8AC3E}">
-        <p14:creationId xmlns:p14="http://schemas.microsoft.com/office/powerpoint/2010/main" val="4294895447"/>
+        <p14:creationId xmlns:p14="http://schemas.microsoft.com/office/powerpoint/2010/main" val="2581951903"/>
       </p:ext>
     </p:extLst>
   </p:cSld>
@@ -12886,6 +13297,360 @@
       </p:grpSpPr>
       <p:sp>
         <p:nvSpPr>
+          <p:cNvPr id="2" name="Title 1"/>
+          <p:cNvSpPr>
+            <a:spLocks noGrp="1"/>
+          </p:cNvSpPr>
+          <p:nvPr>
+            <p:ph type="title"/>
+          </p:nvPr>
+        </p:nvSpPr>
+        <p:spPr/>
+        <p:txBody>
+          <a:bodyPr/>
+          <a:lstStyle/>
+          <a:p>
+            <a:r>
+              <a:rPr lang="en-US" dirty="0" err="1" smtClean="0"/>
+              <a:t>Implementação</a:t>
+            </a:r>
+            <a:r>
+              <a:rPr lang="en-US" dirty="0" smtClean="0"/>
+              <a:t> </a:t>
+            </a:r>
+            <a:r>
+              <a:rPr lang="en-US" dirty="0" err="1" smtClean="0"/>
+              <a:t>Matlab</a:t>
+            </a:r>
+            <a:endParaRPr lang="en-US" dirty="0"/>
+          </a:p>
+        </p:txBody>
+      </p:sp>
+      <p:pic>
+        <p:nvPicPr>
+          <p:cNvPr id="5" name="Content Placeholder 4" descr="Screen Shot 2012-06-01 at 9.02.19 AM.png"/>
+          <p:cNvPicPr>
+            <a:picLocks noGrp="1" noChangeAspect="1"/>
+          </p:cNvPicPr>
+          <p:nvPr>
+            <p:ph sz="half" idx="1"/>
+          </p:nvPr>
+        </p:nvPicPr>
+        <p:blipFill>
+          <a:blip r:embed="rId2">
+            <a:extLst>
+              <a:ext uri="{28A0092B-C50C-407E-A947-70E740481C1C}">
+                <a14:useLocalDpi xmlns:a14="http://schemas.microsoft.com/office/drawing/2010/main" val="0"/>
+              </a:ext>
+            </a:extLst>
+          </a:blip>
+          <a:srcRect l="-14638" r="-14638"/>
+          <a:stretch>
+            <a:fillRect/>
+          </a:stretch>
+        </p:blipFill>
+        <p:spPr>
+          <a:xfrm>
+            <a:off x="622771" y="2292869"/>
+            <a:ext cx="4290809" cy="4429480"/>
+          </a:xfrm>
+        </p:spPr>
+      </p:pic>
+      <p:sp>
+        <p:nvSpPr>
+          <p:cNvPr id="4" name="Content Placeholder 3"/>
+          <p:cNvSpPr>
+            <a:spLocks noGrp="1"/>
+          </p:cNvSpPr>
+          <p:nvPr>
+            <p:ph sz="half" idx="2"/>
+          </p:nvPr>
+        </p:nvSpPr>
+        <p:spPr/>
+        <p:txBody>
+          <a:bodyPr/>
+          <a:lstStyle/>
+          <a:p>
+            <a:r>
+              <a:rPr lang="en-US" dirty="0" err="1" smtClean="0"/>
+              <a:t>Entrada</a:t>
+            </a:r>
+            <a:r>
+              <a:rPr lang="en-US" dirty="0" smtClean="0"/>
+              <a:t>: 2160</a:t>
+            </a:r>
+          </a:p>
+          <a:p>
+            <a:r>
+              <a:rPr lang="en-US" dirty="0" err="1" smtClean="0"/>
+              <a:t>Épocas</a:t>
+            </a:r>
+            <a:r>
+              <a:rPr lang="en-US" dirty="0" smtClean="0"/>
+              <a:t>: 300</a:t>
+            </a:r>
+          </a:p>
+          <a:p>
+            <a:r>
+              <a:rPr lang="en-US" dirty="0" err="1" smtClean="0"/>
+              <a:t>Camada</a:t>
+            </a:r>
+            <a:r>
+              <a:rPr lang="en-US" dirty="0" smtClean="0"/>
+              <a:t> </a:t>
+            </a:r>
+            <a:r>
+              <a:rPr lang="en-US" dirty="0" err="1" smtClean="0"/>
+              <a:t>Escondida</a:t>
+            </a:r>
+            <a:r>
+              <a:rPr lang="en-US" dirty="0" smtClean="0"/>
+              <a:t>: 40</a:t>
+            </a:r>
+          </a:p>
+          <a:p>
+            <a:r>
+              <a:rPr lang="en-US" dirty="0" smtClean="0"/>
+              <a:t>Performance: 83.6</a:t>
+            </a:r>
+            <a:r>
+              <a:rPr lang="en-US" dirty="0" smtClean="0"/>
+              <a:t>%</a:t>
+            </a:r>
+            <a:endParaRPr lang="en-US" dirty="0"/>
+          </a:p>
+        </p:txBody>
+      </p:sp>
+    </p:spTree>
+    <p:extLst>
+      <p:ext uri="{BB962C8B-B14F-4D97-AF65-F5344CB8AC3E}">
+        <p14:creationId xmlns:p14="http://schemas.microsoft.com/office/powerpoint/2010/main" val="1902033235"/>
+      </p:ext>
+    </p:extLst>
+  </p:cSld>
+  <p:clrMapOvr>
+    <a:masterClrMapping/>
+  </p:clrMapOvr>
+  <p:timing>
+    <p:tnLst>
+      <p:par>
+        <p:cTn xmlns:p14="http://schemas.microsoft.com/office/powerpoint/2010/main" id="1" dur="indefinite" restart="never" nodeType="tmRoot"/>
+      </p:par>
+    </p:tnLst>
+  </p:timing>
+</p:sld>
+</file>
+
+<file path=ppt/slides/slide28.xml><?xml version="1.0" encoding="utf-8"?>
+<p:sld xmlns:a="http://schemas.openxmlformats.org/drawingml/2006/main" xmlns:r="http://schemas.openxmlformats.org/officeDocument/2006/relationships" xmlns:p="http://schemas.openxmlformats.org/presentationml/2006/main">
+  <p:cSld>
+    <p:spTree>
+      <p:nvGrpSpPr>
+        <p:cNvPr id="1" name=""/>
+        <p:cNvGrpSpPr/>
+        <p:nvPr/>
+      </p:nvGrpSpPr>
+      <p:grpSpPr>
+        <a:xfrm>
+          <a:off x="0" y="0"/>
+          <a:ext cx="0" cy="0"/>
+          <a:chOff x="0" y="0"/>
+          <a:chExt cx="0" cy="0"/>
+        </a:xfrm>
+      </p:grpSpPr>
+      <p:sp>
+        <p:nvSpPr>
+          <p:cNvPr id="2" name="Title 1"/>
+          <p:cNvSpPr>
+            <a:spLocks noGrp="1"/>
+          </p:cNvSpPr>
+          <p:nvPr>
+            <p:ph type="title"/>
+          </p:nvPr>
+        </p:nvSpPr>
+        <p:spPr/>
+        <p:txBody>
+          <a:bodyPr/>
+          <a:lstStyle/>
+          <a:p>
+            <a:r>
+              <a:rPr lang="en-US" dirty="0" err="1" smtClean="0"/>
+              <a:t>Implementação</a:t>
+            </a:r>
+            <a:r>
+              <a:rPr lang="en-US" dirty="0" smtClean="0"/>
+              <a:t> C</a:t>
+            </a:r>
+            <a:endParaRPr lang="en-US" dirty="0"/>
+          </a:p>
+        </p:txBody>
+      </p:sp>
+      <p:pic>
+        <p:nvPicPr>
+          <p:cNvPr id="7" name="Content Placeholder 6" descr="Screen Shot 2012-07-12 at 11.28.32 PM.png"/>
+          <p:cNvPicPr>
+            <a:picLocks noGrp="1" noChangeAspect="1"/>
+          </p:cNvPicPr>
+          <p:nvPr>
+            <p:ph sz="half" idx="1"/>
+          </p:nvPr>
+        </p:nvPicPr>
+        <p:blipFill>
+          <a:blip r:embed="rId2">
+            <a:extLst>
+              <a:ext uri="{28A0092B-C50C-407E-A947-70E740481C1C}">
+                <a14:useLocalDpi xmlns:a14="http://schemas.microsoft.com/office/drawing/2010/main" val="0"/>
+              </a:ext>
+            </a:extLst>
+          </a:blip>
+          <a:srcRect t="-1873" b="-1873"/>
+          <a:stretch>
+            <a:fillRect/>
+          </a:stretch>
+        </p:blipFill>
+        <p:spPr>
+          <a:xfrm>
+            <a:off x="1117600" y="2595563"/>
+            <a:ext cx="3565525" cy="3681412"/>
+          </a:xfrm>
+        </p:spPr>
+      </p:pic>
+      <p:sp>
+        <p:nvSpPr>
+          <p:cNvPr id="6" name="Content Placeholder 5"/>
+          <p:cNvSpPr>
+            <a:spLocks noGrp="1"/>
+          </p:cNvSpPr>
+          <p:nvPr>
+            <p:ph sz="half" idx="2"/>
+          </p:nvPr>
+        </p:nvSpPr>
+        <p:spPr/>
+        <p:txBody>
+          <a:bodyPr>
+            <a:normAutofit lnSpcReduction="10000"/>
+          </a:bodyPr>
+          <a:lstStyle/>
+          <a:p>
+            <a:r>
+              <a:rPr lang="en-US" dirty="0" err="1"/>
+              <a:t>Entrada</a:t>
+            </a:r>
+            <a:r>
+              <a:rPr lang="en-US" dirty="0"/>
+              <a:t>: 2160</a:t>
+            </a:r>
+          </a:p>
+          <a:p>
+            <a:r>
+              <a:rPr lang="en-US" dirty="0" err="1" smtClean="0"/>
+              <a:t>Épocas</a:t>
+            </a:r>
+            <a:r>
+              <a:rPr lang="en-US" dirty="0" smtClean="0"/>
+              <a:t>: 1000</a:t>
+            </a:r>
+          </a:p>
+          <a:p>
+            <a:r>
+              <a:rPr lang="en-US" dirty="0" err="1" smtClean="0"/>
+              <a:t>Camadas</a:t>
+            </a:r>
+            <a:r>
+              <a:rPr lang="en-US" dirty="0" smtClean="0"/>
+              <a:t> </a:t>
+            </a:r>
+            <a:r>
+              <a:rPr lang="en-US" dirty="0" err="1" smtClean="0"/>
+              <a:t>Escondidas</a:t>
+            </a:r>
+            <a:r>
+              <a:rPr lang="en-US" dirty="0" smtClean="0"/>
+              <a:t>: 30</a:t>
+            </a:r>
+          </a:p>
+          <a:p>
+            <a:r>
+              <a:rPr lang="en-US" dirty="0" smtClean="0"/>
+              <a:t>Taxa de </a:t>
+            </a:r>
+            <a:r>
+              <a:rPr lang="en-US" dirty="0" err="1" smtClean="0"/>
+              <a:t>Aprendizagem</a:t>
+            </a:r>
+            <a:endParaRPr lang="en-US" dirty="0" smtClean="0"/>
+          </a:p>
+          <a:p>
+            <a:pPr lvl="1"/>
+            <a:r>
+              <a:rPr lang="en-US" dirty="0" err="1" smtClean="0"/>
+              <a:t>Ínicio</a:t>
+            </a:r>
+            <a:r>
+              <a:rPr lang="en-US" dirty="0" smtClean="0"/>
+              <a:t>: 0.2</a:t>
+            </a:r>
+          </a:p>
+          <a:p>
+            <a:pPr lvl="1"/>
+            <a:r>
+              <a:rPr lang="en-US" dirty="0" smtClean="0"/>
+              <a:t>Final: 0.01</a:t>
+            </a:r>
+          </a:p>
+          <a:p>
+            <a:r>
+              <a:rPr lang="en-US" dirty="0" err="1" smtClean="0"/>
+              <a:t>Convergência</a:t>
+            </a:r>
+            <a:r>
+              <a:rPr lang="en-US" dirty="0" smtClean="0"/>
+              <a:t>: 0.3</a:t>
+            </a:r>
+          </a:p>
+          <a:p>
+            <a:r>
+              <a:rPr lang="en-US" dirty="0" smtClean="0"/>
+              <a:t>Performance: 86.11%</a:t>
+            </a:r>
+          </a:p>
+          <a:p>
+            <a:endParaRPr lang="en-US" dirty="0"/>
+          </a:p>
+        </p:txBody>
+      </p:sp>
+    </p:spTree>
+    <p:extLst>
+      <p:ext uri="{BB962C8B-B14F-4D97-AF65-F5344CB8AC3E}">
+        <p14:creationId xmlns:p14="http://schemas.microsoft.com/office/powerpoint/2010/main" val="4294895447"/>
+      </p:ext>
+    </p:extLst>
+  </p:cSld>
+  <p:clrMapOvr>
+    <a:masterClrMapping/>
+  </p:clrMapOvr>
+</p:sld>
+</file>
+
+<file path=ppt/slides/slide29.xml><?xml version="1.0" encoding="utf-8"?>
+<p:sld xmlns:a="http://schemas.openxmlformats.org/drawingml/2006/main" xmlns:r="http://schemas.openxmlformats.org/officeDocument/2006/relationships" xmlns:p="http://schemas.openxmlformats.org/presentationml/2006/main">
+  <p:cSld>
+    <p:spTree>
+      <p:nvGrpSpPr>
+        <p:cNvPr id="1" name=""/>
+        <p:cNvGrpSpPr/>
+        <p:nvPr/>
+      </p:nvGrpSpPr>
+      <p:grpSpPr>
+        <a:xfrm>
+          <a:off x="0" y="0"/>
+          <a:ext cx="0" cy="0"/>
+          <a:chOff x="0" y="0"/>
+          <a:chExt cx="0" cy="0"/>
+        </a:xfrm>
+      </p:grpSpPr>
+      <p:sp>
+        <p:nvSpPr>
           <p:cNvPr id="5" name="Title 4"/>
           <p:cNvSpPr>
             <a:spLocks noGrp="1"/>
@@ -12953,7 +13718,277 @@
 </p:sld>
 </file>
 
-<file path=ppt/slides/slide28.xml><?xml version="1.0" encoding="utf-8"?>
+<file path=ppt/slides/slide3.xml><?xml version="1.0" encoding="utf-8"?>
+<p:sld xmlns:a="http://schemas.openxmlformats.org/drawingml/2006/main" xmlns:r="http://schemas.openxmlformats.org/officeDocument/2006/relationships" xmlns:p="http://schemas.openxmlformats.org/presentationml/2006/main">
+  <p:cSld>
+    <p:spTree>
+      <p:nvGrpSpPr>
+        <p:cNvPr id="1" name=""/>
+        <p:cNvGrpSpPr/>
+        <p:nvPr/>
+      </p:nvGrpSpPr>
+      <p:grpSpPr>
+        <a:xfrm>
+          <a:off x="0" y="0"/>
+          <a:ext cx="0" cy="0"/>
+          <a:chOff x="0" y="0"/>
+          <a:chExt cx="0" cy="0"/>
+        </a:xfrm>
+      </p:grpSpPr>
+      <p:sp>
+        <p:nvSpPr>
+          <p:cNvPr id="7" name="Title 6"/>
+          <p:cNvSpPr>
+            <a:spLocks noGrp="1"/>
+          </p:cNvSpPr>
+          <p:nvPr>
+            <p:ph type="title"/>
+          </p:nvPr>
+        </p:nvSpPr>
+        <p:spPr/>
+        <p:txBody>
+          <a:bodyPr/>
+          <a:lstStyle/>
+          <a:p>
+            <a:r>
+              <a:rPr lang="en-US" dirty="0" err="1" smtClean="0"/>
+              <a:t>Problema</a:t>
+            </a:r>
+            <a:endParaRPr lang="en-US" dirty="0"/>
+          </a:p>
+        </p:txBody>
+      </p:sp>
+      <p:pic>
+        <p:nvPicPr>
+          <p:cNvPr id="5" name="Content Placeholder 4" descr="wee-adrian1.gif"/>
+          <p:cNvPicPr>
+            <a:picLocks noGrp="1" noChangeAspect="1"/>
+          </p:cNvPicPr>
+          <p:nvPr>
+            <p:ph sz="half" idx="1"/>
+          </p:nvPr>
+        </p:nvPicPr>
+        <p:blipFill>
+          <a:blip r:embed="rId2">
+            <a:extLst>
+              <a:ext uri="{28A0092B-C50C-407E-A947-70E740481C1C}">
+                <a14:useLocalDpi xmlns:a14="http://schemas.microsoft.com/office/drawing/2010/main" val="0"/>
+              </a:ext>
+            </a:extLst>
+          </a:blip>
+          <a:srcRect t="8087" b="8087"/>
+          <a:stretch>
+            <a:fillRect/>
+          </a:stretch>
+        </p:blipFill>
+        <p:spPr>
+          <a:xfrm>
+            <a:off x="1117600" y="2595563"/>
+            <a:ext cx="1175101" cy="1213078"/>
+          </a:xfrm>
+        </p:spPr>
+      </p:pic>
+      <p:pic>
+        <p:nvPicPr>
+          <p:cNvPr id="4" name="Content Placeholder 3" descr="im2.jpg"/>
+          <p:cNvPicPr>
+            <a:picLocks noGrp="1" noChangeAspect="1"/>
+          </p:cNvPicPr>
+          <p:nvPr>
+            <p:ph sz="half" idx="2"/>
+          </p:nvPr>
+        </p:nvPicPr>
+        <p:blipFill>
+          <a:blip r:embed="rId3">
+            <a:extLst>
+              <a:ext uri="{28A0092B-C50C-407E-A947-70E740481C1C}">
+                <a14:useLocalDpi xmlns:a14="http://schemas.microsoft.com/office/drawing/2010/main" val="0"/>
+              </a:ext>
+            </a:extLst>
+          </a:blip>
+          <a:srcRect l="3110" r="3110"/>
+          <a:stretch>
+            <a:fillRect/>
+          </a:stretch>
+        </p:blipFill>
+        <p:spPr>
+          <a:xfrm>
+            <a:off x="4238625" y="2595563"/>
+            <a:ext cx="4675188" cy="3681412"/>
+          </a:xfrm>
+        </p:spPr>
+      </p:pic>
+      <p:pic>
+        <p:nvPicPr>
+          <p:cNvPr id="6" name="Picture 5" descr="if3206.jpeg"/>
+          <p:cNvPicPr>
+            <a:picLocks noChangeAspect="1"/>
+          </p:cNvPicPr>
+          <p:nvPr/>
+        </p:nvPicPr>
+        <p:blipFill>
+          <a:blip r:embed="rId4">
+            <a:extLst>
+              <a:ext uri="{28A0092B-C50C-407E-A947-70E740481C1C}">
+                <a14:useLocalDpi xmlns:a14="http://schemas.microsoft.com/office/drawing/2010/main" val="0"/>
+              </a:ext>
+            </a:extLst>
+          </a:blip>
+          <a:stretch>
+            <a:fillRect/>
+          </a:stretch>
+        </p:blipFill>
+        <p:spPr>
+          <a:xfrm>
+            <a:off x="2314994" y="2595563"/>
+            <a:ext cx="1629508" cy="1213078"/>
+          </a:xfrm>
+          <a:prstGeom prst="rect">
+            <a:avLst/>
+          </a:prstGeom>
+        </p:spPr>
+      </p:pic>
+      <p:pic>
+        <p:nvPicPr>
+          <p:cNvPr id="8" name="Picture 7" descr="wee-kirsty18.gif"/>
+          <p:cNvPicPr>
+            <a:picLocks noChangeAspect="1"/>
+          </p:cNvPicPr>
+          <p:nvPr/>
+        </p:nvPicPr>
+        <p:blipFill>
+          <a:blip r:embed="rId5">
+            <a:extLst>
+              <a:ext uri="{28A0092B-C50C-407E-A947-70E740481C1C}">
+                <a14:useLocalDpi xmlns:a14="http://schemas.microsoft.com/office/drawing/2010/main" val="0"/>
+              </a:ext>
+            </a:extLst>
+          </a:blip>
+          <a:stretch>
+            <a:fillRect/>
+          </a:stretch>
+        </p:blipFill>
+        <p:spPr>
+          <a:xfrm>
+            <a:off x="1112231" y="3889873"/>
+            <a:ext cx="1041400" cy="1193800"/>
+          </a:xfrm>
+          <a:prstGeom prst="rect">
+            <a:avLst/>
+          </a:prstGeom>
+        </p:spPr>
+      </p:pic>
+      <p:pic>
+        <p:nvPicPr>
+          <p:cNvPr id="9" name="Picture 8" descr="if1306.jpeg"/>
+          <p:cNvPicPr>
+            <a:picLocks noChangeAspect="1"/>
+          </p:cNvPicPr>
+          <p:nvPr/>
+        </p:nvPicPr>
+        <p:blipFill>
+          <a:blip r:embed="rId6">
+            <a:extLst>
+              <a:ext uri="{28A0092B-C50C-407E-A947-70E740481C1C}">
+                <a14:useLocalDpi xmlns:a14="http://schemas.microsoft.com/office/drawing/2010/main" val="0"/>
+              </a:ext>
+            </a:extLst>
+          </a:blip>
+          <a:stretch>
+            <a:fillRect/>
+          </a:stretch>
+        </p:blipFill>
+        <p:spPr>
+          <a:xfrm>
+            <a:off x="2314994" y="3978848"/>
+            <a:ext cx="1379718" cy="1027123"/>
+          </a:xfrm>
+          <a:prstGeom prst="rect">
+            <a:avLst/>
+          </a:prstGeom>
+        </p:spPr>
+      </p:pic>
+      <p:pic>
+        <p:nvPicPr>
+          <p:cNvPr id="10" name="Picture 9" descr="if2507.jpeg"/>
+          <p:cNvPicPr>
+            <a:picLocks noChangeAspect="1"/>
+          </p:cNvPicPr>
+          <p:nvPr/>
+        </p:nvPicPr>
+        <p:blipFill>
+          <a:blip r:embed="rId7">
+            <a:extLst>
+              <a:ext uri="{28A0092B-C50C-407E-A947-70E740481C1C}">
+                <a14:useLocalDpi xmlns:a14="http://schemas.microsoft.com/office/drawing/2010/main" val="0"/>
+              </a:ext>
+            </a:extLst>
+          </a:blip>
+          <a:stretch>
+            <a:fillRect/>
+          </a:stretch>
+        </p:blipFill>
+        <p:spPr>
+          <a:xfrm>
+            <a:off x="896331" y="5206454"/>
+            <a:ext cx="1257300" cy="935990"/>
+          </a:xfrm>
+          <a:prstGeom prst="rect">
+            <a:avLst/>
+          </a:prstGeom>
+        </p:spPr>
+      </p:pic>
+      <p:pic>
+        <p:nvPicPr>
+          <p:cNvPr id="13" name="Picture 12" descr="wee-andrew!45.gif"/>
+          <p:cNvPicPr>
+            <a:picLocks noChangeAspect="1"/>
+          </p:cNvPicPr>
+          <p:nvPr/>
+        </p:nvPicPr>
+        <p:blipFill>
+          <a:blip r:embed="rId8">
+            <a:extLst>
+              <a:ext uri="{28A0092B-C50C-407E-A947-70E740481C1C}">
+                <a14:useLocalDpi xmlns:a14="http://schemas.microsoft.com/office/drawing/2010/main" val="0"/>
+              </a:ext>
+            </a:extLst>
+          </a:blip>
+          <a:stretch>
+            <a:fillRect/>
+          </a:stretch>
+        </p:blipFill>
+        <p:spPr>
+          <a:xfrm>
+            <a:off x="2464759" y="5088446"/>
+            <a:ext cx="1041400" cy="1282700"/>
+          </a:xfrm>
+          <a:prstGeom prst="rect">
+            <a:avLst/>
+          </a:prstGeom>
+        </p:spPr>
+      </p:pic>
+    </p:spTree>
+    <p:extLst>
+      <p:ext uri="{BB962C8B-B14F-4D97-AF65-F5344CB8AC3E}">
+        <p14:creationId xmlns:p14="http://schemas.microsoft.com/office/powerpoint/2010/main" val="2977175205"/>
+      </p:ext>
+    </p:extLst>
+  </p:cSld>
+  <p:clrMapOvr>
+    <a:masterClrMapping/>
+  </p:clrMapOvr>
+  <p:timing>
+    <p:tnLst>
+      <p:par>
+        <p:cTn xmlns:p14="http://schemas.microsoft.com/office/powerpoint/2010/main" id="1" dur="indefinite" restart="never" nodeType="tmRoot"/>
+      </p:par>
+    </p:tnLst>
+  </p:timing>
+</p:sld>
+</file>
+
+<file path=ppt/slides/slide30.xml><?xml version="1.0" encoding="utf-8"?>
 <p:sld xmlns:a="http://schemas.openxmlformats.org/drawingml/2006/main" xmlns:r="http://schemas.openxmlformats.org/officeDocument/2006/relationships" xmlns:p="http://schemas.openxmlformats.org/presentationml/2006/main">
   <p:cSld>
     <p:spTree>
@@ -13039,7 +14074,7 @@
 </p:sld>
 </file>
 
-<file path=ppt/slides/slide29.xml><?xml version="1.0" encoding="utf-8"?>
+<file path=ppt/slides/slide31.xml><?xml version="1.0" encoding="utf-8"?>
 <p:sld xmlns:a="http://schemas.openxmlformats.org/drawingml/2006/main" xmlns:r="http://schemas.openxmlformats.org/officeDocument/2006/relationships" xmlns:p="http://schemas.openxmlformats.org/presentationml/2006/main">
   <p:cSld>
     <p:spTree>
@@ -13121,454 +14156,6 @@
     <p:extLst>
       <p:ext uri="{BB962C8B-B14F-4D97-AF65-F5344CB8AC3E}">
         <p14:creationId xmlns:p14="http://schemas.microsoft.com/office/powerpoint/2010/main" val="1578632949"/>
-      </p:ext>
-    </p:extLst>
-  </p:cSld>
-  <p:clrMapOvr>
-    <a:masterClrMapping/>
-  </p:clrMapOvr>
-</p:sld>
-</file>
-
-<file path=ppt/slides/slide3.xml><?xml version="1.0" encoding="utf-8"?>
-<p:sld xmlns:a="http://schemas.openxmlformats.org/drawingml/2006/main" xmlns:r="http://schemas.openxmlformats.org/officeDocument/2006/relationships" xmlns:p="http://schemas.openxmlformats.org/presentationml/2006/main">
-  <p:cSld>
-    <p:spTree>
-      <p:nvGrpSpPr>
-        <p:cNvPr id="1" name=""/>
-        <p:cNvGrpSpPr/>
-        <p:nvPr/>
-      </p:nvGrpSpPr>
-      <p:grpSpPr>
-        <a:xfrm>
-          <a:off x="0" y="0"/>
-          <a:ext cx="0" cy="0"/>
-          <a:chOff x="0" y="0"/>
-          <a:chExt cx="0" cy="0"/>
-        </a:xfrm>
-      </p:grpSpPr>
-      <p:sp>
-        <p:nvSpPr>
-          <p:cNvPr id="7" name="Title 6"/>
-          <p:cNvSpPr>
-            <a:spLocks noGrp="1"/>
-          </p:cNvSpPr>
-          <p:nvPr>
-            <p:ph type="title"/>
-          </p:nvPr>
-        </p:nvSpPr>
-        <p:spPr/>
-        <p:txBody>
-          <a:bodyPr/>
-          <a:lstStyle/>
-          <a:p>
-            <a:r>
-              <a:rPr lang="en-US" dirty="0" err="1" smtClean="0"/>
-              <a:t>Problema</a:t>
-            </a:r>
-            <a:endParaRPr lang="en-US" dirty="0"/>
-          </a:p>
-        </p:txBody>
-      </p:sp>
-      <p:pic>
-        <p:nvPicPr>
-          <p:cNvPr id="5" name="Content Placeholder 4" descr="wee-adrian1.gif"/>
-          <p:cNvPicPr>
-            <a:picLocks noGrp="1" noChangeAspect="1"/>
-          </p:cNvPicPr>
-          <p:nvPr>
-            <p:ph sz="half" idx="1"/>
-          </p:nvPr>
-        </p:nvPicPr>
-        <p:blipFill>
-          <a:blip r:embed="rId2">
-            <a:extLst>
-              <a:ext uri="{28A0092B-C50C-407E-A947-70E740481C1C}">
-                <a14:useLocalDpi xmlns:a14="http://schemas.microsoft.com/office/drawing/2010/main" val="0"/>
-              </a:ext>
-            </a:extLst>
-          </a:blip>
-          <a:srcRect t="8087" b="8087"/>
-          <a:stretch>
-            <a:fillRect/>
-          </a:stretch>
-        </p:blipFill>
-        <p:spPr>
-          <a:xfrm>
-            <a:off x="1117600" y="2595563"/>
-            <a:ext cx="1175101" cy="1213078"/>
-          </a:xfrm>
-        </p:spPr>
-      </p:pic>
-      <p:pic>
-        <p:nvPicPr>
-          <p:cNvPr id="4" name="Content Placeholder 3" descr="im2.jpg"/>
-          <p:cNvPicPr>
-            <a:picLocks noGrp="1" noChangeAspect="1"/>
-          </p:cNvPicPr>
-          <p:nvPr>
-            <p:ph sz="half" idx="2"/>
-          </p:nvPr>
-        </p:nvPicPr>
-        <p:blipFill>
-          <a:blip r:embed="rId3">
-            <a:extLst>
-              <a:ext uri="{28A0092B-C50C-407E-A947-70E740481C1C}">
-                <a14:useLocalDpi xmlns:a14="http://schemas.microsoft.com/office/drawing/2010/main" val="0"/>
-              </a:ext>
-            </a:extLst>
-          </a:blip>
-          <a:srcRect l="3110" r="3110"/>
-          <a:stretch>
-            <a:fillRect/>
-          </a:stretch>
-        </p:blipFill>
-        <p:spPr>
-          <a:xfrm>
-            <a:off x="4238625" y="2595563"/>
-            <a:ext cx="4675188" cy="3681412"/>
-          </a:xfrm>
-        </p:spPr>
-      </p:pic>
-      <p:pic>
-        <p:nvPicPr>
-          <p:cNvPr id="6" name="Picture 5" descr="if3206.jpeg"/>
-          <p:cNvPicPr>
-            <a:picLocks noChangeAspect="1"/>
-          </p:cNvPicPr>
-          <p:nvPr/>
-        </p:nvPicPr>
-        <p:blipFill>
-          <a:blip r:embed="rId4">
-            <a:extLst>
-              <a:ext uri="{28A0092B-C50C-407E-A947-70E740481C1C}">
-                <a14:useLocalDpi xmlns:a14="http://schemas.microsoft.com/office/drawing/2010/main" val="0"/>
-              </a:ext>
-            </a:extLst>
-          </a:blip>
-          <a:stretch>
-            <a:fillRect/>
-          </a:stretch>
-        </p:blipFill>
-        <p:spPr>
-          <a:xfrm>
-            <a:off x="2314994" y="2595563"/>
-            <a:ext cx="1629508" cy="1213078"/>
-          </a:xfrm>
-          <a:prstGeom prst="rect">
-            <a:avLst/>
-          </a:prstGeom>
-        </p:spPr>
-      </p:pic>
-      <p:pic>
-        <p:nvPicPr>
-          <p:cNvPr id="8" name="Picture 7" descr="wee-kirsty18.gif"/>
-          <p:cNvPicPr>
-            <a:picLocks noChangeAspect="1"/>
-          </p:cNvPicPr>
-          <p:nvPr/>
-        </p:nvPicPr>
-        <p:blipFill>
-          <a:blip r:embed="rId5">
-            <a:extLst>
-              <a:ext uri="{28A0092B-C50C-407E-A947-70E740481C1C}">
-                <a14:useLocalDpi xmlns:a14="http://schemas.microsoft.com/office/drawing/2010/main" val="0"/>
-              </a:ext>
-            </a:extLst>
-          </a:blip>
-          <a:stretch>
-            <a:fillRect/>
-          </a:stretch>
-        </p:blipFill>
-        <p:spPr>
-          <a:xfrm>
-            <a:off x="1112231" y="3889873"/>
-            <a:ext cx="1041400" cy="1193800"/>
-          </a:xfrm>
-          <a:prstGeom prst="rect">
-            <a:avLst/>
-          </a:prstGeom>
-        </p:spPr>
-      </p:pic>
-      <p:pic>
-        <p:nvPicPr>
-          <p:cNvPr id="9" name="Picture 8" descr="if1306.jpeg"/>
-          <p:cNvPicPr>
-            <a:picLocks noChangeAspect="1"/>
-          </p:cNvPicPr>
-          <p:nvPr/>
-        </p:nvPicPr>
-        <p:blipFill>
-          <a:blip r:embed="rId6">
-            <a:extLst>
-              <a:ext uri="{28A0092B-C50C-407E-A947-70E740481C1C}">
-                <a14:useLocalDpi xmlns:a14="http://schemas.microsoft.com/office/drawing/2010/main" val="0"/>
-              </a:ext>
-            </a:extLst>
-          </a:blip>
-          <a:stretch>
-            <a:fillRect/>
-          </a:stretch>
-        </p:blipFill>
-        <p:spPr>
-          <a:xfrm>
-            <a:off x="2314994" y="3978848"/>
-            <a:ext cx="1379718" cy="1027123"/>
-          </a:xfrm>
-          <a:prstGeom prst="rect">
-            <a:avLst/>
-          </a:prstGeom>
-        </p:spPr>
-      </p:pic>
-      <p:pic>
-        <p:nvPicPr>
-          <p:cNvPr id="10" name="Picture 9" descr="if2507.jpeg"/>
-          <p:cNvPicPr>
-            <a:picLocks noChangeAspect="1"/>
-          </p:cNvPicPr>
-          <p:nvPr/>
-        </p:nvPicPr>
-        <p:blipFill>
-          <a:blip r:embed="rId7">
-            <a:extLst>
-              <a:ext uri="{28A0092B-C50C-407E-A947-70E740481C1C}">
-                <a14:useLocalDpi xmlns:a14="http://schemas.microsoft.com/office/drawing/2010/main" val="0"/>
-              </a:ext>
-            </a:extLst>
-          </a:blip>
-          <a:stretch>
-            <a:fillRect/>
-          </a:stretch>
-        </p:blipFill>
-        <p:spPr>
-          <a:xfrm>
-            <a:off x="896331" y="5206454"/>
-            <a:ext cx="1257300" cy="935990"/>
-          </a:xfrm>
-          <a:prstGeom prst="rect">
-            <a:avLst/>
-          </a:prstGeom>
-        </p:spPr>
-      </p:pic>
-      <p:pic>
-        <p:nvPicPr>
-          <p:cNvPr id="13" name="Picture 12" descr="wee-andrew!45.gif"/>
-          <p:cNvPicPr>
-            <a:picLocks noChangeAspect="1"/>
-          </p:cNvPicPr>
-          <p:nvPr/>
-        </p:nvPicPr>
-        <p:blipFill>
-          <a:blip r:embed="rId8">
-            <a:extLst>
-              <a:ext uri="{28A0092B-C50C-407E-A947-70E740481C1C}">
-                <a14:useLocalDpi xmlns:a14="http://schemas.microsoft.com/office/drawing/2010/main" val="0"/>
-              </a:ext>
-            </a:extLst>
-          </a:blip>
-          <a:stretch>
-            <a:fillRect/>
-          </a:stretch>
-        </p:blipFill>
-        <p:spPr>
-          <a:xfrm>
-            <a:off x="2464759" y="5088446"/>
-            <a:ext cx="1041400" cy="1282700"/>
-          </a:xfrm>
-          <a:prstGeom prst="rect">
-            <a:avLst/>
-          </a:prstGeom>
-        </p:spPr>
-      </p:pic>
-    </p:spTree>
-    <p:extLst>
-      <p:ext uri="{BB962C8B-B14F-4D97-AF65-F5344CB8AC3E}">
-        <p14:creationId xmlns:p14="http://schemas.microsoft.com/office/powerpoint/2010/main" val="2977175205"/>
-      </p:ext>
-    </p:extLst>
-  </p:cSld>
-  <p:clrMapOvr>
-    <a:masterClrMapping/>
-  </p:clrMapOvr>
-  <p:timing>
-    <p:tnLst>
-      <p:par>
-        <p:cTn xmlns:p14="http://schemas.microsoft.com/office/powerpoint/2010/main" id="1" dur="indefinite" restart="never" nodeType="tmRoot"/>
-      </p:par>
-    </p:tnLst>
-  </p:timing>
-</p:sld>
-</file>
-
-<file path=ppt/slides/slide30.xml><?xml version="1.0" encoding="utf-8"?>
-<p:sld xmlns:a="http://schemas.openxmlformats.org/drawingml/2006/main" xmlns:r="http://schemas.openxmlformats.org/officeDocument/2006/relationships" xmlns:p="http://schemas.openxmlformats.org/presentationml/2006/main">
-  <p:cSld>
-    <p:spTree>
-      <p:nvGrpSpPr>
-        <p:cNvPr id="1" name=""/>
-        <p:cNvGrpSpPr/>
-        <p:nvPr/>
-      </p:nvGrpSpPr>
-      <p:grpSpPr>
-        <a:xfrm>
-          <a:off x="0" y="0"/>
-          <a:ext cx="0" cy="0"/>
-          <a:chOff x="0" y="0"/>
-          <a:chExt cx="0" cy="0"/>
-        </a:xfrm>
-      </p:grpSpPr>
-      <p:sp>
-        <p:nvSpPr>
-          <p:cNvPr id="2" name="Title 1"/>
-          <p:cNvSpPr>
-            <a:spLocks noGrp="1"/>
-          </p:cNvSpPr>
-          <p:nvPr>
-            <p:ph type="title"/>
-          </p:nvPr>
-        </p:nvSpPr>
-        <p:spPr/>
-        <p:txBody>
-          <a:bodyPr/>
-          <a:lstStyle/>
-          <a:p>
-            <a:r>
-              <a:rPr lang="en-US" dirty="0" err="1" smtClean="0"/>
-              <a:t>Inicialização</a:t>
-            </a:r>
-            <a:r>
-              <a:rPr lang="en-US" dirty="0" smtClean="0"/>
-              <a:t> do LVQ</a:t>
-            </a:r>
-            <a:endParaRPr lang="en-US" dirty="0"/>
-          </a:p>
-        </p:txBody>
-      </p:sp>
-      <p:pic>
-        <p:nvPicPr>
-          <p:cNvPr id="5" name="Content Placeholder 4" descr="Screen Shot 2012-07-12 at 11.46.15 PM.png"/>
-          <p:cNvPicPr>
-            <a:picLocks noGrp="1" noChangeAspect="1"/>
-          </p:cNvPicPr>
-          <p:nvPr>
-            <p:ph idx="1"/>
-          </p:nvPr>
-        </p:nvPicPr>
-        <p:blipFill>
-          <a:blip r:embed="rId2">
-            <a:extLst>
-              <a:ext uri="{28A0092B-C50C-407E-A947-70E740481C1C}">
-                <a14:useLocalDpi xmlns:a14="http://schemas.microsoft.com/office/drawing/2010/main" val="0"/>
-              </a:ext>
-            </a:extLst>
-          </a:blip>
-          <a:srcRect l="-2864" r="-2864"/>
-          <a:stretch>
-            <a:fillRect/>
-          </a:stretch>
-        </p:blipFill>
-        <p:spPr>
-          <a:xfrm>
-            <a:off x="1114424" y="2193534"/>
-            <a:ext cx="7610476" cy="4374240"/>
-          </a:xfrm>
-        </p:spPr>
-      </p:pic>
-    </p:spTree>
-    <p:extLst>
-      <p:ext uri="{BB962C8B-B14F-4D97-AF65-F5344CB8AC3E}">
-        <p14:creationId xmlns:p14="http://schemas.microsoft.com/office/powerpoint/2010/main" val="311323214"/>
-      </p:ext>
-    </p:extLst>
-  </p:cSld>
-  <p:clrMapOvr>
-    <a:masterClrMapping/>
-  </p:clrMapOvr>
-</p:sld>
-</file>
-
-<file path=ppt/slides/slide31.xml><?xml version="1.0" encoding="utf-8"?>
-<p:sld xmlns:a="http://schemas.openxmlformats.org/drawingml/2006/main" xmlns:r="http://schemas.openxmlformats.org/officeDocument/2006/relationships" xmlns:p="http://schemas.openxmlformats.org/presentationml/2006/main">
-  <p:cSld>
-    <p:spTree>
-      <p:nvGrpSpPr>
-        <p:cNvPr id="1" name=""/>
-        <p:cNvGrpSpPr/>
-        <p:nvPr/>
-      </p:nvGrpSpPr>
-      <p:grpSpPr>
-        <a:xfrm>
-          <a:off x="0" y="0"/>
-          <a:ext cx="0" cy="0"/>
-          <a:chOff x="0" y="0"/>
-          <a:chExt cx="0" cy="0"/>
-        </a:xfrm>
-      </p:grpSpPr>
-      <p:sp>
-        <p:nvSpPr>
-          <p:cNvPr id="2" name="Title 1"/>
-          <p:cNvSpPr>
-            <a:spLocks noGrp="1"/>
-          </p:cNvSpPr>
-          <p:nvPr>
-            <p:ph type="title"/>
-          </p:nvPr>
-        </p:nvSpPr>
-        <p:spPr/>
-        <p:txBody>
-          <a:bodyPr/>
-          <a:lstStyle/>
-          <a:p>
-            <a:r>
-              <a:rPr lang="en-US" dirty="0" err="1" smtClean="0"/>
-              <a:t>Treinamento</a:t>
-            </a:r>
-            <a:r>
-              <a:rPr lang="en-US" dirty="0" smtClean="0"/>
-              <a:t> </a:t>
-            </a:r>
-            <a:r>
-              <a:rPr lang="en-US" dirty="0" smtClean="0"/>
-              <a:t>do LVQ</a:t>
-            </a:r>
-            <a:endParaRPr lang="en-US" dirty="0"/>
-          </a:p>
-        </p:txBody>
-      </p:sp>
-      <p:pic>
-        <p:nvPicPr>
-          <p:cNvPr id="4" name="Content Placeholder 3" descr="Screen Shot 2012-07-12 at 11.48.38 PM.png"/>
-          <p:cNvPicPr>
-            <a:picLocks noGrp="1" noChangeAspect="1"/>
-          </p:cNvPicPr>
-          <p:nvPr>
-            <p:ph idx="1"/>
-          </p:nvPr>
-        </p:nvPicPr>
-        <p:blipFill>
-          <a:blip r:embed="rId2">
-            <a:extLst>
-              <a:ext uri="{28A0092B-C50C-407E-A947-70E740481C1C}">
-                <a14:useLocalDpi xmlns:a14="http://schemas.microsoft.com/office/drawing/2010/main" val="0"/>
-              </a:ext>
-            </a:extLst>
-          </a:blip>
-          <a:srcRect l="-4391" r="-4391"/>
-          <a:stretch>
-            <a:fillRect/>
-          </a:stretch>
-        </p:blipFill>
-        <p:spPr>
-          <a:xfrm>
-            <a:off x="1114424" y="2038256"/>
-            <a:ext cx="7610476" cy="4619311"/>
-          </a:xfrm>
-        </p:spPr>
-      </p:pic>
-    </p:spTree>
-    <p:extLst>
-      <p:ext uri="{BB962C8B-B14F-4D97-AF65-F5344CB8AC3E}">
-        <p14:creationId xmlns:p14="http://schemas.microsoft.com/office/powerpoint/2010/main" val="2696381677"/>
       </p:ext>
     </p:extLst>
   </p:cSld>
@@ -13612,22 +14199,19 @@
           <a:p>
             <a:r>
               <a:rPr lang="en-US" dirty="0" err="1" smtClean="0"/>
-              <a:t>Treinamento</a:t>
+              <a:t>Inicialização</a:t>
             </a:r>
             <a:r>
               <a:rPr lang="en-US" dirty="0" smtClean="0"/>
-              <a:t> </a:t>
-            </a:r>
-            <a:r>
-              <a:rPr lang="en-US" dirty="0"/>
-              <a:t>do LVQ</a:t>
-            </a:r>
+              <a:t> do LVQ</a:t>
+            </a:r>
+            <a:endParaRPr lang="en-US" dirty="0"/>
           </a:p>
         </p:txBody>
       </p:sp>
       <p:pic>
         <p:nvPicPr>
-          <p:cNvPr id="4" name="Content Placeholder 3" descr="Screen Shot 2012-07-12 at 11.49.25 PM.png"/>
+          <p:cNvPr id="5" name="Content Placeholder 4" descr="Screen Shot 2012-07-12 at 11.46.15 PM.png"/>
           <p:cNvPicPr>
             <a:picLocks noGrp="1" noChangeAspect="1"/>
           </p:cNvPicPr>
@@ -13643,22 +14227,22 @@
               </a:ext>
             </a:extLst>
           </a:blip>
-          <a:srcRect l="-13850" r="-13850"/>
+          <a:srcRect l="-2864" r="-2864"/>
           <a:stretch>
             <a:fillRect/>
           </a:stretch>
         </p:blipFill>
         <p:spPr>
           <a:xfrm>
-            <a:off x="1114424" y="2038256"/>
-            <a:ext cx="7610476" cy="4632139"/>
+            <a:off x="1114424" y="2193534"/>
+            <a:ext cx="7610476" cy="4374240"/>
           </a:xfrm>
         </p:spPr>
       </p:pic>
     </p:spTree>
     <p:extLst>
       <p:ext uri="{BB962C8B-B14F-4D97-AF65-F5344CB8AC3E}">
-        <p14:creationId xmlns:p14="http://schemas.microsoft.com/office/powerpoint/2010/main" val="3395460155"/>
+        <p14:creationId xmlns:p14="http://schemas.microsoft.com/office/powerpoint/2010/main" val="311323214"/>
       </p:ext>
     </p:extLst>
   </p:cSld>
@@ -13706,18 +14290,15 @@
             </a:r>
             <a:r>
               <a:rPr lang="en-US" dirty="0" smtClean="0"/>
-              <a:t> </a:t>
-            </a:r>
-            <a:r>
-              <a:rPr lang="en-US" dirty="0"/>
-              <a:t>do LVQ</a:t>
-            </a:r>
+              <a:t> do LVQ</a:t>
+            </a:r>
+            <a:endParaRPr lang="en-US" dirty="0"/>
           </a:p>
         </p:txBody>
       </p:sp>
       <p:pic>
         <p:nvPicPr>
-          <p:cNvPr id="4" name="Content Placeholder 3" descr="Screen Shot 2012-07-12 at 11.50.12 PM.png"/>
+          <p:cNvPr id="4" name="Content Placeholder 3" descr="Screen Shot 2012-07-12 at 11.48.38 PM.png"/>
           <p:cNvPicPr>
             <a:picLocks noGrp="1" noChangeAspect="1"/>
           </p:cNvPicPr>
@@ -13733,7 +14314,7 @@
               </a:ext>
             </a:extLst>
           </a:blip>
-          <a:srcRect t="-29241" b="-29241"/>
+          <a:srcRect l="-4391" r="-4391"/>
           <a:stretch>
             <a:fillRect/>
           </a:stretch>
@@ -13741,14 +14322,14 @@
         <p:spPr>
           <a:xfrm>
             <a:off x="1114424" y="2038256"/>
-            <a:ext cx="7610476" cy="4580828"/>
+            <a:ext cx="7610476" cy="4619311"/>
           </a:xfrm>
         </p:spPr>
       </p:pic>
     </p:spTree>
     <p:extLst>
       <p:ext uri="{BB962C8B-B14F-4D97-AF65-F5344CB8AC3E}">
-        <p14:creationId xmlns:p14="http://schemas.microsoft.com/office/powerpoint/2010/main" val="3503064792"/>
+        <p14:creationId xmlns:p14="http://schemas.microsoft.com/office/powerpoint/2010/main" val="2696381677"/>
       </p:ext>
     </p:extLst>
   </p:cSld>
@@ -13807,7 +14388,7 @@
       </p:sp>
       <p:pic>
         <p:nvPicPr>
-          <p:cNvPr id="4" name="Content Placeholder 3" descr="Screen Shot 2012-07-12 at 11.51.18 PM.png"/>
+          <p:cNvPr id="4" name="Content Placeholder 3" descr="Screen Shot 2012-07-12 at 11.49.25 PM.png"/>
           <p:cNvPicPr>
             <a:picLocks noGrp="1" noChangeAspect="1"/>
           </p:cNvPicPr>
@@ -13823,7 +14404,7 @@
               </a:ext>
             </a:extLst>
           </a:blip>
-          <a:srcRect t="-440" b="-440"/>
+          <a:srcRect l="-13850" r="-13850"/>
           <a:stretch>
             <a:fillRect/>
           </a:stretch>
@@ -13831,14 +14412,14 @@
         <p:spPr>
           <a:xfrm>
             <a:off x="1114424" y="2038256"/>
-            <a:ext cx="7610476" cy="4619311"/>
+            <a:ext cx="7610476" cy="4632139"/>
           </a:xfrm>
         </p:spPr>
       </p:pic>
     </p:spTree>
     <p:extLst>
       <p:ext uri="{BB962C8B-B14F-4D97-AF65-F5344CB8AC3E}">
-        <p14:creationId xmlns:p14="http://schemas.microsoft.com/office/powerpoint/2010/main" val="3170423507"/>
+        <p14:creationId xmlns:p14="http://schemas.microsoft.com/office/powerpoint/2010/main" val="3395460155"/>
       </p:ext>
     </p:extLst>
   </p:cSld>
@@ -13881,16 +14462,23 @@
           <a:lstStyle/>
           <a:p>
             <a:r>
+              <a:rPr lang="en-US" dirty="0" err="1" smtClean="0"/>
+              <a:t>Treinamento</a:t>
+            </a:r>
+            <a:r>
               <a:rPr lang="en-US" dirty="0" smtClean="0"/>
-              <a:t>Testes do LVQ</a:t>
-            </a:r>
-            <a:endParaRPr lang="en-US" dirty="0"/>
+              <a:t> </a:t>
+            </a:r>
+            <a:r>
+              <a:rPr lang="en-US" dirty="0"/>
+              <a:t>do LVQ</a:t>
+            </a:r>
           </a:p>
         </p:txBody>
       </p:sp>
       <p:pic>
         <p:nvPicPr>
-          <p:cNvPr id="4" name="Content Placeholder 3" descr="Screen Shot 2012-07-12 at 11.51.52 PM.png"/>
+          <p:cNvPr id="4" name="Content Placeholder 3" descr="Screen Shot 2012-07-12 at 11.50.12 PM.png"/>
           <p:cNvPicPr>
             <a:picLocks noGrp="1" noChangeAspect="1"/>
           </p:cNvPicPr>
@@ -13906,7 +14494,7 @@
               </a:ext>
             </a:extLst>
           </a:blip>
-          <a:srcRect l="-9576" r="-9576"/>
+          <a:srcRect t="-29241" b="-29241"/>
           <a:stretch>
             <a:fillRect/>
           </a:stretch>
@@ -13914,14 +14502,14 @@
         <p:spPr>
           <a:xfrm>
             <a:off x="1114424" y="2038256"/>
-            <a:ext cx="7610476" cy="4401241"/>
+            <a:ext cx="7610476" cy="4580828"/>
           </a:xfrm>
         </p:spPr>
       </p:pic>
     </p:spTree>
     <p:extLst>
       <p:ext uri="{BB962C8B-B14F-4D97-AF65-F5344CB8AC3E}">
-        <p14:creationId xmlns:p14="http://schemas.microsoft.com/office/powerpoint/2010/main" val="2163541549"/>
+        <p14:creationId xmlns:p14="http://schemas.microsoft.com/office/powerpoint/2010/main" val="3503064792"/>
       </p:ext>
     </p:extLst>
   </p:cSld>
@@ -13964,24 +14552,29 @@
           <a:lstStyle/>
           <a:p>
             <a:r>
-              <a:rPr lang="en-US" dirty="0" smtClean="0"/>
-              <a:t>Base de </a:t>
-            </a:r>
-            <a:r>
               <a:rPr lang="en-US" dirty="0" err="1" smtClean="0"/>
               <a:t>Treinamento</a:t>
             </a:r>
-            <a:endParaRPr lang="en-US" dirty="0"/>
+            <a:r>
+              <a:rPr lang="en-US" dirty="0" smtClean="0"/>
+              <a:t> </a:t>
+            </a:r>
+            <a:r>
+              <a:rPr lang="en-US" dirty="0"/>
+              <a:t>do LVQ</a:t>
+            </a:r>
           </a:p>
         </p:txBody>
       </p:sp>
       <p:pic>
         <p:nvPicPr>
-          <p:cNvPr id="13" name="Picture 12" descr="7.png"/>
+          <p:cNvPr id="4" name="Content Placeholder 3" descr="Screen Shot 2012-07-12 at 11.51.18 PM.png"/>
           <p:cNvPicPr>
-            <a:picLocks noChangeAspect="1"/>
+            <a:picLocks noGrp="1" noChangeAspect="1"/>
           </p:cNvPicPr>
-          <p:nvPr/>
+          <p:nvPr>
+            <p:ph idx="1"/>
+          </p:nvPr>
         </p:nvPicPr>
         <p:blipFill>
           <a:blip r:embed="rId2">
@@ -13991,547 +14584,28 @@
               </a:ext>
             </a:extLst>
           </a:blip>
+          <a:srcRect t="-440" b="-440"/>
           <a:stretch>
             <a:fillRect/>
           </a:stretch>
         </p:blipFill>
         <p:spPr>
           <a:xfrm>
-            <a:off x="2365068" y="2595562"/>
-            <a:ext cx="672194" cy="1008291"/>
-          </a:xfrm>
-          <a:prstGeom prst="rect">
-            <a:avLst/>
-          </a:prstGeom>
-        </p:spPr>
-      </p:pic>
-      <p:pic>
-        <p:nvPicPr>
-          <p:cNvPr id="14" name="Picture 13" descr="8.png"/>
-          <p:cNvPicPr>
-            <a:picLocks noChangeAspect="1"/>
-          </p:cNvPicPr>
-          <p:nvPr/>
-        </p:nvPicPr>
-        <p:blipFill>
-          <a:blip r:embed="rId3">
-            <a:extLst>
-              <a:ext uri="{28A0092B-C50C-407E-A947-70E740481C1C}">
-                <a14:useLocalDpi xmlns:a14="http://schemas.microsoft.com/office/drawing/2010/main" val="0"/>
-              </a:ext>
-            </a:extLst>
-          </a:blip>
-          <a:stretch>
-            <a:fillRect/>
-          </a:stretch>
-        </p:blipFill>
-        <p:spPr>
-          <a:xfrm>
-            <a:off x="1611564" y="2595563"/>
-            <a:ext cx="672193" cy="1008290"/>
-          </a:xfrm>
-          <a:prstGeom prst="rect">
-            <a:avLst/>
-          </a:prstGeom>
-        </p:spPr>
-      </p:pic>
-      <p:pic>
-        <p:nvPicPr>
-          <p:cNvPr id="15" name="Picture 14" descr="14.png"/>
-          <p:cNvPicPr>
-            <a:picLocks noChangeAspect="1"/>
-          </p:cNvPicPr>
-          <p:nvPr/>
-        </p:nvPicPr>
-        <p:blipFill>
-          <a:blip r:embed="rId4">
-            <a:extLst>
-              <a:ext uri="{28A0092B-C50C-407E-A947-70E740481C1C}">
-                <a14:useLocalDpi xmlns:a14="http://schemas.microsoft.com/office/drawing/2010/main" val="0"/>
-              </a:ext>
-            </a:extLst>
-          </a:blip>
-          <a:stretch>
-            <a:fillRect/>
-          </a:stretch>
-        </p:blipFill>
-        <p:spPr>
-          <a:xfrm>
-            <a:off x="2333238" y="3673702"/>
-            <a:ext cx="704023" cy="1056035"/>
-          </a:xfrm>
-          <a:prstGeom prst="rect">
-            <a:avLst/>
-          </a:prstGeom>
-        </p:spPr>
-      </p:pic>
-      <p:pic>
-        <p:nvPicPr>
-          <p:cNvPr id="16" name="Picture 15" descr="23.png"/>
-          <p:cNvPicPr>
-            <a:picLocks noChangeAspect="1"/>
-          </p:cNvPicPr>
-          <p:nvPr/>
-        </p:nvPicPr>
-        <p:blipFill>
-          <a:blip r:embed="rId5">
-            <a:extLst>
-              <a:ext uri="{28A0092B-C50C-407E-A947-70E740481C1C}">
-                <a14:useLocalDpi xmlns:a14="http://schemas.microsoft.com/office/drawing/2010/main" val="0"/>
-              </a:ext>
-            </a:extLst>
-          </a:blip>
-          <a:stretch>
-            <a:fillRect/>
-          </a:stretch>
-        </p:blipFill>
-        <p:spPr>
-          <a:xfrm>
-            <a:off x="3118572" y="3673703"/>
-            <a:ext cx="704023" cy="1056034"/>
-          </a:xfrm>
-          <a:prstGeom prst="rect">
-            <a:avLst/>
-          </a:prstGeom>
-        </p:spPr>
-      </p:pic>
-      <p:pic>
-        <p:nvPicPr>
-          <p:cNvPr id="17" name="Picture 16" descr="27.png"/>
-          <p:cNvPicPr>
-            <a:picLocks noChangeAspect="1"/>
-          </p:cNvPicPr>
-          <p:nvPr/>
-        </p:nvPicPr>
-        <p:blipFill>
-          <a:blip r:embed="rId6">
-            <a:extLst>
-              <a:ext uri="{28A0092B-C50C-407E-A947-70E740481C1C}">
-                <a14:useLocalDpi xmlns:a14="http://schemas.microsoft.com/office/drawing/2010/main" val="0"/>
-              </a:ext>
-            </a:extLst>
-          </a:blip>
-          <a:stretch>
-            <a:fillRect/>
-          </a:stretch>
-        </p:blipFill>
-        <p:spPr>
-          <a:xfrm>
-            <a:off x="1576585" y="3673703"/>
-            <a:ext cx="704020" cy="1056034"/>
-          </a:xfrm>
-          <a:prstGeom prst="rect">
-            <a:avLst/>
-          </a:prstGeom>
-        </p:spPr>
-      </p:pic>
-      <p:pic>
-        <p:nvPicPr>
-          <p:cNvPr id="18" name="Picture 17" descr="4.png"/>
-          <p:cNvPicPr>
-            <a:picLocks noChangeAspect="1"/>
-          </p:cNvPicPr>
-          <p:nvPr/>
-        </p:nvPicPr>
-        <p:blipFill>
-          <a:blip r:embed="rId7">
-            <a:extLst>
-              <a:ext uri="{28A0092B-C50C-407E-A947-70E740481C1C}">
-                <a14:useLocalDpi xmlns:a14="http://schemas.microsoft.com/office/drawing/2010/main" val="0"/>
-              </a:ext>
-            </a:extLst>
-          </a:blip>
-          <a:stretch>
-            <a:fillRect/>
-          </a:stretch>
-        </p:blipFill>
-        <p:spPr>
-          <a:xfrm>
-            <a:off x="3118573" y="2595563"/>
-            <a:ext cx="672193" cy="1008290"/>
-          </a:xfrm>
-          <a:prstGeom prst="rect">
-            <a:avLst/>
-          </a:prstGeom>
-        </p:spPr>
-      </p:pic>
-      <p:pic>
-        <p:nvPicPr>
-          <p:cNvPr id="20" name="Picture 19" descr="47.png"/>
-          <p:cNvPicPr>
-            <a:picLocks noChangeAspect="1"/>
-          </p:cNvPicPr>
-          <p:nvPr/>
-        </p:nvPicPr>
-        <p:blipFill>
-          <a:blip r:embed="rId8">
-            <a:extLst>
-              <a:ext uri="{28A0092B-C50C-407E-A947-70E740481C1C}">
-                <a14:useLocalDpi xmlns:a14="http://schemas.microsoft.com/office/drawing/2010/main" val="0"/>
-              </a:ext>
-            </a:extLst>
-          </a:blip>
-          <a:stretch>
-            <a:fillRect/>
-          </a:stretch>
-        </p:blipFill>
-        <p:spPr>
-          <a:xfrm>
-            <a:off x="1576585" y="4836684"/>
-            <a:ext cx="704020" cy="1056030"/>
-          </a:xfrm>
-          <a:prstGeom prst="rect">
-            <a:avLst/>
-          </a:prstGeom>
-        </p:spPr>
-      </p:pic>
-      <p:pic>
-        <p:nvPicPr>
-          <p:cNvPr id="21" name="Picture 20" descr="44.png"/>
-          <p:cNvPicPr>
-            <a:picLocks noChangeAspect="1"/>
-          </p:cNvPicPr>
-          <p:nvPr/>
-        </p:nvPicPr>
-        <p:blipFill>
-          <a:blip r:embed="rId9">
-            <a:extLst>
-              <a:ext uri="{28A0092B-C50C-407E-A947-70E740481C1C}">
-                <a14:useLocalDpi xmlns:a14="http://schemas.microsoft.com/office/drawing/2010/main" val="0"/>
-              </a:ext>
-            </a:extLst>
-          </a:blip>
-          <a:stretch>
-            <a:fillRect/>
-          </a:stretch>
-        </p:blipFill>
-        <p:spPr>
-          <a:xfrm>
-            <a:off x="2333238" y="4843179"/>
-            <a:ext cx="704024" cy="1056036"/>
-          </a:xfrm>
-          <a:prstGeom prst="rect">
-            <a:avLst/>
-          </a:prstGeom>
-        </p:spPr>
-      </p:pic>
-      <p:pic>
-        <p:nvPicPr>
-          <p:cNvPr id="22" name="Picture 21" descr="42.png"/>
-          <p:cNvPicPr>
-            <a:picLocks noChangeAspect="1"/>
-          </p:cNvPicPr>
-          <p:nvPr/>
-        </p:nvPicPr>
-        <p:blipFill>
-          <a:blip r:embed="rId10">
-            <a:extLst>
-              <a:ext uri="{28A0092B-C50C-407E-A947-70E740481C1C}">
-                <a14:useLocalDpi xmlns:a14="http://schemas.microsoft.com/office/drawing/2010/main" val="0"/>
-              </a:ext>
-            </a:extLst>
-          </a:blip>
-          <a:stretch>
-            <a:fillRect/>
-          </a:stretch>
-        </p:blipFill>
-        <p:spPr>
-          <a:xfrm>
-            <a:off x="3118572" y="4836683"/>
-            <a:ext cx="672194" cy="1008291"/>
-          </a:xfrm>
-          <a:prstGeom prst="rect">
-            <a:avLst/>
-          </a:prstGeom>
-        </p:spPr>
-      </p:pic>
-      <p:pic>
-        <p:nvPicPr>
-          <p:cNvPr id="23" name="Picture 22" descr="5.png"/>
-          <p:cNvPicPr>
-            <a:picLocks noChangeAspect="1"/>
-          </p:cNvPicPr>
-          <p:nvPr/>
-        </p:nvPicPr>
-        <p:blipFill>
-          <a:blip r:embed="rId11">
-            <a:extLst>
-              <a:ext uri="{28A0092B-C50C-407E-A947-70E740481C1C}">
-                <a14:useLocalDpi xmlns:a14="http://schemas.microsoft.com/office/drawing/2010/main" val="0"/>
-              </a:ext>
-            </a:extLst>
-          </a:blip>
-          <a:stretch>
-            <a:fillRect/>
-          </a:stretch>
-        </p:blipFill>
-        <p:spPr>
-          <a:xfrm>
-            <a:off x="6068724" y="2595561"/>
-            <a:ext cx="677424" cy="1016137"/>
-          </a:xfrm>
-          <a:prstGeom prst="rect">
-            <a:avLst/>
-          </a:prstGeom>
-        </p:spPr>
-      </p:pic>
-      <p:pic>
-        <p:nvPicPr>
-          <p:cNvPr id="24" name="Picture 23" descr="10.png"/>
-          <p:cNvPicPr>
-            <a:picLocks noChangeAspect="1"/>
-          </p:cNvPicPr>
-          <p:nvPr/>
-        </p:nvPicPr>
-        <p:blipFill>
-          <a:blip r:embed="rId12">
-            <a:extLst>
-              <a:ext uri="{28A0092B-C50C-407E-A947-70E740481C1C}">
-                <a14:useLocalDpi xmlns:a14="http://schemas.microsoft.com/office/drawing/2010/main" val="0"/>
-              </a:ext>
-            </a:extLst>
-          </a:blip>
-          <a:stretch>
-            <a:fillRect/>
-          </a:stretch>
-        </p:blipFill>
-        <p:spPr>
-          <a:xfrm>
-            <a:off x="5287283" y="2595563"/>
-            <a:ext cx="672194" cy="1008291"/>
-          </a:xfrm>
-          <a:prstGeom prst="rect">
-            <a:avLst/>
-          </a:prstGeom>
-        </p:spPr>
-      </p:pic>
-      <p:pic>
-        <p:nvPicPr>
-          <p:cNvPr id="25" name="Picture 24" descr="15.png"/>
-          <p:cNvPicPr>
-            <a:picLocks noChangeAspect="1"/>
-          </p:cNvPicPr>
-          <p:nvPr/>
-        </p:nvPicPr>
-        <p:blipFill>
-          <a:blip r:embed="rId13">
-            <a:extLst>
-              <a:ext uri="{28A0092B-C50C-407E-A947-70E740481C1C}">
-                <a14:useLocalDpi xmlns:a14="http://schemas.microsoft.com/office/drawing/2010/main" val="0"/>
-              </a:ext>
-            </a:extLst>
-          </a:blip>
-          <a:stretch>
-            <a:fillRect/>
-          </a:stretch>
-        </p:blipFill>
-        <p:spPr>
-          <a:xfrm>
-            <a:off x="6847432" y="2595563"/>
-            <a:ext cx="673945" cy="1010918"/>
-          </a:xfrm>
-          <a:prstGeom prst="rect">
-            <a:avLst/>
-          </a:prstGeom>
-        </p:spPr>
-      </p:pic>
-      <p:pic>
-        <p:nvPicPr>
-          <p:cNvPr id="26" name="Picture 25" descr="14.png"/>
-          <p:cNvPicPr>
-            <a:picLocks noChangeAspect="1"/>
-          </p:cNvPicPr>
-          <p:nvPr/>
-        </p:nvPicPr>
-        <p:blipFill>
-          <a:blip r:embed="rId14">
-            <a:extLst>
-              <a:ext uri="{28A0092B-C50C-407E-A947-70E740481C1C}">
-                <a14:useLocalDpi xmlns:a14="http://schemas.microsoft.com/office/drawing/2010/main" val="0"/>
-              </a:ext>
-            </a:extLst>
-          </a:blip>
-          <a:stretch>
-            <a:fillRect/>
-          </a:stretch>
-        </p:blipFill>
-        <p:spPr>
-          <a:xfrm>
-            <a:off x="6068724" y="3673703"/>
-            <a:ext cx="677424" cy="1016136"/>
-          </a:xfrm>
-          <a:prstGeom prst="rect">
-            <a:avLst/>
-          </a:prstGeom>
-        </p:spPr>
-      </p:pic>
-      <p:pic>
-        <p:nvPicPr>
-          <p:cNvPr id="27" name="Picture 26" descr="20.png"/>
-          <p:cNvPicPr>
-            <a:picLocks noChangeAspect="1"/>
-          </p:cNvPicPr>
-          <p:nvPr/>
-        </p:nvPicPr>
-        <p:blipFill>
-          <a:blip r:embed="rId15">
-            <a:extLst>
-              <a:ext uri="{28A0092B-C50C-407E-A947-70E740481C1C}">
-                <a14:useLocalDpi xmlns:a14="http://schemas.microsoft.com/office/drawing/2010/main" val="0"/>
-              </a:ext>
-            </a:extLst>
-          </a:blip>
-          <a:stretch>
-            <a:fillRect/>
-          </a:stretch>
-        </p:blipFill>
-        <p:spPr>
-          <a:xfrm>
-            <a:off x="6847431" y="3673701"/>
-            <a:ext cx="677425" cy="1016138"/>
-          </a:xfrm>
-          <a:prstGeom prst="rect">
-            <a:avLst/>
-          </a:prstGeom>
-        </p:spPr>
-      </p:pic>
-      <p:pic>
-        <p:nvPicPr>
-          <p:cNvPr id="28" name="Picture 27" descr="25.png"/>
-          <p:cNvPicPr>
-            <a:picLocks noChangeAspect="1"/>
-          </p:cNvPicPr>
-          <p:nvPr/>
-        </p:nvPicPr>
-        <p:blipFill>
-          <a:blip r:embed="rId16">
-            <a:extLst>
-              <a:ext uri="{28A0092B-C50C-407E-A947-70E740481C1C}">
-                <a14:useLocalDpi xmlns:a14="http://schemas.microsoft.com/office/drawing/2010/main" val="0"/>
-              </a:ext>
-            </a:extLst>
-          </a:blip>
-          <a:stretch>
-            <a:fillRect/>
-          </a:stretch>
-        </p:blipFill>
-        <p:spPr>
-          <a:xfrm>
-            <a:off x="5287282" y="3673701"/>
-            <a:ext cx="704023" cy="1056035"/>
-          </a:xfrm>
-          <a:prstGeom prst="rect">
-            <a:avLst/>
-          </a:prstGeom>
-        </p:spPr>
-      </p:pic>
-      <p:pic>
-        <p:nvPicPr>
-          <p:cNvPr id="29" name="Picture 28" descr="22.png"/>
-          <p:cNvPicPr>
-            <a:picLocks noChangeAspect="1"/>
-          </p:cNvPicPr>
-          <p:nvPr/>
-        </p:nvPicPr>
-        <p:blipFill>
-          <a:blip r:embed="rId17">
-            <a:extLst>
-              <a:ext uri="{28A0092B-C50C-407E-A947-70E740481C1C}">
-                <a14:useLocalDpi xmlns:a14="http://schemas.microsoft.com/office/drawing/2010/main" val="0"/>
-              </a:ext>
-            </a:extLst>
-          </a:blip>
-          <a:stretch>
-            <a:fillRect/>
-          </a:stretch>
-        </p:blipFill>
-        <p:spPr>
-          <a:xfrm>
-            <a:off x="5279319" y="4843179"/>
-            <a:ext cx="680157" cy="1020236"/>
-          </a:xfrm>
-          <a:prstGeom prst="rect">
-            <a:avLst/>
-          </a:prstGeom>
-        </p:spPr>
-      </p:pic>
-      <p:pic>
-        <p:nvPicPr>
-          <p:cNvPr id="30" name="Picture 29" descr="23.png"/>
-          <p:cNvPicPr>
-            <a:picLocks noChangeAspect="1"/>
-          </p:cNvPicPr>
-          <p:nvPr/>
-        </p:nvPicPr>
-        <p:blipFill>
-          <a:blip r:embed="rId18">
-            <a:extLst>
-              <a:ext uri="{28A0092B-C50C-407E-A947-70E740481C1C}">
-                <a14:useLocalDpi xmlns:a14="http://schemas.microsoft.com/office/drawing/2010/main" val="0"/>
-              </a:ext>
-            </a:extLst>
-          </a:blip>
-          <a:stretch>
-            <a:fillRect/>
-          </a:stretch>
-        </p:blipFill>
-        <p:spPr>
-          <a:xfrm>
-            <a:off x="6068724" y="4869675"/>
-            <a:ext cx="686360" cy="1029540"/>
-          </a:xfrm>
-          <a:prstGeom prst="rect">
-            <a:avLst/>
-          </a:prstGeom>
-        </p:spPr>
-      </p:pic>
-      <p:pic>
-        <p:nvPicPr>
-          <p:cNvPr id="31" name="Picture 30" descr="26.png"/>
-          <p:cNvPicPr>
-            <a:picLocks noChangeAspect="1"/>
-          </p:cNvPicPr>
-          <p:nvPr/>
-        </p:nvPicPr>
-        <p:blipFill>
-          <a:blip r:embed="rId19">
-            <a:extLst>
-              <a:ext uri="{28A0092B-C50C-407E-A947-70E740481C1C}">
-                <a14:useLocalDpi xmlns:a14="http://schemas.microsoft.com/office/drawing/2010/main" val="0"/>
-              </a:ext>
-            </a:extLst>
-          </a:blip>
-          <a:stretch>
-            <a:fillRect/>
-          </a:stretch>
-        </p:blipFill>
-        <p:spPr>
-          <a:xfrm>
-            <a:off x="6847432" y="4836682"/>
-            <a:ext cx="672194" cy="1008291"/>
-          </a:xfrm>
-          <a:prstGeom prst="rect">
-            <a:avLst/>
-          </a:prstGeom>
+            <a:off x="1114424" y="2038256"/>
+            <a:ext cx="7610476" cy="4619311"/>
+          </a:xfrm>
         </p:spPr>
       </p:pic>
     </p:spTree>
     <p:extLst>
       <p:ext uri="{BB962C8B-B14F-4D97-AF65-F5344CB8AC3E}">
-        <p14:creationId xmlns:p14="http://schemas.microsoft.com/office/powerpoint/2010/main" val="3290367094"/>
+        <p14:creationId xmlns:p14="http://schemas.microsoft.com/office/powerpoint/2010/main" val="3170423507"/>
       </p:ext>
     </p:extLst>
   </p:cSld>
   <p:clrMapOvr>
     <a:masterClrMapping/>
   </p:clrMapOvr>
-  <p:timing>
-    <p:tnLst>
-      <p:par>
-        <p:cTn xmlns:p14="http://schemas.microsoft.com/office/powerpoint/2010/main" id="1" dur="indefinite" restart="never" nodeType="tmRoot"/>
-      </p:par>
-    </p:tnLst>
-  </p:timing>
 </p:sld>
 </file>
 
@@ -14568,91 +14642,22 @@
           <a:lstStyle/>
           <a:p>
             <a:r>
-              <a:rPr lang="en-US" dirty="0" err="1" smtClean="0"/>
-              <a:t>Avaliação</a:t>
-            </a:r>
-            <a:r>
               <a:rPr lang="en-US" dirty="0" smtClean="0"/>
-              <a:t> do </a:t>
-            </a:r>
-            <a:r>
-              <a:rPr lang="en-US" dirty="0" err="1" smtClean="0"/>
-              <a:t>Algoritmo</a:t>
-            </a:r>
-            <a:endParaRPr lang="en-US" dirty="0"/>
-          </a:p>
-        </p:txBody>
-      </p:sp>
-      <p:sp>
-        <p:nvSpPr>
-          <p:cNvPr id="5" name="Content Placeholder 4"/>
-          <p:cNvSpPr>
-            <a:spLocks noGrp="1"/>
-          </p:cNvSpPr>
-          <p:nvPr>
-            <p:ph sz="half" idx="2"/>
-          </p:nvPr>
-        </p:nvSpPr>
-        <p:spPr/>
-        <p:txBody>
-          <a:bodyPr/>
-          <a:lstStyle/>
-          <a:p>
-            <a:r>
-              <a:rPr lang="en-US" dirty="0" err="1" smtClean="0"/>
-              <a:t>Bons</a:t>
-            </a:r>
-            <a:r>
-              <a:rPr lang="en-US" dirty="0" smtClean="0"/>
-              <a:t> </a:t>
-            </a:r>
-            <a:r>
-              <a:rPr lang="en-US" dirty="0" err="1" smtClean="0"/>
-              <a:t>resultados</a:t>
-            </a:r>
-            <a:r>
-              <a:rPr lang="en-US" dirty="0" smtClean="0"/>
-              <a:t> com </a:t>
-            </a:r>
-            <a:r>
-              <a:rPr lang="en-US" dirty="0" err="1" smtClean="0"/>
-              <a:t>imagens</a:t>
-            </a:r>
-            <a:r>
-              <a:rPr lang="en-US" dirty="0" smtClean="0"/>
-              <a:t> </a:t>
-            </a:r>
-            <a:r>
-              <a:rPr lang="en-US" dirty="0" err="1" smtClean="0"/>
-              <a:t>frontais</a:t>
-            </a:r>
-            <a:endParaRPr lang="en-US" dirty="0" smtClean="0"/>
-          </a:p>
-          <a:p>
-            <a:r>
-              <a:rPr lang="en-US" dirty="0" err="1" smtClean="0"/>
-              <a:t>Invariante</a:t>
-            </a:r>
-            <a:r>
-              <a:rPr lang="en-US" dirty="0" smtClean="0"/>
-              <a:t> a </a:t>
-            </a:r>
-            <a:r>
-              <a:rPr lang="en-US" dirty="0" err="1" smtClean="0"/>
-              <a:t>Iluminação</a:t>
-            </a:r>
-            <a:endParaRPr lang="en-US" dirty="0" smtClean="0"/>
-          </a:p>
-          <a:p>
+              <a:t>Testes do LVQ</a:t>
+            </a:r>
             <a:endParaRPr lang="en-US" dirty="0"/>
           </a:p>
         </p:txBody>
       </p:sp>
       <p:pic>
         <p:nvPicPr>
-          <p:cNvPr id="6" name="Picture 5" descr="Macintosh HD:Users:Mario:Desktop:Screen Shot 2012-05-31 at 10.26.48 PM.png"/>
-          <p:cNvPicPr/>
-          <p:nvPr/>
+          <p:cNvPr id="4" name="Content Placeholder 3" descr="Screen Shot 2012-07-12 at 11.51.52 PM.png"/>
+          <p:cNvPicPr>
+            <a:picLocks noGrp="1" noChangeAspect="1"/>
+          </p:cNvPicPr>
+          <p:nvPr>
+            <p:ph idx="1"/>
+          </p:nvPr>
         </p:nvPicPr>
         <p:blipFill>
           <a:blip r:embed="rId2">
@@ -14662,29 +14667,22 @@
               </a:ext>
             </a:extLst>
           </a:blip>
-          <a:srcRect/>
+          <a:srcRect l="-9576" r="-9576"/>
           <a:stretch>
             <a:fillRect/>
           </a:stretch>
         </p:blipFill>
-        <p:spPr bwMode="auto">
-          <a:xfrm>
-            <a:off x="332462" y="2351669"/>
-            <a:ext cx="4285928" cy="4238719"/>
-          </a:xfrm>
-          <a:prstGeom prst="rect">
-            <a:avLst/>
-          </a:prstGeom>
-          <a:noFill/>
-          <a:ln>
-            <a:noFill/>
-          </a:ln>
+        <p:spPr>
+          <a:xfrm>
+            <a:off x="1114424" y="2038256"/>
+            <a:ext cx="7610476" cy="4401241"/>
+          </a:xfrm>
         </p:spPr>
       </p:pic>
     </p:spTree>
     <p:extLst>
       <p:ext uri="{BB962C8B-B14F-4D97-AF65-F5344CB8AC3E}">
-        <p14:creationId xmlns:p14="http://schemas.microsoft.com/office/powerpoint/2010/main" val="126260751"/>
+        <p14:creationId xmlns:p14="http://schemas.microsoft.com/office/powerpoint/2010/main" val="2163541549"/>
       </p:ext>
     </p:extLst>
   </p:cSld>
@@ -14727,30 +14725,91 @@
           <a:lstStyle/>
           <a:p>
             <a:r>
-              <a:rPr lang="en-US" dirty="0" err="1"/>
+              <a:rPr lang="en-US" dirty="0" err="1" smtClean="0"/>
               <a:t>Avaliação</a:t>
             </a:r>
             <a:r>
-              <a:rPr lang="en-US" dirty="0"/>
+              <a:rPr lang="en-US" dirty="0" smtClean="0"/>
               <a:t> do </a:t>
             </a:r>
             <a:r>
-              <a:rPr lang="en-US" dirty="0" err="1"/>
+              <a:rPr lang="en-US" dirty="0" err="1" smtClean="0"/>
               <a:t>Algoritmo</a:t>
             </a:r>
+            <a:endParaRPr lang="en-US" dirty="0"/>
+          </a:p>
+        </p:txBody>
+      </p:sp>
+      <p:sp>
+        <p:nvSpPr>
+          <p:cNvPr id="5" name="Content Placeholder 4"/>
+          <p:cNvSpPr>
+            <a:spLocks noGrp="1"/>
+          </p:cNvSpPr>
+          <p:nvPr>
+            <p:ph sz="half" idx="2"/>
+          </p:nvPr>
+        </p:nvSpPr>
+        <p:spPr/>
+        <p:txBody>
+          <a:bodyPr/>
+          <a:lstStyle/>
+          <a:p>
+            <a:r>
+              <a:rPr lang="en-US" dirty="0" err="1" smtClean="0"/>
+              <a:t>Bons</a:t>
+            </a:r>
+            <a:r>
+              <a:rPr lang="en-US" dirty="0" smtClean="0"/>
+              <a:t> </a:t>
+            </a:r>
+            <a:r>
+              <a:rPr lang="en-US" dirty="0" err="1" smtClean="0"/>
+              <a:t>resultados</a:t>
+            </a:r>
+            <a:r>
+              <a:rPr lang="en-US" dirty="0" smtClean="0"/>
+              <a:t> com </a:t>
+            </a:r>
+            <a:r>
+              <a:rPr lang="en-US" dirty="0" err="1" smtClean="0"/>
+              <a:t>imagens</a:t>
+            </a:r>
+            <a:r>
+              <a:rPr lang="en-US" dirty="0" smtClean="0"/>
+              <a:t> </a:t>
+            </a:r>
+            <a:r>
+              <a:rPr lang="en-US" dirty="0" err="1" smtClean="0"/>
+              <a:t>frontais</a:t>
+            </a:r>
+            <a:endParaRPr lang="en-US" dirty="0" smtClean="0"/>
+          </a:p>
+          <a:p>
+            <a:r>
+              <a:rPr lang="en-US" dirty="0" err="1" smtClean="0"/>
+              <a:t>Invariante</a:t>
+            </a:r>
+            <a:r>
+              <a:rPr lang="en-US" dirty="0" smtClean="0"/>
+              <a:t> a </a:t>
+            </a:r>
+            <a:r>
+              <a:rPr lang="en-US" dirty="0" err="1" smtClean="0"/>
+              <a:t>Iluminação</a:t>
+            </a:r>
+            <a:endParaRPr lang="en-US" dirty="0" smtClean="0"/>
+          </a:p>
+          <a:p>
             <a:endParaRPr lang="en-US" dirty="0"/>
           </a:p>
         </p:txBody>
       </p:sp>
       <p:pic>
         <p:nvPicPr>
-          <p:cNvPr id="6" name="Content Placeholder 5" descr="Screen Shot 2012-05-31 at 10.27.31 PM.png"/>
-          <p:cNvPicPr>
-            <a:picLocks noGrp="1" noChangeAspect="1"/>
-          </p:cNvPicPr>
-          <p:nvPr>
-            <p:ph sz="half" idx="1"/>
-          </p:nvPr>
+          <p:cNvPr id="6" name="Picture 5" descr="Macintosh HD:Users:Mario:Desktop:Screen Shot 2012-05-31 at 10.26.48 PM.png"/>
+          <p:cNvPicPr/>
+          <p:nvPr/>
         </p:nvPicPr>
         <p:blipFill>
           <a:blip r:embed="rId2">
@@ -14760,87 +14819,29 @@
               </a:ext>
             </a:extLst>
           </a:blip>
-          <a:srcRect t="-14772" b="-14772"/>
+          <a:srcRect/>
           <a:stretch>
             <a:fillRect/>
           </a:stretch>
         </p:blipFill>
-        <p:spPr>
-          <a:xfrm>
-            <a:off x="148449" y="2038256"/>
-            <a:ext cx="4683125" cy="4835336"/>
-          </a:xfrm>
+        <p:spPr bwMode="auto">
+          <a:xfrm>
+            <a:off x="332462" y="2351669"/>
+            <a:ext cx="4285928" cy="4238719"/>
+          </a:xfrm>
+          <a:prstGeom prst="rect">
+            <a:avLst/>
+          </a:prstGeom>
+          <a:noFill/>
+          <a:ln>
+            <a:noFill/>
+          </a:ln>
         </p:spPr>
       </p:pic>
-      <p:sp>
-        <p:nvSpPr>
-          <p:cNvPr id="4" name="Content Placeholder 3"/>
-          <p:cNvSpPr>
-            <a:spLocks noGrp="1"/>
-          </p:cNvSpPr>
-          <p:nvPr>
-            <p:ph sz="half" idx="2"/>
-          </p:nvPr>
-        </p:nvSpPr>
-        <p:spPr/>
-        <p:txBody>
-          <a:bodyPr/>
-          <a:lstStyle/>
-          <a:p>
-            <a:r>
-              <a:rPr lang="en-US" dirty="0" err="1" smtClean="0"/>
-              <a:t>Falha</a:t>
-            </a:r>
-            <a:r>
-              <a:rPr lang="en-US" dirty="0" smtClean="0"/>
-              <a:t> com </a:t>
-            </a:r>
-            <a:r>
-              <a:rPr lang="en-US" dirty="0" err="1" smtClean="0"/>
-              <a:t>multiplas</a:t>
-            </a:r>
-            <a:r>
-              <a:rPr lang="en-US" dirty="0" smtClean="0"/>
-              <a:t> poses</a:t>
-            </a:r>
-          </a:p>
-          <a:p>
-            <a:r>
-              <a:rPr lang="en-US" dirty="0" err="1" smtClean="0"/>
-              <a:t>Multiscale</a:t>
-            </a:r>
-            <a:r>
-              <a:rPr lang="en-US" dirty="0" smtClean="0"/>
-              <a:t> </a:t>
-            </a:r>
-            <a:r>
-              <a:rPr lang="en-US" dirty="0" err="1" smtClean="0"/>
-              <a:t>Piramidal</a:t>
-            </a:r>
-            <a:r>
-              <a:rPr lang="en-US" dirty="0" smtClean="0"/>
-              <a:t> </a:t>
-            </a:r>
-            <a:r>
-              <a:rPr lang="en-US" dirty="0" err="1" smtClean="0"/>
-              <a:t>muito</a:t>
-            </a:r>
-            <a:r>
-              <a:rPr lang="en-US" dirty="0" smtClean="0"/>
-              <a:t> </a:t>
-            </a:r>
-            <a:r>
-              <a:rPr lang="en-US" dirty="0" err="1" smtClean="0"/>
-              <a:t>custoso</a:t>
-            </a:r>
-            <a:endParaRPr lang="en-US" dirty="0"/>
-          </a:p>
-        </p:txBody>
-      </p:sp>
     </p:spTree>
     <p:extLst>
       <p:ext uri="{BB962C8B-B14F-4D97-AF65-F5344CB8AC3E}">
-        <p14:creationId xmlns:p14="http://schemas.microsoft.com/office/powerpoint/2010/main" val="1856583825"/>
+        <p14:creationId xmlns:p14="http://schemas.microsoft.com/office/powerpoint/2010/main" val="126260751"/>
       </p:ext>
     </p:extLst>
   </p:cSld>
@@ -14883,293 +14884,112 @@
           <a:lstStyle/>
           <a:p>
             <a:r>
-              <a:rPr lang="en-US" dirty="0" err="1" smtClean="0"/>
-              <a:t>Referências</a:t>
+              <a:rPr lang="en-US" dirty="0" err="1"/>
+              <a:t>Avaliação</a:t>
+            </a:r>
+            <a:r>
+              <a:rPr lang="en-US" dirty="0"/>
+              <a:t> do </a:t>
+            </a:r>
+            <a:r>
+              <a:rPr lang="en-US" dirty="0" err="1"/>
+              <a:t>Algoritmo</a:t>
             </a:r>
             <a:endParaRPr lang="en-US" dirty="0"/>
           </a:p>
         </p:txBody>
       </p:sp>
-      <p:sp>
-        <p:nvSpPr>
-          <p:cNvPr id="3" name="Content Placeholder 2"/>
+      <p:pic>
+        <p:nvPicPr>
+          <p:cNvPr id="6" name="Content Placeholder 5" descr="Screen Shot 2012-05-31 at 10.27.31 PM.png"/>
+          <p:cNvPicPr>
+            <a:picLocks noGrp="1" noChangeAspect="1"/>
+          </p:cNvPicPr>
+          <p:nvPr>
+            <p:ph sz="half" idx="1"/>
+          </p:nvPr>
+        </p:nvPicPr>
+        <p:blipFill>
+          <a:blip r:embed="rId2">
+            <a:extLst>
+              <a:ext uri="{28A0092B-C50C-407E-A947-70E740481C1C}">
+                <a14:useLocalDpi xmlns:a14="http://schemas.microsoft.com/office/drawing/2010/main" val="0"/>
+              </a:ext>
+            </a:extLst>
+          </a:blip>
+          <a:srcRect t="-14772" b="-14772"/>
+          <a:stretch>
+            <a:fillRect/>
+          </a:stretch>
+        </p:blipFill>
+        <p:spPr>
+          <a:xfrm>
+            <a:off x="148449" y="2038256"/>
+            <a:ext cx="4683125" cy="4835336"/>
+          </a:xfrm>
+        </p:spPr>
+      </p:pic>
+      <p:sp>
+        <p:nvSpPr>
+          <p:cNvPr id="4" name="Content Placeholder 3"/>
           <p:cNvSpPr>
             <a:spLocks noGrp="1"/>
           </p:cNvSpPr>
           <p:nvPr>
-            <p:ph idx="1"/>
+            <p:ph sz="half" idx="2"/>
           </p:nvPr>
         </p:nvSpPr>
         <p:spPr/>
         <p:txBody>
-          <a:bodyPr>
-            <a:normAutofit fontScale="92500" lnSpcReduction="10000"/>
-          </a:bodyPr>
-          <a:lstStyle/>
-          <a:p>
-            <a:pPr lvl="0"/>
-            <a:r>
-              <a:rPr lang="en-US" dirty="0" err="1"/>
-              <a:t>Matlab</a:t>
-            </a:r>
-            <a:r>
-              <a:rPr lang="en-US" dirty="0"/>
-              <a:t> Trial Software </a:t>
+          <a:bodyPr/>
+          <a:lstStyle/>
+          <a:p>
+            <a:r>
+              <a:rPr lang="en-US" dirty="0" err="1" smtClean="0"/>
+              <a:t>Falha</a:t>
             </a:r>
             <a:r>
               <a:rPr lang="en-US" dirty="0" smtClean="0"/>
-              <a:t>(http</a:t>
-            </a:r>
-            <a:r>
-              <a:rPr lang="en-US" dirty="0"/>
-              <a:t>://</a:t>
+              <a:t> com </a:t>
             </a:r>
             <a:r>
               <a:rPr lang="en-US" dirty="0" err="1" smtClean="0"/>
-              <a:t>www.mathworks.com</a:t>
-            </a:r>
-            <a:r>
-              <a:rPr lang="en-US" dirty="0"/>
-              <a:t>/</a:t>
+              <a:t>multiplas</a:t>
             </a:r>
             <a:r>
               <a:rPr lang="en-US" dirty="0" smtClean="0"/>
-              <a:t>products</a:t>
-            </a:r>
-            <a:r>
-              <a:rPr lang="en-US" dirty="0"/>
-              <a:t>/</a:t>
-            </a:r>
-            <a:r>
-              <a:rPr lang="en-US" dirty="0" err="1"/>
-              <a:t>matlab</a:t>
+              <a:t> poses</a:t>
+            </a:r>
+          </a:p>
+          <a:p>
+            <a:r>
+              <a:rPr lang="en-US" dirty="0" err="1" smtClean="0"/>
+              <a:t>Multiscale</a:t>
             </a:r>
             <a:r>
               <a:rPr lang="en-US" dirty="0" smtClean="0"/>
-              <a:t>/)</a:t>
-            </a:r>
-          </a:p>
-          <a:p>
-            <a:r>
-              <a:rPr lang="en-US" dirty="0"/>
-              <a:t>Learning Vector Quantization (http://</a:t>
-            </a:r>
-            <a:r>
-              <a:rPr lang="en-US" dirty="0" err="1"/>
-              <a:t>en.wikipedia.org</a:t>
-            </a:r>
-            <a:r>
-              <a:rPr lang="en-US" dirty="0"/>
-              <a:t>/wiki/</a:t>
-            </a:r>
-            <a:r>
-              <a:rPr lang="en-US" dirty="0" err="1"/>
-              <a:t>Learning_Vector_Quantization</a:t>
-            </a:r>
-            <a:r>
-              <a:rPr lang="en-US" dirty="0"/>
-              <a:t>)</a:t>
-            </a:r>
-          </a:p>
-          <a:p>
-            <a:r>
-              <a:rPr lang="en-US" dirty="0" err="1"/>
-              <a:t>Neide</a:t>
-            </a:r>
-            <a:r>
-              <a:rPr lang="en-US" dirty="0"/>
               <a:t> </a:t>
             </a:r>
             <a:r>
-              <a:rPr lang="en-US" dirty="0" err="1"/>
-              <a:t>Pizzolato</a:t>
-            </a:r>
-            <a:r>
-              <a:rPr lang="en-US" dirty="0"/>
+              <a:rPr lang="en-US" dirty="0" err="1" smtClean="0"/>
+              <a:t>Piramidal</a:t>
+            </a:r>
+            <a:r>
+              <a:rPr lang="en-US" dirty="0" smtClean="0"/>
               <a:t> </a:t>
             </a:r>
             <a:r>
+              <a:rPr lang="en-US" dirty="0" err="1" smtClean="0"/>
+              <a:t>muito</a:t>
+            </a:r>
+            <a:r>
               <a:rPr lang="en-US" dirty="0" smtClean="0"/>
-              <a:t>Angelo. </a:t>
-            </a:r>
-            <a:r>
-              <a:rPr lang="en-US" i="1" dirty="0" err="1"/>
-              <a:t>Aplicação</a:t>
-            </a:r>
-            <a:r>
-              <a:rPr lang="en-US" i="1" dirty="0"/>
-              <a:t> de </a:t>
-            </a:r>
-            <a:r>
-              <a:rPr lang="en-US" i="1" dirty="0" err="1"/>
-              <a:t>Filtros</a:t>
-            </a:r>
-            <a:r>
-              <a:rPr lang="en-US" i="1" dirty="0"/>
-              <a:t> de Gabor no </a:t>
-            </a:r>
-            <a:r>
-              <a:rPr lang="en-US" i="1" dirty="0" err="1"/>
-              <a:t>Processo</a:t>
-            </a:r>
-            <a:r>
-              <a:rPr lang="en-US" i="1" dirty="0"/>
-              <a:t> de </a:t>
-            </a:r>
-            <a:r>
-              <a:rPr lang="en-US" i="1" dirty="0" err="1"/>
-              <a:t>Classificação</a:t>
-            </a:r>
-            <a:r>
-              <a:rPr lang="en-US" i="1" dirty="0"/>
-              <a:t> de </a:t>
-            </a:r>
-            <a:r>
-              <a:rPr lang="en-US" i="1" dirty="0" err="1"/>
-              <a:t>Imagens</a:t>
-            </a:r>
-            <a:r>
-              <a:rPr lang="en-US" i="1" dirty="0"/>
               <a:t> </a:t>
             </a:r>
             <a:r>
-              <a:rPr lang="en-US" i="1" dirty="0" err="1"/>
-              <a:t>Digitais</a:t>
-            </a:r>
-            <a:r>
-              <a:rPr lang="en-US" i="1" dirty="0"/>
-              <a:t> com Base </a:t>
-            </a:r>
-            <a:r>
-              <a:rPr lang="en-US" i="1" dirty="0" err="1"/>
-              <a:t>em</a:t>
-            </a:r>
-            <a:r>
-              <a:rPr lang="en-US" i="1" dirty="0"/>
-              <a:t> </a:t>
-            </a:r>
-            <a:r>
-              <a:rPr lang="en-US" i="1" dirty="0" err="1"/>
-              <a:t>Atributos</a:t>
-            </a:r>
-            <a:r>
-              <a:rPr lang="en-US" i="1" dirty="0"/>
-              <a:t> de </a:t>
-            </a:r>
-            <a:r>
-              <a:rPr lang="en-US" i="1" dirty="0" err="1"/>
-              <a:t>Textura</a:t>
-            </a:r>
-            <a:r>
-              <a:rPr lang="en-US" dirty="0"/>
-              <a:t>, Porto </a:t>
-            </a:r>
-            <a:r>
-              <a:rPr lang="en-US" dirty="0" err="1"/>
-              <a:t>Alegre</a:t>
-            </a:r>
-            <a:r>
-              <a:rPr lang="en-US" dirty="0"/>
-              <a:t>, </a:t>
-            </a:r>
-            <a:r>
-              <a:rPr lang="en-US" dirty="0" err="1"/>
-              <a:t>Brasil</a:t>
-            </a:r>
-            <a:endParaRPr lang="en-US" dirty="0"/>
-          </a:p>
-          <a:p>
-            <a:r>
-              <a:rPr lang="en-US" dirty="0" err="1"/>
-              <a:t>Yasuo</a:t>
-            </a:r>
-            <a:r>
-              <a:rPr lang="en-US" dirty="0"/>
-              <a:t> </a:t>
-            </a:r>
-            <a:r>
-              <a:rPr lang="en-US" dirty="0" err="1"/>
-              <a:t>Kono</a:t>
-            </a:r>
-            <a:r>
-              <a:rPr lang="en-US" dirty="0"/>
-              <a:t>, José </a:t>
-            </a:r>
-            <a:r>
-              <a:rPr lang="en-US" dirty="0" err="1"/>
-              <a:t>Demiso</a:t>
-            </a:r>
-            <a:r>
-              <a:rPr lang="en-US" dirty="0"/>
-              <a:t> </a:t>
-            </a:r>
-            <a:r>
-              <a:rPr lang="en-US" dirty="0" err="1"/>
-              <a:t>Simões</a:t>
-            </a:r>
-            <a:r>
-              <a:rPr lang="en-US" dirty="0"/>
-              <a:t>, Rafael Duarte.  </a:t>
-            </a:r>
-            <a:r>
-              <a:rPr lang="en-US" i="1" dirty="0" err="1"/>
-              <a:t>Utilização</a:t>
-            </a:r>
-            <a:r>
-              <a:rPr lang="en-US" i="1" dirty="0"/>
-              <a:t> de </a:t>
-            </a:r>
-            <a:r>
-              <a:rPr lang="en-US" i="1" dirty="0" err="1"/>
-              <a:t>Rede</a:t>
-            </a:r>
-            <a:r>
-              <a:rPr lang="en-US" i="1" dirty="0"/>
-              <a:t> </a:t>
-            </a:r>
-            <a:r>
-              <a:rPr lang="en-US" i="1" dirty="0" smtClean="0"/>
-              <a:t>Neural </a:t>
-            </a:r>
-            <a:r>
-              <a:rPr lang="en-US" i="1" dirty="0"/>
-              <a:t>Para </a:t>
-            </a:r>
-            <a:r>
-              <a:rPr lang="en-US" i="1" dirty="0" err="1"/>
-              <a:t>Previsão</a:t>
-            </a:r>
-            <a:r>
-              <a:rPr lang="en-US" i="1" dirty="0"/>
-              <a:t> do </a:t>
-            </a:r>
-            <a:r>
-              <a:rPr lang="en-US" i="1" dirty="0" err="1"/>
-              <a:t>Nível</a:t>
-            </a:r>
-            <a:r>
-              <a:rPr lang="en-US" i="1" dirty="0"/>
-              <a:t> do Rio </a:t>
-            </a:r>
-            <a:r>
-              <a:rPr lang="en-US" i="1" dirty="0" err="1"/>
-              <a:t>Paraguai</a:t>
-            </a:r>
-            <a:r>
-              <a:rPr lang="en-US" dirty="0"/>
-              <a:t>. São José dos Campos, </a:t>
-            </a:r>
-            <a:r>
-              <a:rPr lang="en-US" dirty="0" err="1"/>
-              <a:t>Brasil</a:t>
-            </a:r>
-            <a:endParaRPr lang="en-US" dirty="0"/>
-          </a:p>
-          <a:p>
-            <a:endParaRPr lang="en-US" dirty="0"/>
-          </a:p>
-          <a:p>
-            <a:pPr lvl="0"/>
+              <a:rPr lang="en-US" dirty="0" err="1" smtClean="0"/>
+              <a:t>custoso</a:t>
+            </a:r>
             <a:endParaRPr lang="en-US" dirty="0"/>
           </a:p>
         </p:txBody>
@@ -15177,7 +14997,7 @@
     </p:spTree>
     <p:extLst>
       <p:ext uri="{BB962C8B-B14F-4D97-AF65-F5344CB8AC3E}">
-        <p14:creationId xmlns:p14="http://schemas.microsoft.com/office/powerpoint/2010/main" val="2256202746"/>
+        <p14:creationId xmlns:p14="http://schemas.microsoft.com/office/powerpoint/2010/main" val="1856583825"/>
       </p:ext>
     </p:extLst>
   </p:cSld>
@@ -15371,6 +15191,343 @@
 </file>
 
 <file path=ppt/slides/slide40.xml><?xml version="1.0" encoding="utf-8"?>
+<p:sld xmlns:a="http://schemas.openxmlformats.org/drawingml/2006/main" xmlns:r="http://schemas.openxmlformats.org/officeDocument/2006/relationships" xmlns:p="http://schemas.openxmlformats.org/presentationml/2006/main">
+  <p:cSld>
+    <p:spTree>
+      <p:nvGrpSpPr>
+        <p:cNvPr id="1" name=""/>
+        <p:cNvGrpSpPr/>
+        <p:nvPr/>
+      </p:nvGrpSpPr>
+      <p:grpSpPr>
+        <a:xfrm>
+          <a:off x="0" y="0"/>
+          <a:ext cx="0" cy="0"/>
+          <a:chOff x="0" y="0"/>
+          <a:chExt cx="0" cy="0"/>
+        </a:xfrm>
+      </p:grpSpPr>
+      <p:sp>
+        <p:nvSpPr>
+          <p:cNvPr id="2" name="Title 1"/>
+          <p:cNvSpPr>
+            <a:spLocks noGrp="1"/>
+          </p:cNvSpPr>
+          <p:nvPr>
+            <p:ph type="title"/>
+          </p:nvPr>
+        </p:nvSpPr>
+        <p:spPr/>
+        <p:txBody>
+          <a:bodyPr/>
+          <a:lstStyle/>
+          <a:p>
+            <a:r>
+              <a:rPr lang="en-US" dirty="0" err="1" smtClean="0"/>
+              <a:t>Referências</a:t>
+            </a:r>
+            <a:endParaRPr lang="en-US" dirty="0"/>
+          </a:p>
+        </p:txBody>
+      </p:sp>
+      <p:sp>
+        <p:nvSpPr>
+          <p:cNvPr id="3" name="Content Placeholder 2"/>
+          <p:cNvSpPr>
+            <a:spLocks noGrp="1"/>
+          </p:cNvSpPr>
+          <p:nvPr>
+            <p:ph idx="1"/>
+          </p:nvPr>
+        </p:nvSpPr>
+        <p:spPr/>
+        <p:txBody>
+          <a:bodyPr>
+            <a:normAutofit fontScale="92500" lnSpcReduction="10000"/>
+          </a:bodyPr>
+          <a:lstStyle/>
+          <a:p>
+            <a:pPr lvl="0"/>
+            <a:r>
+              <a:rPr lang="en-US" dirty="0" err="1"/>
+              <a:t>Matlab</a:t>
+            </a:r>
+            <a:r>
+              <a:rPr lang="en-US" dirty="0"/>
+              <a:t> Trial Software </a:t>
+            </a:r>
+            <a:r>
+              <a:rPr lang="en-US" dirty="0" smtClean="0"/>
+              <a:t>(http</a:t>
+            </a:r>
+            <a:r>
+              <a:rPr lang="en-US" dirty="0"/>
+              <a:t>://</a:t>
+            </a:r>
+            <a:r>
+              <a:rPr lang="en-US" dirty="0" err="1" smtClean="0"/>
+              <a:t>www.mathworks.com</a:t>
+            </a:r>
+            <a:r>
+              <a:rPr lang="en-US" dirty="0"/>
+              <a:t>/</a:t>
+            </a:r>
+            <a:r>
+              <a:rPr lang="en-US" dirty="0" smtClean="0"/>
+              <a:t>products</a:t>
+            </a:r>
+            <a:r>
+              <a:rPr lang="en-US" dirty="0"/>
+              <a:t>/</a:t>
+            </a:r>
+            <a:r>
+              <a:rPr lang="en-US" dirty="0" err="1"/>
+              <a:t>matlab</a:t>
+            </a:r>
+            <a:r>
+              <a:rPr lang="en-US" dirty="0" smtClean="0"/>
+              <a:t>/)</a:t>
+            </a:r>
+          </a:p>
+          <a:p>
+            <a:r>
+              <a:rPr lang="en-US" dirty="0"/>
+              <a:t>Learning Vector Quantization (http://</a:t>
+            </a:r>
+            <a:r>
+              <a:rPr lang="en-US" dirty="0" err="1"/>
+              <a:t>en.wikipedia.org</a:t>
+            </a:r>
+            <a:r>
+              <a:rPr lang="en-US" dirty="0"/>
+              <a:t>/wiki/</a:t>
+            </a:r>
+            <a:r>
+              <a:rPr lang="en-US" dirty="0" err="1"/>
+              <a:t>Learning_Vector_Quantization</a:t>
+            </a:r>
+            <a:r>
+              <a:rPr lang="en-US" dirty="0"/>
+              <a:t>)</a:t>
+            </a:r>
+          </a:p>
+          <a:p>
+            <a:r>
+              <a:rPr lang="en-US" dirty="0" err="1"/>
+              <a:t>Neide</a:t>
+            </a:r>
+            <a:r>
+              <a:rPr lang="en-US" dirty="0"/>
+              <a:t> </a:t>
+            </a:r>
+            <a:r>
+              <a:rPr lang="en-US" dirty="0" err="1"/>
+              <a:t>Pizzolato</a:t>
+            </a:r>
+            <a:r>
+              <a:rPr lang="en-US" dirty="0"/>
+              <a:t> </a:t>
+            </a:r>
+            <a:r>
+              <a:rPr lang="en-US" dirty="0" smtClean="0"/>
+              <a:t>Angelo. </a:t>
+            </a:r>
+            <a:r>
+              <a:rPr lang="en-US" i="1" dirty="0" err="1"/>
+              <a:t>Aplicação</a:t>
+            </a:r>
+            <a:r>
+              <a:rPr lang="en-US" i="1" dirty="0"/>
+              <a:t> de </a:t>
+            </a:r>
+            <a:r>
+              <a:rPr lang="en-US" i="1" dirty="0" err="1"/>
+              <a:t>Filtros</a:t>
+            </a:r>
+            <a:r>
+              <a:rPr lang="en-US" i="1" dirty="0"/>
+              <a:t> de Gabor no </a:t>
+            </a:r>
+            <a:r>
+              <a:rPr lang="en-US" i="1" dirty="0" err="1"/>
+              <a:t>Processo</a:t>
+            </a:r>
+            <a:r>
+              <a:rPr lang="en-US" i="1" dirty="0"/>
+              <a:t> de </a:t>
+            </a:r>
+            <a:r>
+              <a:rPr lang="en-US" i="1" dirty="0" err="1"/>
+              <a:t>Classificação</a:t>
+            </a:r>
+            <a:r>
+              <a:rPr lang="en-US" i="1" dirty="0"/>
+              <a:t> de </a:t>
+            </a:r>
+            <a:r>
+              <a:rPr lang="en-US" i="1" dirty="0" err="1"/>
+              <a:t>Imagens</a:t>
+            </a:r>
+            <a:r>
+              <a:rPr lang="en-US" i="1" dirty="0"/>
+              <a:t> </a:t>
+            </a:r>
+            <a:r>
+              <a:rPr lang="en-US" i="1" dirty="0" err="1"/>
+              <a:t>Digitais</a:t>
+            </a:r>
+            <a:r>
+              <a:rPr lang="en-US" i="1" dirty="0"/>
+              <a:t> com Base </a:t>
+            </a:r>
+            <a:r>
+              <a:rPr lang="en-US" i="1" dirty="0" err="1"/>
+              <a:t>em</a:t>
+            </a:r>
+            <a:r>
+              <a:rPr lang="en-US" i="1" dirty="0"/>
+              <a:t> </a:t>
+            </a:r>
+            <a:r>
+              <a:rPr lang="en-US" i="1" dirty="0" err="1"/>
+              <a:t>Atributos</a:t>
+            </a:r>
+            <a:r>
+              <a:rPr lang="en-US" i="1" dirty="0"/>
+              <a:t> de </a:t>
+            </a:r>
+            <a:r>
+              <a:rPr lang="en-US" i="1" dirty="0" err="1"/>
+              <a:t>Textura</a:t>
+            </a:r>
+            <a:r>
+              <a:rPr lang="en-US" dirty="0"/>
+              <a:t>, Porto </a:t>
+            </a:r>
+            <a:r>
+              <a:rPr lang="en-US" dirty="0" err="1"/>
+              <a:t>Alegre</a:t>
+            </a:r>
+            <a:r>
+              <a:rPr lang="en-US" dirty="0"/>
+              <a:t>, </a:t>
+            </a:r>
+            <a:r>
+              <a:rPr lang="en-US" dirty="0" err="1"/>
+              <a:t>Brasil</a:t>
+            </a:r>
+            <a:endParaRPr lang="en-US" dirty="0"/>
+          </a:p>
+          <a:p>
+            <a:r>
+              <a:rPr lang="en-US" dirty="0" err="1"/>
+              <a:t>Yasuo</a:t>
+            </a:r>
+            <a:r>
+              <a:rPr lang="en-US" dirty="0"/>
+              <a:t> </a:t>
+            </a:r>
+            <a:r>
+              <a:rPr lang="en-US" dirty="0" err="1"/>
+              <a:t>Kono</a:t>
+            </a:r>
+            <a:r>
+              <a:rPr lang="en-US" dirty="0"/>
+              <a:t>, José </a:t>
+            </a:r>
+            <a:r>
+              <a:rPr lang="en-US" dirty="0" err="1"/>
+              <a:t>Demiso</a:t>
+            </a:r>
+            <a:r>
+              <a:rPr lang="en-US" dirty="0"/>
+              <a:t> </a:t>
+            </a:r>
+            <a:r>
+              <a:rPr lang="en-US" dirty="0" err="1"/>
+              <a:t>Simões</a:t>
+            </a:r>
+            <a:r>
+              <a:rPr lang="en-US" dirty="0"/>
+              <a:t>, Rafael Duarte.  </a:t>
+            </a:r>
+            <a:r>
+              <a:rPr lang="en-US" i="1" dirty="0" err="1"/>
+              <a:t>Utilização</a:t>
+            </a:r>
+            <a:r>
+              <a:rPr lang="en-US" i="1" dirty="0"/>
+              <a:t> de </a:t>
+            </a:r>
+            <a:r>
+              <a:rPr lang="en-US" i="1" dirty="0" err="1"/>
+              <a:t>Rede</a:t>
+            </a:r>
+            <a:r>
+              <a:rPr lang="en-US" i="1" dirty="0"/>
+              <a:t> </a:t>
+            </a:r>
+            <a:r>
+              <a:rPr lang="en-US" i="1" dirty="0" smtClean="0"/>
+              <a:t>Neural </a:t>
+            </a:r>
+            <a:r>
+              <a:rPr lang="en-US" i="1" dirty="0"/>
+              <a:t>Para </a:t>
+            </a:r>
+            <a:r>
+              <a:rPr lang="en-US" i="1" dirty="0" err="1"/>
+              <a:t>Previsão</a:t>
+            </a:r>
+            <a:r>
+              <a:rPr lang="en-US" i="1" dirty="0"/>
+              <a:t> do </a:t>
+            </a:r>
+            <a:r>
+              <a:rPr lang="en-US" i="1" dirty="0" err="1"/>
+              <a:t>Nível</a:t>
+            </a:r>
+            <a:r>
+              <a:rPr lang="en-US" i="1" dirty="0"/>
+              <a:t> do Rio </a:t>
+            </a:r>
+            <a:r>
+              <a:rPr lang="en-US" i="1" dirty="0" err="1"/>
+              <a:t>Paraguai</a:t>
+            </a:r>
+            <a:r>
+              <a:rPr lang="en-US" dirty="0"/>
+              <a:t>. São José dos Campos, </a:t>
+            </a:r>
+            <a:r>
+              <a:rPr lang="en-US" dirty="0" err="1"/>
+              <a:t>Brasil</a:t>
+            </a:r>
+            <a:endParaRPr lang="en-US" dirty="0"/>
+          </a:p>
+          <a:p>
+            <a:endParaRPr lang="en-US" dirty="0"/>
+          </a:p>
+          <a:p>
+            <a:pPr lvl="0"/>
+            <a:endParaRPr lang="en-US" dirty="0"/>
+          </a:p>
+        </p:txBody>
+      </p:sp>
+    </p:spTree>
+    <p:extLst>
+      <p:ext uri="{BB962C8B-B14F-4D97-AF65-F5344CB8AC3E}">
+        <p14:creationId xmlns:p14="http://schemas.microsoft.com/office/powerpoint/2010/main" val="2256202746"/>
+      </p:ext>
+    </p:extLst>
+  </p:cSld>
+  <p:clrMapOvr>
+    <a:masterClrMapping/>
+  </p:clrMapOvr>
+</p:sld>
+</file>
+
+<file path=ppt/slides/slide41.xml><?xml version="1.0" encoding="utf-8"?>
 <p:sld xmlns:a="http://schemas.openxmlformats.org/drawingml/2006/main" xmlns:r="http://schemas.openxmlformats.org/officeDocument/2006/relationships" xmlns:p="http://schemas.openxmlformats.org/presentationml/2006/main">
   <p:cSld>
     <p:spTree>

</xml_diff>